<commit_message>
Some refactoring, some more work on the story, some work on the poster. gtg again, dinner time.
</commit_message>
<xml_diff>
--- a/Reports n such/Rachel Lowe CE301 Poster HECC-IT.pptx
+++ b/Reports n such/Rachel Lowe CE301 Poster HECC-IT.pptx
@@ -145,7 +145,7 @@
 <file path=ppt/revisionInfo.xml><?xml version="1.0" encoding="utf-8"?>
 <p1510:revInfo xmlns:a="http://schemas.openxmlformats.org/drawingml/2006/main" xmlns:r="http://schemas.openxmlformats.org/officeDocument/2006/relationships" xmlns:p1510="http://schemas.microsoft.com/office/powerpoint/2015/10/main">
   <p1510:revLst>
-    <p1510:client id="{B4A2923A-A41E-41B1-8205-9174AEB93B8F}" v="8" dt="2021-03-08T11:55:10.890"/>
+    <p1510:client id="{B4A2923A-A41E-41B1-8205-9174AEB93B8F}" v="9" dt="2021-03-09T17:53:28.291"/>
   </p1510:revLst>
 </p1510:revInfo>
 </file>
@@ -155,18 +155,18 @@
   <pc:docChgLst>
     <pc:chgData name="Lowe, Rachel M" userId="93b75d29-27f6-4dab-b540-bade7f33a1ad" providerId="ADAL" clId="{B4A2923A-A41E-41B1-8205-9174AEB93B8F}"/>
     <pc:docChg chg="undo custSel modSld">
-      <pc:chgData name="Lowe, Rachel M" userId="93b75d29-27f6-4dab-b540-bade7f33a1ad" providerId="ADAL" clId="{B4A2923A-A41E-41B1-8205-9174AEB93B8F}" dt="2021-03-08T11:55:10.890" v="2901" actId="207"/>
+      <pc:chgData name="Lowe, Rachel M" userId="93b75d29-27f6-4dab-b540-bade7f33a1ad" providerId="ADAL" clId="{B4A2923A-A41E-41B1-8205-9174AEB93B8F}" dt="2021-03-09T17:56:00.992" v="4391" actId="20577"/>
       <pc:docMkLst>
         <pc:docMk/>
       </pc:docMkLst>
       <pc:sldChg chg="modSp mod">
-        <pc:chgData name="Lowe, Rachel M" userId="93b75d29-27f6-4dab-b540-bade7f33a1ad" providerId="ADAL" clId="{B4A2923A-A41E-41B1-8205-9174AEB93B8F}" dt="2021-03-08T11:55:10.890" v="2901" actId="207"/>
+        <pc:chgData name="Lowe, Rachel M" userId="93b75d29-27f6-4dab-b540-bade7f33a1ad" providerId="ADAL" clId="{B4A2923A-A41E-41B1-8205-9174AEB93B8F}" dt="2021-03-09T17:56:00.992" v="4391" actId="20577"/>
         <pc:sldMkLst>
           <pc:docMk/>
           <pc:sldMk cId="0" sldId="256"/>
         </pc:sldMkLst>
         <pc:spChg chg="mod">
-          <ac:chgData name="Lowe, Rachel M" userId="93b75d29-27f6-4dab-b540-bade7f33a1ad" providerId="ADAL" clId="{B4A2923A-A41E-41B1-8205-9174AEB93B8F}" dt="2021-03-08T11:55:10.890" v="2901" actId="207"/>
+          <ac:chgData name="Lowe, Rachel M" userId="93b75d29-27f6-4dab-b540-bade7f33a1ad" providerId="ADAL" clId="{B4A2923A-A41E-41B1-8205-9174AEB93B8F}" dt="2021-03-09T17:56:00.992" v="4391" actId="20577"/>
           <ac:spMkLst>
             <pc:docMk/>
             <pc:sldMk cId="0" sldId="256"/>
@@ -174,7 +174,7 @@
           </ac:spMkLst>
         </pc:spChg>
         <pc:spChg chg="mod">
-          <ac:chgData name="Lowe, Rachel M" userId="93b75d29-27f6-4dab-b540-bade7f33a1ad" providerId="ADAL" clId="{B4A2923A-A41E-41B1-8205-9174AEB93B8F}" dt="2021-03-08T11:52:25.141" v="2900" actId="20577"/>
+          <ac:chgData name="Lowe, Rachel M" userId="93b75d29-27f6-4dab-b540-bade7f33a1ad" providerId="ADAL" clId="{B4A2923A-A41E-41B1-8205-9174AEB93B8F}" dt="2021-03-09T17:09:04.197" v="2902" actId="20577"/>
           <ac:spMkLst>
             <pc:docMk/>
             <pc:sldMk cId="0" sldId="256"/>
@@ -2816,7 +2816,7 @@
               </a14:hiddenLine>
             </a:ext>
             <a:ext uri="{FAA26D3D-D897-4be2-8F04-BA451C77F1D7}">
-              <ma14:placeholderFlag xmlns="" xmlns:ma14="http://schemas.microsoft.com/office/mac/drawingml/2011/main" val="1"/>
+              <ma14:placeholderFlag xmlns:ma14="http://schemas.microsoft.com/office/mac/drawingml/2011/main" xmlns="" val="1"/>
             </a:ext>
           </a:extLst>
         </p:spPr>
@@ -2877,7 +2877,7 @@
               </a14:hiddenLine>
             </a:ext>
             <a:ext uri="{FAA26D3D-D897-4be2-8F04-BA451C77F1D7}">
-              <ma14:placeholderFlag xmlns="" xmlns:ma14="http://schemas.microsoft.com/office/mac/drawingml/2011/main" val="1"/>
+              <ma14:placeholderFlag xmlns:ma14="http://schemas.microsoft.com/office/mac/drawingml/2011/main" xmlns="" val="1"/>
             </a:ext>
           </a:extLst>
         </p:spPr>
@@ -4164,7 +4164,7 @@
                 <a:latin typeface="JetBrains Mono" panose="02000009000000000000" pitchFamily="49" charset="0"/>
                 <a:cs typeface="JetBrains Mono" panose="02000009000000000000" pitchFamily="49" charset="0"/>
               </a:rPr>
-              <a:t>And then, once that’s done, just open </a:t>
+              <a:t>And then, once that’s done, just put it through </a:t>
             </a:r>
             <a:r>
               <a:rPr lang="en-GB" altLang="x-none" sz="1400" b="1" dirty="0">
@@ -4179,6 +4179,61 @@
                 <a:cs typeface="JetBrains Mono" panose="02000009000000000000" pitchFamily="49" charset="0"/>
               </a:rPr>
               <a:t> and you have your playable hypertext game!</a:t>
+            </a:r>
+          </a:p>
+          <a:p>
+            <a:pPr eaLnBrk="1" hangingPunct="1"/>
+            <a:endParaRPr lang="en-GB" altLang="x-none" sz="1400" dirty="0">
+              <a:latin typeface="JetBrains Mono" panose="02000009000000000000" pitchFamily="49" charset="0"/>
+              <a:cs typeface="JetBrains Mono" panose="02000009000000000000" pitchFamily="49" charset="0"/>
+            </a:endParaRPr>
+          </a:p>
+          <a:p>
+            <a:pPr eaLnBrk="1" hangingPunct="1"/>
+            <a:r>
+              <a:rPr lang="en-GB" altLang="x-none" sz="1400" b="1" dirty="0">
+                <a:latin typeface="JetBrains Mono" panose="02000009000000000000" pitchFamily="49" charset="0"/>
+                <a:cs typeface="JetBrains Mono" panose="02000009000000000000" pitchFamily="49" charset="0"/>
+              </a:rPr>
+              <a:t>HECC-IT</a:t>
+            </a:r>
+            <a:r>
+              <a:rPr lang="en-GB" altLang="x-none" sz="1400" dirty="0">
+                <a:latin typeface="JetBrains Mono" panose="02000009000000000000" pitchFamily="49" charset="0"/>
+                <a:cs typeface="JetBrains Mono" panose="02000009000000000000" pitchFamily="49" charset="0"/>
+              </a:rPr>
+              <a:t> is a standalone desktop application, so users only need to download it and run it.</a:t>
+            </a:r>
+          </a:p>
+          <a:p>
+            <a:pPr eaLnBrk="1" hangingPunct="1"/>
+            <a:endParaRPr lang="en-GB" altLang="x-none" sz="1400" dirty="0">
+              <a:latin typeface="JetBrains Mono" panose="02000009000000000000" pitchFamily="49" charset="0"/>
+              <a:cs typeface="JetBrains Mono" panose="02000009000000000000" pitchFamily="49" charset="0"/>
+            </a:endParaRPr>
+          </a:p>
+          <a:p>
+            <a:pPr eaLnBrk="1" hangingPunct="1"/>
+            <a:r>
+              <a:rPr lang="en-GB" altLang="x-none" sz="1400" dirty="0">
+                <a:latin typeface="JetBrains Mono" panose="02000009000000000000" pitchFamily="49" charset="0"/>
+                <a:cs typeface="JetBrains Mono" panose="02000009000000000000" pitchFamily="49" charset="0"/>
+              </a:rPr>
+              <a:t>Games made with </a:t>
+            </a:r>
+            <a:r>
+              <a:rPr lang="en-GB" altLang="x-none" sz="1400" b="1" dirty="0">
+                <a:latin typeface="JetBrains Mono" panose="02000009000000000000" pitchFamily="49" charset="0"/>
+                <a:cs typeface="JetBrains Mono" panose="02000009000000000000" pitchFamily="49" charset="0"/>
+              </a:rPr>
+              <a:t>HECC-IT</a:t>
+            </a:r>
+            <a:r>
+              <a:rPr lang="en-GB" altLang="x-none" sz="1400" dirty="0">
+                <a:latin typeface="JetBrains Mono" panose="02000009000000000000" pitchFamily="49" charset="0"/>
+                <a:cs typeface="JetBrains Mono" panose="02000009000000000000" pitchFamily="49" charset="0"/>
+              </a:rPr>
+              <a:t> are in a client-side HTML/JavaScript format, so anyone with a web browser can download and play them.</a:t>
             </a:r>
           </a:p>
         </p:txBody>
@@ -4581,317 +4636,10 @@
           </a:lstStyle>
           <a:p>
             <a:pPr eaLnBrk="1" hangingPunct="1"/>
-            <a:r>
-              <a:rPr lang="en-GB" altLang="x-none" sz="1400" dirty="0">
-                <a:latin typeface="JetBrains Mono" panose="02000009000000000000" pitchFamily="49" charset="0"/>
-                <a:cs typeface="JetBrains Mono" panose="02000009000000000000" pitchFamily="49" charset="0"/>
-              </a:rPr>
-              <a:t>!</a:t>
-            </a:r>
-            <a:r>
-              <a:rPr lang="en-GB" altLang="x-none" sz="1400" dirty="0" err="1">
-                <a:latin typeface="JetBrains Mono" panose="02000009000000000000" pitchFamily="49" charset="0"/>
-                <a:cs typeface="JetBrains Mono" panose="02000009000000000000" pitchFamily="49" charset="0"/>
-              </a:rPr>
-              <a:t>StoryTitle</a:t>
-            </a:r>
-            <a:r>
-              <a:rPr lang="en-GB" altLang="x-none" sz="1400" dirty="0">
-                <a:latin typeface="JetBrains Mono" panose="02000009000000000000" pitchFamily="49" charset="0"/>
-                <a:cs typeface="JetBrains Mono" panose="02000009000000000000" pitchFamily="49" charset="0"/>
-              </a:rPr>
-              <a:t>: </a:t>
-            </a:r>
-            <a:r>
-              <a:rPr lang="en-GB" altLang="x-none" sz="1400" dirty="0" err="1">
-                <a:latin typeface="JetBrains Mono" panose="02000009000000000000" pitchFamily="49" charset="0"/>
-                <a:cs typeface="JetBrains Mono" panose="02000009000000000000" pitchFamily="49" charset="0"/>
-              </a:rPr>
-              <a:t>heccSample</a:t>
-            </a:r>
             <a:endParaRPr lang="en-GB" altLang="x-none" sz="1400" dirty="0">
               <a:latin typeface="JetBrains Mono" panose="02000009000000000000" pitchFamily="49" charset="0"/>
               <a:cs typeface="JetBrains Mono" panose="02000009000000000000" pitchFamily="49" charset="0"/>
             </a:endParaRPr>
-          </a:p>
-          <a:p>
-            <a:pPr eaLnBrk="1" hangingPunct="1"/>
-            <a:r>
-              <a:rPr lang="en-GB" altLang="x-none" sz="1400" dirty="0">
-                <a:latin typeface="JetBrains Mono" panose="02000009000000000000" pitchFamily="49" charset="0"/>
-                <a:cs typeface="JetBrains Mono" panose="02000009000000000000" pitchFamily="49" charset="0"/>
-              </a:rPr>
-              <a:t>!Author: Rachel Lowe</a:t>
-            </a:r>
-          </a:p>
-          <a:p>
-            <a:pPr eaLnBrk="1" hangingPunct="1"/>
-            <a:r>
-              <a:rPr lang="en-GB" altLang="x-none" sz="1400" dirty="0">
-                <a:latin typeface="JetBrains Mono" panose="02000009000000000000" pitchFamily="49" charset="0"/>
-                <a:cs typeface="JetBrains Mono" panose="02000009000000000000" pitchFamily="49" charset="0"/>
-              </a:rPr>
-              <a:t>!</a:t>
-            </a:r>
-            <a:r>
-              <a:rPr lang="en-GB" altLang="x-none" sz="1400" dirty="0" err="1">
-                <a:latin typeface="JetBrains Mono" panose="02000009000000000000" pitchFamily="49" charset="0"/>
-                <a:cs typeface="JetBrains Mono" panose="02000009000000000000" pitchFamily="49" charset="0"/>
-              </a:rPr>
-              <a:t>StartPassage</a:t>
-            </a:r>
-            <a:r>
-              <a:rPr lang="en-GB" altLang="x-none" sz="1400" dirty="0">
-                <a:latin typeface="JetBrains Mono" panose="02000009000000000000" pitchFamily="49" charset="0"/>
-                <a:cs typeface="JetBrains Mono" panose="02000009000000000000" pitchFamily="49" charset="0"/>
-              </a:rPr>
-              <a:t>: Start</a:t>
-            </a:r>
-          </a:p>
-          <a:p>
-            <a:pPr eaLnBrk="1" hangingPunct="1"/>
-            <a:r>
-              <a:rPr lang="en-GB" altLang="x-none" sz="1400" dirty="0">
-                <a:latin typeface="JetBrains Mono" panose="02000009000000000000" pitchFamily="49" charset="0"/>
-                <a:cs typeface="JetBrains Mono" panose="02000009000000000000" pitchFamily="49" charset="0"/>
-              </a:rPr>
-              <a:t>//this is some example .</a:t>
-            </a:r>
-            <a:r>
-              <a:rPr lang="en-GB" altLang="x-none" sz="1400" dirty="0" err="1">
-                <a:latin typeface="JetBrains Mono" panose="02000009000000000000" pitchFamily="49" charset="0"/>
-                <a:cs typeface="JetBrains Mono" panose="02000009000000000000" pitchFamily="49" charset="0"/>
-              </a:rPr>
-              <a:t>hecc</a:t>
-            </a:r>
-            <a:endParaRPr lang="en-GB" altLang="x-none" sz="1400" dirty="0">
-              <a:latin typeface="JetBrains Mono" panose="02000009000000000000" pitchFamily="49" charset="0"/>
-              <a:cs typeface="JetBrains Mono" panose="02000009000000000000" pitchFamily="49" charset="0"/>
-            </a:endParaRPr>
-          </a:p>
-          <a:p>
-            <a:pPr eaLnBrk="1" hangingPunct="1"/>
-            <a:endParaRPr lang="en-GB" altLang="x-none" sz="1400" dirty="0">
-              <a:latin typeface="JetBrains Mono" panose="02000009000000000000" pitchFamily="49" charset="0"/>
-              <a:cs typeface="JetBrains Mono" panose="02000009000000000000" pitchFamily="49" charset="0"/>
-            </a:endParaRPr>
-          </a:p>
-          <a:p>
-            <a:pPr eaLnBrk="1" hangingPunct="1"/>
-            <a:r>
-              <a:rPr lang="en-GB" altLang="x-none" sz="1400" dirty="0">
-                <a:latin typeface="JetBrains Mono" panose="02000009000000000000" pitchFamily="49" charset="0"/>
-                <a:cs typeface="JetBrains Mono" panose="02000009000000000000" pitchFamily="49" charset="0"/>
-              </a:rPr>
-              <a:t>::Start</a:t>
-            </a:r>
-          </a:p>
-          <a:p>
-            <a:pPr eaLnBrk="1" hangingPunct="1"/>
-            <a:r>
-              <a:rPr lang="en-GB" altLang="x-none" sz="1400" dirty="0">
-                <a:latin typeface="JetBrains Mono" panose="02000009000000000000" pitchFamily="49" charset="0"/>
-                <a:cs typeface="JetBrains Mono" panose="02000009000000000000" pitchFamily="49" charset="0"/>
-              </a:rPr>
-              <a:t>Welcome to HECC-IT!</a:t>
-            </a:r>
-          </a:p>
-          <a:p>
-            <a:pPr eaLnBrk="1" hangingPunct="1"/>
-            <a:r>
-              <a:rPr lang="en-GB" altLang="x-none" sz="1400" dirty="0">
-                <a:latin typeface="JetBrains Mono" panose="02000009000000000000" pitchFamily="49" charset="0"/>
-                <a:cs typeface="JetBrains Mono" panose="02000009000000000000" pitchFamily="49" charset="0"/>
-              </a:rPr>
-              <a:t>[[nice]]</a:t>
-            </a:r>
-          </a:p>
-          <a:p>
-            <a:pPr eaLnBrk="1" hangingPunct="1"/>
-            <a:endParaRPr lang="en-GB" altLang="x-none" sz="1400" dirty="0">
-              <a:latin typeface="JetBrains Mono" panose="02000009000000000000" pitchFamily="49" charset="0"/>
-              <a:cs typeface="JetBrains Mono" panose="02000009000000000000" pitchFamily="49" charset="0"/>
-            </a:endParaRPr>
-          </a:p>
-          <a:p>
-            <a:pPr eaLnBrk="1" hangingPunct="1"/>
-            <a:r>
-              <a:rPr lang="en-GB" altLang="x-none" sz="1400" dirty="0">
-                <a:latin typeface="JetBrains Mono" panose="02000009000000000000" pitchFamily="49" charset="0"/>
-                <a:cs typeface="JetBrains Mono" panose="02000009000000000000" pitchFamily="49" charset="0"/>
-              </a:rPr>
-              <a:t>::nice</a:t>
-            </a:r>
-          </a:p>
-          <a:p>
-            <a:pPr eaLnBrk="1" hangingPunct="1"/>
-            <a:r>
-              <a:rPr lang="en-GB" altLang="x-none" sz="1400" dirty="0">
-                <a:latin typeface="JetBrains Mono" panose="02000009000000000000" pitchFamily="49" charset="0"/>
-                <a:cs typeface="JetBrains Mono" panose="02000009000000000000" pitchFamily="49" charset="0"/>
-              </a:rPr>
-              <a:t>Congrats you moved to another passage</a:t>
-            </a:r>
-          </a:p>
-          <a:p>
-            <a:pPr eaLnBrk="1" hangingPunct="1"/>
-            <a:r>
-              <a:rPr lang="en-GB" altLang="x-none" sz="1400" dirty="0">
-                <a:latin typeface="JetBrains Mono" panose="02000009000000000000" pitchFamily="49" charset="0"/>
-                <a:cs typeface="JetBrains Mono" panose="02000009000000000000" pitchFamily="49" charset="0"/>
-              </a:rPr>
-              <a:t>[[</a:t>
-            </a:r>
-            <a:r>
-              <a:rPr lang="en-GB" altLang="x-none" sz="1400" dirty="0" err="1">
-                <a:latin typeface="JetBrains Mono" panose="02000009000000000000" pitchFamily="49" charset="0"/>
-                <a:cs typeface="JetBrains Mono" panose="02000009000000000000" pitchFamily="49" charset="0"/>
-              </a:rPr>
-              <a:t>woah|another</a:t>
-            </a:r>
-            <a:r>
-              <a:rPr lang="en-GB" altLang="x-none" sz="1400" dirty="0">
-                <a:latin typeface="JetBrains Mono" panose="02000009000000000000" pitchFamily="49" charset="0"/>
-                <a:cs typeface="JetBrains Mono" panose="02000009000000000000" pitchFamily="49" charset="0"/>
-              </a:rPr>
-              <a:t> one]]</a:t>
-            </a:r>
-          </a:p>
-          <a:p>
-            <a:pPr eaLnBrk="1" hangingPunct="1"/>
-            <a:endParaRPr lang="en-GB" altLang="x-none" sz="1400" dirty="0">
-              <a:latin typeface="JetBrains Mono" panose="02000009000000000000" pitchFamily="49" charset="0"/>
-              <a:cs typeface="JetBrains Mono" panose="02000009000000000000" pitchFamily="49" charset="0"/>
-            </a:endParaRPr>
-          </a:p>
-          <a:p>
-            <a:pPr eaLnBrk="1" hangingPunct="1"/>
-            <a:r>
-              <a:rPr lang="en-GB" altLang="x-none" sz="1400" dirty="0">
-                <a:latin typeface="JetBrains Mono" panose="02000009000000000000" pitchFamily="49" charset="0"/>
-                <a:cs typeface="JetBrains Mono" panose="02000009000000000000" pitchFamily="49" charset="0"/>
-              </a:rPr>
-              <a:t>::another one</a:t>
-            </a:r>
-          </a:p>
-          <a:p>
-            <a:pPr eaLnBrk="1" hangingPunct="1"/>
-            <a:r>
-              <a:rPr lang="en-GB" altLang="x-none" sz="1400" dirty="0">
-                <a:latin typeface="JetBrains Mono" panose="02000009000000000000" pitchFamily="49" charset="0"/>
-                <a:cs typeface="JetBrains Mono" panose="02000009000000000000" pitchFamily="49" charset="0"/>
-              </a:rPr>
-              <a:t>And again. Do you want to go to the [[left]], the [[right]], or [[Bob]]?</a:t>
-            </a:r>
-          </a:p>
-          <a:p>
-            <a:pPr eaLnBrk="1" hangingPunct="1"/>
-            <a:endParaRPr lang="en-GB" altLang="x-none" sz="1400" dirty="0">
-              <a:latin typeface="JetBrains Mono" panose="02000009000000000000" pitchFamily="49" charset="0"/>
-              <a:cs typeface="JetBrains Mono" panose="02000009000000000000" pitchFamily="49" charset="0"/>
-            </a:endParaRPr>
-          </a:p>
-          <a:p>
-            <a:pPr eaLnBrk="1" hangingPunct="1"/>
-            <a:r>
-              <a:rPr lang="en-GB" altLang="x-none" sz="1400" dirty="0">
-                <a:latin typeface="JetBrains Mono" panose="02000009000000000000" pitchFamily="49" charset="0"/>
-                <a:cs typeface="JetBrains Mono" panose="02000009000000000000" pitchFamily="49" charset="0"/>
-              </a:rPr>
-              <a:t>::left</a:t>
-            </a:r>
-          </a:p>
-          <a:p>
-            <a:pPr eaLnBrk="1" hangingPunct="1"/>
-            <a:r>
-              <a:rPr lang="en-GB" altLang="x-none" sz="1400" dirty="0">
-                <a:latin typeface="JetBrains Mono" panose="02000009000000000000" pitchFamily="49" charset="0"/>
-                <a:cs typeface="JetBrains Mono" panose="02000009000000000000" pitchFamily="49" charset="0"/>
-              </a:rPr>
-              <a:t>The path goes to the left, but it leads back to [[Bob]]</a:t>
-            </a:r>
-          </a:p>
-          <a:p>
-            <a:pPr eaLnBrk="1" hangingPunct="1"/>
-            <a:endParaRPr lang="en-GB" altLang="x-none" sz="1400" dirty="0">
-              <a:latin typeface="JetBrains Mono" panose="02000009000000000000" pitchFamily="49" charset="0"/>
-              <a:cs typeface="JetBrains Mono" panose="02000009000000000000" pitchFamily="49" charset="0"/>
-            </a:endParaRPr>
-          </a:p>
-          <a:p>
-            <a:pPr eaLnBrk="1" hangingPunct="1"/>
-            <a:r>
-              <a:rPr lang="en-GB" altLang="x-none" sz="1400" dirty="0">
-                <a:latin typeface="JetBrains Mono" panose="02000009000000000000" pitchFamily="49" charset="0"/>
-                <a:cs typeface="JetBrains Mono" panose="02000009000000000000" pitchFamily="49" charset="0"/>
-              </a:rPr>
-              <a:t>::right </a:t>
-            </a:r>
-          </a:p>
-          <a:p>
-            <a:pPr eaLnBrk="1" hangingPunct="1"/>
-            <a:r>
-              <a:rPr lang="en-GB" altLang="x-none" sz="1400" dirty="0">
-                <a:latin typeface="JetBrains Mono" panose="02000009000000000000" pitchFamily="49" charset="0"/>
-                <a:cs typeface="JetBrains Mono" panose="02000009000000000000" pitchFamily="49" charset="0"/>
-              </a:rPr>
-              <a:t>The path goes to the right but it leads back to [[Bob]]</a:t>
-            </a:r>
-          </a:p>
-          <a:p>
-            <a:pPr eaLnBrk="1" hangingPunct="1"/>
-            <a:endParaRPr lang="en-GB" altLang="x-none" sz="1400" dirty="0">
-              <a:latin typeface="JetBrains Mono" panose="02000009000000000000" pitchFamily="49" charset="0"/>
-              <a:cs typeface="JetBrains Mono" panose="02000009000000000000" pitchFamily="49" charset="0"/>
-            </a:endParaRPr>
-          </a:p>
-          <a:p>
-            <a:pPr eaLnBrk="1" hangingPunct="1"/>
-            <a:r>
-              <a:rPr lang="en-GB" altLang="x-none" sz="1400" dirty="0">
-                <a:latin typeface="JetBrains Mono" panose="02000009000000000000" pitchFamily="49" charset="0"/>
-                <a:cs typeface="JetBrains Mono" panose="02000009000000000000" pitchFamily="49" charset="0"/>
-              </a:rPr>
-              <a:t>:: Bob</a:t>
-            </a:r>
-          </a:p>
-          <a:p>
-            <a:pPr eaLnBrk="1" hangingPunct="1"/>
-            <a:r>
-              <a:rPr lang="en-GB" altLang="x-none" sz="1400" dirty="0">
-                <a:latin typeface="JetBrains Mono" panose="02000009000000000000" pitchFamily="49" charset="0"/>
-                <a:cs typeface="JetBrains Mono" panose="02000009000000000000" pitchFamily="49" charset="0"/>
-              </a:rPr>
-              <a:t>{</a:t>
-            </a:r>
-            <a:r>
-              <a:rPr lang="en-GB" altLang="x-none" sz="1400" dirty="0" err="1">
-                <a:latin typeface="JetBrains Mono" panose="02000009000000000000" pitchFamily="49" charset="0"/>
-                <a:cs typeface="JetBrains Mono" panose="02000009000000000000" pitchFamily="49" charset="0"/>
-              </a:rPr>
-              <a:t>if:pAny</a:t>
-            </a:r>
-            <a:r>
-              <a:rPr lang="en-GB" altLang="x-none" sz="1400" dirty="0">
-                <a:latin typeface="JetBrains Mono" panose="02000009000000000000" pitchFamily="49" charset="0"/>
-                <a:cs typeface="JetBrains Mono" panose="02000009000000000000" pitchFamily="49" charset="0"/>
-              </a:rPr>
-              <a:t>(“</a:t>
-            </a:r>
-            <a:r>
-              <a:rPr lang="en-GB" altLang="x-none" sz="1400" dirty="0" err="1">
-                <a:latin typeface="JetBrains Mono" panose="02000009000000000000" pitchFamily="49" charset="0"/>
-                <a:cs typeface="JetBrains Mono" panose="02000009000000000000" pitchFamily="49" charset="0"/>
-              </a:rPr>
-              <a:t>left”,”right</a:t>
-            </a:r>
-            <a:r>
-              <a:rPr lang="en-GB" altLang="x-none" sz="1400" dirty="0">
-                <a:latin typeface="JetBrains Mono" panose="02000009000000000000" pitchFamily="49" charset="0"/>
-                <a:cs typeface="JetBrains Mono" panose="02000009000000000000" pitchFamily="49" charset="0"/>
-              </a:rPr>
-              <a:t>”)}{You tried to avoid it, but }Bob always arrives.</a:t>
-            </a:r>
           </a:p>
         </p:txBody>
       </p:sp>
@@ -5907,6 +5655,15 @@
 </file>
 
 <file path=customXml/item1.xml><?xml version="1.0" encoding="utf-8"?>
+<?mso-contentType ?>
+<FormTemplates xmlns="http://schemas.microsoft.com/sharepoint/v3/contenttype/forms">
+  <Display>DocumentLibraryForm</Display>
+  <Edit>DocumentLibraryForm</Edit>
+  <New>DocumentLibraryForm</New>
+</FormTemplates>
+</file>
+
+<file path=customXml/item2.xml><?xml version="1.0" encoding="utf-8"?>
 <ct:contentTypeSchema xmlns:ct="http://schemas.microsoft.com/office/2006/metadata/contentType" xmlns:ma="http://schemas.microsoft.com/office/2006/metadata/properties/metaAttributes" ct:_="" ma:_="" ma:contentTypeName="Document" ma:contentTypeID="0x01010097D40E6585C8784EB4F7A91A219ECB38" ma:contentTypeVersion="0" ma:contentTypeDescription="Create a new document." ma:contentTypeScope="" ma:versionID="225f1df7c0d1d866e72199d38b91779e">
   <xsd:schema xmlns:xsd="http://www.w3.org/2001/XMLSchema" xmlns:p="http://schemas.microsoft.com/office/2006/metadata/properties" targetNamespace="http://schemas.microsoft.com/office/2006/metadata/properties" ma:root="true" ma:fieldsID="4aeb20c0e3442673af7ee10786458764">
     <xsd:element name="properties">
@@ -5955,16 +5712,15 @@
 </ct:contentTypeSchema>
 </file>
 
-<file path=customXml/item2.xml><?xml version="1.0" encoding="utf-8"?>
-<?mso-contentType ?>
-<FormTemplates xmlns="http://schemas.microsoft.com/sharepoint/v3/contenttype/forms">
-  <Display>DocumentLibraryForm</Display>
-  <Edit>DocumentLibraryForm</Edit>
-  <New>DocumentLibraryForm</New>
-</FormTemplates>
+<file path=customXml/itemProps1.xml><?xml version="1.0" encoding="utf-8"?>
+<ds:datastoreItem xmlns:ds="http://schemas.openxmlformats.org/officeDocument/2006/customXml" ds:itemID="{54D0D3C5-34E4-4C50-AEF0-1975AC22AD53}">
+  <ds:schemaRefs>
+    <ds:schemaRef ds:uri="http://schemas.microsoft.com/sharepoint/v3/contenttype/forms"/>
+  </ds:schemaRefs>
+</ds:datastoreItem>
 </file>
 
-<file path=customXml/itemProps1.xml><?xml version="1.0" encoding="utf-8"?>
+<file path=customXml/itemProps2.xml><?xml version="1.0" encoding="utf-8"?>
 <ds:datastoreItem xmlns:ds="http://schemas.openxmlformats.org/officeDocument/2006/customXml" ds:itemID="{069E428E-B4E8-4A06-9EB6-04820EC0F3C0}">
   <ds:schemaRefs>
     <ds:schemaRef ds:uri="http://schemas.microsoft.com/office/2006/metadata/contentType"/>
@@ -5977,12 +5733,4 @@
     <ds:schemaRef ds:uri="http://schemas.microsoft.com/office/internal/2005/internalDocumentation"/>
   </ds:schemaRefs>
 </ds:datastoreItem>
-</file>
-
-<file path=customXml/itemProps2.xml><?xml version="1.0" encoding="utf-8"?>
-<ds:datastoreItem xmlns:ds="http://schemas.openxmlformats.org/officeDocument/2006/customXml" ds:itemID="{54D0D3C5-34E4-4C50-AEF0-1975AC22AD53}">
-  <ds:schemaRefs>
-    <ds:schemaRef ds:uri="http://schemas.microsoft.com/sharepoint/v3/contenttype/forms"/>
-  </ds:schemaRefs>
-</ds:datastoreItem>
 </file>
</xml_diff>

<commit_message>
okay something weird happened with the poster's versioning or something. either way, this is the poster.
</commit_message>
<xml_diff>
--- a/Reports n such/Rachel Lowe CE301 Poster HECC-IT.pptx
+++ b/Reports n such/Rachel Lowe CE301 Poster HECC-IT.pptx
@@ -2,10 +2,10 @@
 <file path=ppt/presentation.xml><?xml version="1.0" encoding="utf-8"?>
 <p:presentation xmlns:a="http://schemas.openxmlformats.org/drawingml/2006/main" xmlns:r="http://schemas.openxmlformats.org/officeDocument/2006/relationships" xmlns:p="http://schemas.openxmlformats.org/presentationml/2006/main" saveSubsetFonts="1">
   <p:sldMasterIdLst>
-    <p:sldMasterId id="2147483648" r:id="rId3"/>
+    <p:sldMasterId id="2147483648" r:id="rId4"/>
   </p:sldMasterIdLst>
   <p:sldIdLst>
-    <p:sldId id="256" r:id="rId4"/>
+    <p:sldId id="256" r:id="rId5"/>
   </p:sldIdLst>
   <p:sldSz cx="15122525" cy="10693400"/>
   <p:notesSz cx="20929600" cy="29819600"/>
@@ -145,86 +145,9 @@
 <file path=ppt/revisionInfo.xml><?xml version="1.0" encoding="utf-8"?>
 <p1510:revInfo xmlns:a="http://schemas.openxmlformats.org/drawingml/2006/main" xmlns:r="http://schemas.openxmlformats.org/officeDocument/2006/relationships" xmlns:p1510="http://schemas.microsoft.com/office/powerpoint/2015/10/main">
   <p1510:revLst>
-    <p1510:client id="{B4A2923A-A41E-41B1-8205-9174AEB93B8F}" v="9" dt="2021-03-09T17:53:28.291"/>
+    <p1510:client id="{4881BF7A-C557-4AC6-BC62-6D784D4BF871}" v="12" dt="2021-03-10T00:18:04.226"/>
   </p1510:revLst>
 </p1510:revInfo>
-</file>
-
-<file path=ppt/changesInfos/changesInfo1.xml><?xml version="1.0" encoding="utf-8"?>
-<pc:chgInfo xmlns:a="http://schemas.openxmlformats.org/drawingml/2006/main" xmlns:r="http://schemas.openxmlformats.org/officeDocument/2006/relationships" xmlns:ac="http://schemas.microsoft.com/office/drawing/2013/main/command" xmlns:pc="http://schemas.microsoft.com/office/powerpoint/2013/main/command">
-  <pc:docChgLst>
-    <pc:chgData name="Lowe, Rachel M" userId="93b75d29-27f6-4dab-b540-bade7f33a1ad" providerId="ADAL" clId="{B4A2923A-A41E-41B1-8205-9174AEB93B8F}"/>
-    <pc:docChg chg="undo custSel modSld">
-      <pc:chgData name="Lowe, Rachel M" userId="93b75d29-27f6-4dab-b540-bade7f33a1ad" providerId="ADAL" clId="{B4A2923A-A41E-41B1-8205-9174AEB93B8F}" dt="2021-03-09T17:56:00.992" v="4391" actId="20577"/>
-      <pc:docMkLst>
-        <pc:docMk/>
-      </pc:docMkLst>
-      <pc:sldChg chg="modSp mod">
-        <pc:chgData name="Lowe, Rachel M" userId="93b75d29-27f6-4dab-b540-bade7f33a1ad" providerId="ADAL" clId="{B4A2923A-A41E-41B1-8205-9174AEB93B8F}" dt="2021-03-09T17:56:00.992" v="4391" actId="20577"/>
-        <pc:sldMkLst>
-          <pc:docMk/>
-          <pc:sldMk cId="0" sldId="256"/>
-        </pc:sldMkLst>
-        <pc:spChg chg="mod">
-          <ac:chgData name="Lowe, Rachel M" userId="93b75d29-27f6-4dab-b540-bade7f33a1ad" providerId="ADAL" clId="{B4A2923A-A41E-41B1-8205-9174AEB93B8F}" dt="2021-03-09T17:56:00.992" v="4391" actId="20577"/>
-          <ac:spMkLst>
-            <pc:docMk/>
-            <pc:sldMk cId="0" sldId="256"/>
-            <ac:spMk id="2055" creationId="{00000000-0000-0000-0000-000000000000}"/>
-          </ac:spMkLst>
-        </pc:spChg>
-        <pc:spChg chg="mod">
-          <ac:chgData name="Lowe, Rachel M" userId="93b75d29-27f6-4dab-b540-bade7f33a1ad" providerId="ADAL" clId="{B4A2923A-A41E-41B1-8205-9174AEB93B8F}" dt="2021-03-09T17:09:04.197" v="2902" actId="20577"/>
-          <ac:spMkLst>
-            <pc:docMk/>
-            <pc:sldMk cId="0" sldId="256"/>
-            <ac:spMk id="2058" creationId="{00000000-0000-0000-0000-000000000000}"/>
-          </ac:spMkLst>
-        </pc:spChg>
-      </pc:sldChg>
-    </pc:docChg>
-  </pc:docChgLst>
-  <pc:docChgLst>
-    <pc:chgData name="Lowe, Rachel M" userId="93b75d29-27f6-4dab-b540-bade7f33a1ad" providerId="ADAL" clId="{998C92A1-9CF6-401F-B1ED-AD7ABA78333D}"/>
-    <pc:docChg chg="custSel modSld">
-      <pc:chgData name="Lowe, Rachel M" userId="93b75d29-27f6-4dab-b540-bade7f33a1ad" providerId="ADAL" clId="{998C92A1-9CF6-401F-B1ED-AD7ABA78333D}" dt="2021-02-25T15:29:43.672" v="82" actId="2711"/>
-      <pc:docMkLst>
-        <pc:docMk/>
-      </pc:docMkLst>
-      <pc:sldChg chg="delSp modSp mod">
-        <pc:chgData name="Lowe, Rachel M" userId="93b75d29-27f6-4dab-b540-bade7f33a1ad" providerId="ADAL" clId="{998C92A1-9CF6-401F-B1ED-AD7ABA78333D}" dt="2021-02-25T15:29:43.672" v="82" actId="2711"/>
-        <pc:sldMkLst>
-          <pc:docMk/>
-          <pc:sldMk cId="0" sldId="256"/>
-        </pc:sldMkLst>
-        <pc:spChg chg="mod">
-          <ac:chgData name="Lowe, Rachel M" userId="93b75d29-27f6-4dab-b540-bade7f33a1ad" providerId="ADAL" clId="{998C92A1-9CF6-401F-B1ED-AD7ABA78333D}" dt="2021-02-25T15:19:59.323" v="44" actId="20577"/>
-          <ac:spMkLst>
-            <pc:docMk/>
-            <pc:sldMk cId="0" sldId="256"/>
-            <ac:spMk id="2054" creationId="{00000000-0000-0000-0000-000000000000}"/>
-          </ac:spMkLst>
-        </pc:spChg>
-        <pc:spChg chg="mod">
-          <ac:chgData name="Lowe, Rachel M" userId="93b75d29-27f6-4dab-b540-bade7f33a1ad" providerId="ADAL" clId="{998C92A1-9CF6-401F-B1ED-AD7ABA78333D}" dt="2021-02-25T15:29:43.672" v="82" actId="2711"/>
-          <ac:spMkLst>
-            <pc:docMk/>
-            <pc:sldMk cId="0" sldId="256"/>
-            <ac:spMk id="2059" creationId="{00000000-0000-0000-0000-000000000000}"/>
-          </ac:spMkLst>
-        </pc:spChg>
-        <pc:graphicFrameChg chg="del">
-          <ac:chgData name="Lowe, Rachel M" userId="93b75d29-27f6-4dab-b540-bade7f33a1ad" providerId="ADAL" clId="{998C92A1-9CF6-401F-B1ED-AD7ABA78333D}" dt="2021-02-25T15:20:10.781" v="45" actId="478"/>
-          <ac:graphicFrameMkLst>
-            <pc:docMk/>
-            <pc:sldMk cId="0" sldId="256"/>
-            <ac:graphicFrameMk id="17" creationId="{00000000-0000-0000-0000-000000000000}"/>
-          </ac:graphicFrameMkLst>
-        </pc:graphicFrameChg>
-      </pc:sldChg>
-    </pc:docChg>
-  </pc:docChgLst>
-</pc:chgInfo>
 </file>
 
 <file path=ppt/slideLayouts/slideLayout1.xml><?xml version="1.0" encoding="utf-8"?>
@@ -2816,7 +2739,7 @@
               </a14:hiddenLine>
             </a:ext>
             <a:ext uri="{FAA26D3D-D897-4be2-8F04-BA451C77F1D7}">
-              <ma14:placeholderFlag xmlns="" xmlns:ma14="http://schemas.microsoft.com/office/mac/drawingml/2011/main" val="1"/>
+              <ma14:placeholderFlag xmlns:ma14="http://schemas.microsoft.com/office/mac/drawingml/2011/main" xmlns="" val="1"/>
             </a:ext>
           </a:extLst>
         </p:spPr>
@@ -2877,7 +2800,7 @@
               </a14:hiddenLine>
             </a:ext>
             <a:ext uri="{FAA26D3D-D897-4be2-8F04-BA451C77F1D7}">
-              <ma14:placeholderFlag xmlns="" xmlns:ma14="http://schemas.microsoft.com/office/mac/drawingml/2011/main" val="1"/>
+              <ma14:placeholderFlag xmlns:ma14="http://schemas.microsoft.com/office/mac/drawingml/2011/main" xmlns="" val="1"/>
             </a:ext>
           </a:extLst>
         </p:spPr>
@@ -4057,7 +3980,7 @@
                 <a:latin typeface="JetBrains Mono" panose="02000009000000000000" pitchFamily="49" charset="0"/>
                 <a:cs typeface="JetBrains Mono" panose="02000009000000000000" pitchFamily="49" charset="0"/>
               </a:rPr>
-              <a:t>is the hypertext game authoring tool designed for indecisive people.</a:t>
+              <a:t>is the hypertext game authoring tool made for indecisive people.</a:t>
             </a:r>
           </a:p>
           <a:p>
@@ -4375,7 +4298,74 @@
           </a:lstStyle>
           <a:p>
             <a:pPr eaLnBrk="1" hangingPunct="1"/>
-            <a:endParaRPr lang="x-none" altLang="x-none" sz="2000" dirty="0"/>
+            <a:r>
+              <a:rPr lang="en-GB" altLang="x-none" sz="2400" b="1" dirty="0">
+                <a:latin typeface="Arial Rounded MT Bold" panose="020F0704030504030204" pitchFamily="34" charset="0"/>
+              </a:rPr>
+              <a:t>HOW DOES IT WORK?</a:t>
+            </a:r>
+          </a:p>
+          <a:p>
+            <a:pPr eaLnBrk="1" hangingPunct="1"/>
+            <a:r>
+              <a:rPr lang="en-GB" altLang="x-none" sz="1400" b="1" dirty="0">
+                <a:latin typeface="JetBrains Mono" panose="02000009000000000000" pitchFamily="49" charset="0"/>
+                <a:cs typeface="JetBrains Mono" panose="02000009000000000000" pitchFamily="49" charset="0"/>
+              </a:rPr>
+              <a:t>HECC-IT</a:t>
+            </a:r>
+            <a:r>
+              <a:rPr lang="en-GB" altLang="x-none" sz="1400" dirty="0">
+                <a:latin typeface="JetBrains Mono" panose="02000009000000000000" pitchFamily="49" charset="0"/>
+                <a:cs typeface="JetBrains Mono" panose="02000009000000000000" pitchFamily="49" charset="0"/>
+              </a:rPr>
+              <a:t> is a toolkit, within a single executable.</a:t>
+            </a:r>
+          </a:p>
+          <a:p>
+            <a:pPr eaLnBrk="1" hangingPunct="1"/>
+            <a:endParaRPr lang="en-GB" altLang="x-none" sz="1400" dirty="0">
+              <a:latin typeface="JetBrains Mono" panose="02000009000000000000" pitchFamily="49" charset="0"/>
+              <a:cs typeface="JetBrains Mono" panose="02000009000000000000" pitchFamily="49" charset="0"/>
+            </a:endParaRPr>
+          </a:p>
+          <a:p>
+            <a:pPr eaLnBrk="1" hangingPunct="1"/>
+            <a:r>
+              <a:rPr lang="en-GB" altLang="x-none" sz="1400" dirty="0">
+                <a:latin typeface="JetBrains Mono" panose="02000009000000000000" pitchFamily="49" charset="0"/>
+                <a:cs typeface="JetBrains Mono" panose="02000009000000000000" pitchFamily="49" charset="0"/>
+              </a:rPr>
+              <a:t>Users open the executable, pick an existing .hecc file (or make one), and is then given the choice to export it now or keep editing it (and export later).</a:t>
+            </a:r>
+          </a:p>
+          <a:p>
+            <a:pPr eaLnBrk="1" hangingPunct="1"/>
+            <a:endParaRPr lang="en-GB" altLang="x-none" sz="1400" dirty="0">
+              <a:latin typeface="JetBrains Mono" panose="02000009000000000000" pitchFamily="49" charset="0"/>
+              <a:cs typeface="JetBrains Mono" panose="02000009000000000000" pitchFamily="49" charset="0"/>
+            </a:endParaRPr>
+          </a:p>
+          <a:p>
+            <a:pPr eaLnBrk="1" hangingPunct="1"/>
+            <a:r>
+              <a:rPr lang="en-GB" altLang="x-none" sz="1400" dirty="0">
+                <a:latin typeface="JetBrains Mono" panose="02000009000000000000" pitchFamily="49" charset="0"/>
+                <a:cs typeface="JetBrains Mono" panose="02000009000000000000" pitchFamily="49" charset="0"/>
+              </a:rPr>
+              <a:t>Once exported, users can just open the index.html page, and they can play </a:t>
+            </a:r>
+            <a:r>
+              <a:rPr lang="en-GB" altLang="x-none" sz="1400">
+                <a:latin typeface="JetBrains Mono" panose="02000009000000000000" pitchFamily="49" charset="0"/>
+                <a:cs typeface="JetBrains Mono" panose="02000009000000000000" pitchFamily="49" charset="0"/>
+              </a:rPr>
+              <a:t>their game!</a:t>
+            </a:r>
+            <a:endParaRPr lang="en-GB" altLang="x-none" sz="2000" dirty="0">
+              <a:latin typeface="JetBrains Mono" panose="02000009000000000000" pitchFamily="49" charset="0"/>
+              <a:cs typeface="JetBrains Mono" panose="02000009000000000000" pitchFamily="49" charset="0"/>
+            </a:endParaRPr>
           </a:p>
         </p:txBody>
       </p:sp>
@@ -4509,7 +4499,7 @@
           </a:lstStyle>
           <a:p>
             <a:pPr eaLnBrk="1" hangingPunct="1"/>
-            <a:endParaRPr lang="x-none" altLang="x-none" sz="2000"/>
+            <a:endParaRPr lang="x-none" altLang="x-none" sz="2000" dirty="0"/>
           </a:p>
         </p:txBody>
       </p:sp>
@@ -4523,8 +4513,8 @@
         </p:nvSpPr>
         <p:spPr bwMode="auto">
           <a:xfrm>
-            <a:off x="11396663" y="2382838"/>
-            <a:ext cx="3540125" cy="7953375"/>
+            <a:off x="11396663" y="5064483"/>
+            <a:ext cx="3540125" cy="2226434"/>
           </a:xfrm>
           <a:prstGeom prst="rect">
             <a:avLst/>
@@ -4643,11 +4633,84 @@
           </a:lstStyle>
           <a:p>
             <a:pPr eaLnBrk="1" hangingPunct="1"/>
+            <a:r>
+              <a:rPr lang="en-GB" altLang="x-none" sz="1400" dirty="0">
+                <a:latin typeface="JetBrains Mono" panose="02000009000000000000" pitchFamily="49" charset="0"/>
+                <a:cs typeface="JetBrains Mono" panose="02000009000000000000" pitchFamily="49" charset="0"/>
+              </a:rPr>
+              <a:t>Above: A screenshot of </a:t>
+            </a:r>
+            <a:r>
+              <a:rPr lang="en-GB" altLang="x-none" sz="1400" b="1" dirty="0">
+                <a:latin typeface="JetBrains Mono" panose="02000009000000000000" pitchFamily="49" charset="0"/>
+                <a:cs typeface="JetBrains Mono" panose="02000009000000000000" pitchFamily="49" charset="0"/>
+              </a:rPr>
+              <a:t>OH-HECC</a:t>
+            </a:r>
+            <a:r>
+              <a:rPr lang="en-GB" altLang="x-none" sz="1400" dirty="0">
+                <a:latin typeface="JetBrains Mono" panose="02000009000000000000" pitchFamily="49" charset="0"/>
+                <a:cs typeface="JetBrains Mono" panose="02000009000000000000" pitchFamily="49" charset="0"/>
+              </a:rPr>
+              <a:t> (</a:t>
+            </a:r>
+            <a:r>
+              <a:rPr lang="en-GB" altLang="x-none" sz="1400" i="1" dirty="0">
+                <a:latin typeface="JetBrains Mono" panose="02000009000000000000" pitchFamily="49" charset="0"/>
+                <a:cs typeface="JetBrains Mono" panose="02000009000000000000" pitchFamily="49" charset="0"/>
+              </a:rPr>
+              <a:t>Optional Help for HECC</a:t>
+            </a:r>
+            <a:r>
+              <a:rPr lang="en-GB" altLang="x-none" sz="1400" dirty="0">
+                <a:latin typeface="JetBrains Mono" panose="02000009000000000000" pitchFamily="49" charset="0"/>
+                <a:cs typeface="JetBrains Mono" panose="02000009000000000000" pitchFamily="49" charset="0"/>
+              </a:rPr>
+              <a:t>; the editing GUI) showing the network of passages for an example game.</a:t>
+            </a:r>
+          </a:p>
+          <a:p>
+            <a:pPr eaLnBrk="1" hangingPunct="1"/>
             <a:endParaRPr lang="en-GB" altLang="x-none" sz="1400" dirty="0">
               <a:latin typeface="JetBrains Mono" panose="02000009000000000000" pitchFamily="49" charset="0"/>
               <a:cs typeface="JetBrains Mono" panose="02000009000000000000" pitchFamily="49" charset="0"/>
             </a:endParaRPr>
           </a:p>
+          <a:p>
+            <a:pPr eaLnBrk="1" hangingPunct="1"/>
+            <a:r>
+              <a:rPr lang="en-GB" altLang="x-none" sz="1400" dirty="0">
+                <a:latin typeface="JetBrains Mono" panose="02000009000000000000" pitchFamily="49" charset="0"/>
+                <a:cs typeface="JetBrains Mono" panose="02000009000000000000" pitchFamily="49" charset="0"/>
+              </a:rPr>
+              <a:t>Below: A screenshot of the start passage for that game after exporting it via </a:t>
+            </a:r>
+            <a:r>
+              <a:rPr lang="en-GB" altLang="x-none" sz="1400" b="1" dirty="0">
+                <a:latin typeface="JetBrains Mono" panose="02000009000000000000" pitchFamily="49" charset="0"/>
+                <a:cs typeface="JetBrains Mono" panose="02000009000000000000" pitchFamily="49" charset="0"/>
+              </a:rPr>
+              <a:t>HECC-UP</a:t>
+            </a:r>
+            <a:r>
+              <a:rPr lang="en-GB" altLang="x-none" sz="1400" dirty="0">
+                <a:latin typeface="JetBrains Mono" panose="02000009000000000000" pitchFamily="49" charset="0"/>
+                <a:cs typeface="JetBrains Mono" panose="02000009000000000000" pitchFamily="49" charset="0"/>
+              </a:rPr>
+              <a:t> </a:t>
+            </a:r>
+            <a:r>
+              <a:rPr lang="en-GB" altLang="x-none" sz="1400" i="1" dirty="0">
+                <a:latin typeface="JetBrains Mono" panose="02000009000000000000" pitchFamily="49" charset="0"/>
+                <a:cs typeface="JetBrains Mono" panose="02000009000000000000" pitchFamily="49" charset="0"/>
+              </a:rPr>
+              <a:t>(HECC Ultra Parser)</a:t>
+            </a:r>
+            <a:endParaRPr lang="en-GB" altLang="x-none" sz="1400" dirty="0">
+              <a:latin typeface="JetBrains Mono" panose="02000009000000000000" pitchFamily="49" charset="0"/>
+              <a:cs typeface="JetBrains Mono" panose="02000009000000000000" pitchFamily="49" charset="0"/>
+            </a:endParaRPr>
+          </a:p>
         </p:txBody>
       </p:sp>
       <p:sp>
@@ -4661,7 +4724,7 @@
         <p:spPr bwMode="auto">
           <a:xfrm>
             <a:off x="4989513" y="346075"/>
-            <a:ext cx="5286375" cy="984885"/>
+            <a:ext cx="5286375" cy="1000274"/>
           </a:xfrm>
           <a:prstGeom prst="rect">
             <a:avLst/>
@@ -4802,7 +4865,7 @@
           <a:p>
             <a:pPr algn="ctr" eaLnBrk="1" hangingPunct="1"/>
             <a:r>
-              <a:rPr lang="en-US" altLang="x-none" b="1" dirty="0">
+              <a:rPr lang="en-US" altLang="x-none" sz="3000" b="1" dirty="0">
                 <a:latin typeface="Arial Rounded MT Bold" panose="020F0704030504030204" pitchFamily="34" charset="0"/>
               </a:rPr>
               <a:t>HECC-IT!</a:t>
@@ -4810,6 +4873,171 @@
           </a:p>
         </p:txBody>
       </p:sp>
+      <p:pic>
+        <p:nvPicPr>
+          <p:cNvPr id="6" name="Picture 5">
+            <a:extLst>
+              <a:ext uri="{FF2B5EF4-FFF2-40B4-BE49-F238E27FC236}">
+                <a16:creationId xmlns:a16="http://schemas.microsoft.com/office/drawing/2014/main" id="{82ABEAE3-C386-475A-838C-FD7554010056}"/>
+              </a:ext>
+            </a:extLst>
+          </p:cNvPr>
+          <p:cNvPicPr>
+            <a:picLocks noChangeAspect="1"/>
+          </p:cNvPicPr>
+          <p:nvPr/>
+        </p:nvPicPr>
+        <p:blipFill>
+          <a:blip r:embed="rId4"/>
+          <a:stretch>
+            <a:fillRect/>
+          </a:stretch>
+        </p:blipFill>
+        <p:spPr>
+          <a:xfrm>
+            <a:off x="11105557" y="2391923"/>
+            <a:ext cx="4122336" cy="2643596"/>
+          </a:xfrm>
+          <a:prstGeom prst="rect">
+            <a:avLst/>
+          </a:prstGeom>
+        </p:spPr>
+      </p:pic>
+      <p:pic>
+        <p:nvPicPr>
+          <p:cNvPr id="7" name="Picture 6">
+            <a:extLst>
+              <a:ext uri="{FF2B5EF4-FFF2-40B4-BE49-F238E27FC236}">
+                <a16:creationId xmlns:a16="http://schemas.microsoft.com/office/drawing/2014/main" id="{7AF6AACF-097D-4766-8A86-CD34ABAC8EBB}"/>
+              </a:ext>
+            </a:extLst>
+          </p:cNvPr>
+          <p:cNvPicPr>
+            <a:picLocks noChangeAspect="1"/>
+          </p:cNvPicPr>
+          <p:nvPr/>
+        </p:nvPicPr>
+        <p:blipFill>
+          <a:blip r:embed="rId5"/>
+          <a:stretch>
+            <a:fillRect/>
+          </a:stretch>
+        </p:blipFill>
+        <p:spPr>
+          <a:xfrm>
+            <a:off x="11396663" y="7320058"/>
+            <a:ext cx="3540125" cy="1569829"/>
+          </a:xfrm>
+          <a:prstGeom prst="rect">
+            <a:avLst/>
+          </a:prstGeom>
+        </p:spPr>
+      </p:pic>
+      <p:pic>
+        <p:nvPicPr>
+          <p:cNvPr id="9" name="Picture 8">
+            <a:extLst>
+              <a:ext uri="{FF2B5EF4-FFF2-40B4-BE49-F238E27FC236}">
+                <a16:creationId xmlns:a16="http://schemas.microsoft.com/office/drawing/2014/main" id="{0667EB7A-ED59-4205-A92D-0DBE92B30D17}"/>
+              </a:ext>
+            </a:extLst>
+          </p:cNvPr>
+          <p:cNvPicPr>
+            <a:picLocks noChangeAspect="1"/>
+          </p:cNvPicPr>
+          <p:nvPr/>
+        </p:nvPicPr>
+        <p:blipFill rotWithShape="1">
+          <a:blip r:embed="rId6">
+            <a:extLst>
+              <a:ext uri="{28A0092B-C50C-407E-A947-70E740481C1C}">
+                <a14:useLocalDpi xmlns:a14="http://schemas.microsoft.com/office/drawing/2010/main" val="0"/>
+              </a:ext>
+            </a:extLst>
+          </a:blip>
+          <a:srcRect l="10069" t="5952" r="10311" b="4884"/>
+          <a:stretch/>
+        </p:blipFill>
+        <p:spPr>
+          <a:xfrm>
+            <a:off x="-2953586" y="846212"/>
+            <a:ext cx="2366604" cy="5300695"/>
+          </a:xfrm>
+          <a:prstGeom prst="rect">
+            <a:avLst/>
+          </a:prstGeom>
+        </p:spPr>
+      </p:pic>
+      <p:pic>
+        <p:nvPicPr>
+          <p:cNvPr id="11" name="Picture 10">
+            <a:extLst>
+              <a:ext uri="{FF2B5EF4-FFF2-40B4-BE49-F238E27FC236}">
+                <a16:creationId xmlns:a16="http://schemas.microsoft.com/office/drawing/2014/main" id="{89DFD54A-10E2-424A-9BBE-FFC3EF52FDF1}"/>
+              </a:ext>
+            </a:extLst>
+          </p:cNvPr>
+          <p:cNvPicPr>
+            <a:picLocks noChangeAspect="1"/>
+          </p:cNvPicPr>
+          <p:nvPr/>
+        </p:nvPicPr>
+        <p:blipFill rotWithShape="1">
+          <a:blip r:embed="rId7">
+            <a:extLst>
+              <a:ext uri="{28A0092B-C50C-407E-A947-70E740481C1C}">
+                <a14:useLocalDpi xmlns:a14="http://schemas.microsoft.com/office/drawing/2010/main" val="0"/>
+              </a:ext>
+            </a:extLst>
+          </a:blip>
+          <a:srcRect l="6229" t="4404" r="8127" b="5035"/>
+          <a:stretch/>
+        </p:blipFill>
+        <p:spPr>
+          <a:xfrm>
+            <a:off x="-6912346" y="7259156"/>
+            <a:ext cx="3554057" cy="5010797"/>
+          </a:xfrm>
+          <a:prstGeom prst="rect">
+            <a:avLst/>
+          </a:prstGeom>
+        </p:spPr>
+      </p:pic>
+      <p:pic>
+        <p:nvPicPr>
+          <p:cNvPr id="15" name="Picture 14">
+            <a:extLst>
+              <a:ext uri="{FF2B5EF4-FFF2-40B4-BE49-F238E27FC236}">
+                <a16:creationId xmlns:a16="http://schemas.microsoft.com/office/drawing/2014/main" id="{1796DB94-FBA4-4119-9E52-EE4F6033F20E}"/>
+              </a:ext>
+            </a:extLst>
+          </p:cNvPr>
+          <p:cNvPicPr>
+            <a:picLocks noChangeAspect="1"/>
+          </p:cNvPicPr>
+          <p:nvPr/>
+        </p:nvPicPr>
+        <p:blipFill rotWithShape="1">
+          <a:blip r:embed="rId8">
+            <a:extLst>
+              <a:ext uri="{28A0092B-C50C-407E-A947-70E740481C1C}">
+                <a14:useLocalDpi xmlns:a14="http://schemas.microsoft.com/office/drawing/2010/main" val="0"/>
+              </a:ext>
+            </a:extLst>
+          </a:blip>
+          <a:srcRect l="7148" t="4059" r="7175" b="5172"/>
+          <a:stretch/>
+        </p:blipFill>
+        <p:spPr>
+          <a:xfrm>
+            <a:off x="3944939" y="5346700"/>
+            <a:ext cx="3540126" cy="5000625"/>
+          </a:xfrm>
+          <a:prstGeom prst="rect">
+            <a:avLst/>
+          </a:prstGeom>
+        </p:spPr>
+      </p:pic>
     </p:spTree>
   </p:cSld>
   <p:clrMapOvr>
@@ -5662,21 +5890,136 @@
 </file>
 
 <file path=customXml/item1.xml><?xml version="1.0" encoding="utf-8"?>
-<ct:contentTypeSchema xmlns:ct="http://schemas.microsoft.com/office/2006/metadata/contentType" xmlns:ma="http://schemas.microsoft.com/office/2006/metadata/properties/metaAttributes" ct:_="" ma:_="" ma:contentTypeName="Document" ma:contentTypeID="0x01010097D40E6585C8784EB4F7A91A219ECB38" ma:contentTypeVersion="0" ma:contentTypeDescription="Create a new document." ma:contentTypeScope="" ma:versionID="225f1df7c0d1d866e72199d38b91779e">
-  <xsd:schema xmlns:xsd="http://www.w3.org/2001/XMLSchema" xmlns:p="http://schemas.microsoft.com/office/2006/metadata/properties" targetNamespace="http://schemas.microsoft.com/office/2006/metadata/properties" ma:root="true" ma:fieldsID="4aeb20c0e3442673af7ee10786458764">
+<p:properties xmlns:p="http://schemas.microsoft.com/office/2006/metadata/properties" xmlns:xsi="http://www.w3.org/2001/XMLSchema-instance" xmlns:pc="http://schemas.microsoft.com/office/infopath/2007/PartnerControls">
+  <documentManagement/>
+</p:properties>
+</file>
+
+<file path=customXml/item2.xml><?xml version="1.0" encoding="utf-8"?>
+<ct:contentTypeSchema xmlns:ct="http://schemas.microsoft.com/office/2006/metadata/contentType" xmlns:ma="http://schemas.microsoft.com/office/2006/metadata/properties/metaAttributes" ct:_="" ma:_="" ma:contentTypeName="Document" ma:contentTypeID="0x0101009F5618C6EA47144F98176975A51512E3" ma:contentTypeVersion="13" ma:contentTypeDescription="Create a new document." ma:contentTypeScope="" ma:versionID="ae9ce622c04d7ebad9410625498d08ea">
+  <xsd:schema xmlns:xsd="http://www.w3.org/2001/XMLSchema" xmlns:xs="http://www.w3.org/2001/XMLSchema" xmlns:p="http://schemas.microsoft.com/office/2006/metadata/properties" xmlns:ns3="a9644998-0f43-4a12-9bff-883b17382285" xmlns:ns4="378297c8-0ee1-4ccb-95ba-390b2a98be1e" targetNamespace="http://schemas.microsoft.com/office/2006/metadata/properties" ma:root="true" ma:fieldsID="c7ff2d01485aa5870645acc7afabfd5d" ns3:_="" ns4:_="">
+    <xsd:import namespace="a9644998-0f43-4a12-9bff-883b17382285"/>
+    <xsd:import namespace="378297c8-0ee1-4ccb-95ba-390b2a98be1e"/>
     <xsd:element name="properties">
       <xsd:complexType>
         <xsd:sequence>
           <xsd:element name="documentManagement">
             <xsd:complexType>
-              <xsd:all/>
+              <xsd:all>
+                <xsd:element ref="ns3:MediaServiceMetadata" minOccurs="0"/>
+                <xsd:element ref="ns3:MediaServiceFastMetadata" minOccurs="0"/>
+                <xsd:element ref="ns3:MediaServiceAutoTags" minOccurs="0"/>
+                <xsd:element ref="ns3:MediaServiceOCR" minOccurs="0"/>
+                <xsd:element ref="ns4:SharedWithUsers" minOccurs="0"/>
+                <xsd:element ref="ns4:SharedWithDetails" minOccurs="0"/>
+                <xsd:element ref="ns4:SharingHintHash" minOccurs="0"/>
+                <xsd:element ref="ns3:MediaServiceGenerationTime" minOccurs="0"/>
+                <xsd:element ref="ns3:MediaServiceEventHashCode" minOccurs="0"/>
+                <xsd:element ref="ns3:MediaServiceAutoKeyPoints" minOccurs="0"/>
+                <xsd:element ref="ns3:MediaServiceKeyPoints" minOccurs="0"/>
+                <xsd:element ref="ns3:MediaServiceDateTaken" minOccurs="0"/>
+                <xsd:element ref="ns3:MediaServiceLocation" minOccurs="0"/>
+              </xsd:all>
             </xsd:complexType>
           </xsd:element>
         </xsd:sequence>
       </xsd:complexType>
     </xsd:element>
   </xsd:schema>
-  <xsd:schema xmlns="http://schemas.openxmlformats.org/package/2006/metadata/core-properties" xmlns:xsd="http://www.w3.org/2001/XMLSchema" xmlns:xsi="http://www.w3.org/2001/XMLSchema-instance" xmlns:dc="http://purl.org/dc/elements/1.1/" xmlns:dcterms="http://purl.org/dc/terms/" xmlns:odoc="http://schemas.microsoft.com/office/internal/2005/internalDocumentation" targetNamespace="http://schemas.openxmlformats.org/package/2006/metadata/core-properties" elementFormDefault="qualified" attributeFormDefault="unqualified" blockDefault="#all">
+  <xsd:schema xmlns:xsd="http://www.w3.org/2001/XMLSchema" xmlns:xs="http://www.w3.org/2001/XMLSchema" xmlns:dms="http://schemas.microsoft.com/office/2006/documentManagement/types" xmlns:pc="http://schemas.microsoft.com/office/infopath/2007/PartnerControls" targetNamespace="a9644998-0f43-4a12-9bff-883b17382285" elementFormDefault="qualified">
+    <xsd:import namespace="http://schemas.microsoft.com/office/2006/documentManagement/types"/>
+    <xsd:import namespace="http://schemas.microsoft.com/office/infopath/2007/PartnerControls"/>
+    <xsd:element name="MediaServiceMetadata" ma:index="8" nillable="true" ma:displayName="MediaServiceMetadata" ma:hidden="true" ma:internalName="MediaServiceMetadata" ma:readOnly="true">
+      <xsd:simpleType>
+        <xsd:restriction base="dms:Note"/>
+      </xsd:simpleType>
+    </xsd:element>
+    <xsd:element name="MediaServiceFastMetadata" ma:index="9" nillable="true" ma:displayName="MediaServiceFastMetadata" ma:hidden="true" ma:internalName="MediaServiceFastMetadata" ma:readOnly="true">
+      <xsd:simpleType>
+        <xsd:restriction base="dms:Note"/>
+      </xsd:simpleType>
+    </xsd:element>
+    <xsd:element name="MediaServiceAutoTags" ma:index="10" nillable="true" ma:displayName="Tags" ma:internalName="MediaServiceAutoTags" ma:readOnly="true">
+      <xsd:simpleType>
+        <xsd:restriction base="dms:Text"/>
+      </xsd:simpleType>
+    </xsd:element>
+    <xsd:element name="MediaServiceOCR" ma:index="11" nillable="true" ma:displayName="Extracted Text" ma:internalName="MediaServiceOCR" ma:readOnly="true">
+      <xsd:simpleType>
+        <xsd:restriction base="dms:Note">
+          <xsd:maxLength value="255"/>
+        </xsd:restriction>
+      </xsd:simpleType>
+    </xsd:element>
+    <xsd:element name="MediaServiceGenerationTime" ma:index="15" nillable="true" ma:displayName="MediaServiceGenerationTime" ma:hidden="true" ma:internalName="MediaServiceGenerationTime" ma:readOnly="true">
+      <xsd:simpleType>
+        <xsd:restriction base="dms:Text"/>
+      </xsd:simpleType>
+    </xsd:element>
+    <xsd:element name="MediaServiceEventHashCode" ma:index="16" nillable="true" ma:displayName="MediaServiceEventHashCode" ma:hidden="true" ma:internalName="MediaServiceEventHashCode" ma:readOnly="true">
+      <xsd:simpleType>
+        <xsd:restriction base="dms:Text"/>
+      </xsd:simpleType>
+    </xsd:element>
+    <xsd:element name="MediaServiceAutoKeyPoints" ma:index="17" nillable="true" ma:displayName="MediaServiceAutoKeyPoints" ma:hidden="true" ma:internalName="MediaServiceAutoKeyPoints" ma:readOnly="true">
+      <xsd:simpleType>
+        <xsd:restriction base="dms:Note"/>
+      </xsd:simpleType>
+    </xsd:element>
+    <xsd:element name="MediaServiceKeyPoints" ma:index="18" nillable="true" ma:displayName="KeyPoints" ma:internalName="MediaServiceKeyPoints" ma:readOnly="true">
+      <xsd:simpleType>
+        <xsd:restriction base="dms:Note">
+          <xsd:maxLength value="255"/>
+        </xsd:restriction>
+      </xsd:simpleType>
+    </xsd:element>
+    <xsd:element name="MediaServiceDateTaken" ma:index="19" nillable="true" ma:displayName="MediaServiceDateTaken" ma:hidden="true" ma:internalName="MediaServiceDateTaken" ma:readOnly="true">
+      <xsd:simpleType>
+        <xsd:restriction base="dms:Text"/>
+      </xsd:simpleType>
+    </xsd:element>
+    <xsd:element name="MediaServiceLocation" ma:index="20" nillable="true" ma:displayName="Location" ma:internalName="MediaServiceLocation" ma:readOnly="true">
+      <xsd:simpleType>
+        <xsd:restriction base="dms:Text"/>
+      </xsd:simpleType>
+    </xsd:element>
+  </xsd:schema>
+  <xsd:schema xmlns:xsd="http://www.w3.org/2001/XMLSchema" xmlns:xs="http://www.w3.org/2001/XMLSchema" xmlns:dms="http://schemas.microsoft.com/office/2006/documentManagement/types" xmlns:pc="http://schemas.microsoft.com/office/infopath/2007/PartnerControls" targetNamespace="378297c8-0ee1-4ccb-95ba-390b2a98be1e" elementFormDefault="qualified">
+    <xsd:import namespace="http://schemas.microsoft.com/office/2006/documentManagement/types"/>
+    <xsd:import namespace="http://schemas.microsoft.com/office/infopath/2007/PartnerControls"/>
+    <xsd:element name="SharedWithUsers" ma:index="12" nillable="true" ma:displayName="Shared With" ma:internalName="SharedWithUsers" ma:readOnly="true">
+      <xsd:complexType>
+        <xsd:complexContent>
+          <xsd:extension base="dms:UserMulti">
+            <xsd:sequence>
+              <xsd:element name="UserInfo" minOccurs="0" maxOccurs="unbounded">
+                <xsd:complexType>
+                  <xsd:sequence>
+                    <xsd:element name="DisplayName" type="xsd:string" minOccurs="0"/>
+                    <xsd:element name="AccountId" type="dms:UserId" minOccurs="0" nillable="true"/>
+                    <xsd:element name="AccountType" type="xsd:string" minOccurs="0"/>
+                  </xsd:sequence>
+                </xsd:complexType>
+              </xsd:element>
+            </xsd:sequence>
+          </xsd:extension>
+        </xsd:complexContent>
+      </xsd:complexType>
+    </xsd:element>
+    <xsd:element name="SharedWithDetails" ma:index="13" nillable="true" ma:displayName="Shared With Details" ma:internalName="SharedWithDetails" ma:readOnly="true">
+      <xsd:simpleType>
+        <xsd:restriction base="dms:Note">
+          <xsd:maxLength value="255"/>
+        </xsd:restriction>
+      </xsd:simpleType>
+    </xsd:element>
+    <xsd:element name="SharingHintHash" ma:index="14" nillable="true" ma:displayName="Sharing Hint Hash" ma:hidden="true" ma:internalName="SharingHintHash" ma:readOnly="true">
+      <xsd:simpleType>
+        <xsd:restriction base="dms:Text"/>
+      </xsd:simpleType>
+    </xsd:element>
+  </xsd:schema>
+  <xsd:schema xmlns="http://schemas.openxmlformats.org/package/2006/metadata/core-properties" xmlns:xsd="http://www.w3.org/2001/XMLSchema" xmlns:xsi="http://www.w3.org/2001/XMLSchema-instance" xmlns:dc="http://purl.org/dc/elements/1.1/" xmlns:dcterms="http://purl.org/dc/terms/" xmlns:odoc="http://schemas.microsoft.com/internal/obd" targetNamespace="http://schemas.openxmlformats.org/package/2006/metadata/core-properties" elementFormDefault="qualified" attributeFormDefault="unqualified" blockDefault="#all">
     <xsd:import namespace="http://purl.org/dc/elements/1.1/" schemaLocation="http://dublincore.org/schemas/xmls/qdc/2003/04/02/dc.xsd"/>
     <xsd:import namespace="http://purl.org/dc/terms/" schemaLocation="http://dublincore.org/schemas/xmls/qdc/2003/04/02/dcterms.xsd"/>
     <xsd:element name="coreProperties" type="CT_coreProperties"/>
@@ -5685,7 +6028,7 @@
         <xsd:element ref="dc:creator" minOccurs="0" maxOccurs="1"/>
         <xsd:element ref="dcterms:created" minOccurs="0" maxOccurs="1"/>
         <xsd:element ref="dc:identifier" minOccurs="0" maxOccurs="1"/>
-        <xsd:element name="contentType" minOccurs="0" maxOccurs="1" type="xsd:string" ma:index="0" ma:displayName="Content Type" ma:readOnly="true"/>
+        <xsd:element name="contentType" minOccurs="0" maxOccurs="1" type="xsd:string" ma:index="0" ma:displayName="Content Type"/>
         <xsd:element ref="dc:title" minOccurs="0" maxOccurs="1" ma:index="4" ma:displayName="Title"/>
         <xsd:element ref="dc:subject" minOccurs="0" maxOccurs="1"/>
         <xsd:element ref="dc:description" minOccurs="0" maxOccurs="1"/>
@@ -5702,15 +6045,80 @@
         </xsd:element>
         <xsd:element name="lastModifiedBy" minOccurs="0" maxOccurs="1" type="xsd:string"/>
         <xsd:element ref="dcterms:modified" minOccurs="0" maxOccurs="1"/>
-        <xsd:element name="lastPrinted" minOccurs="0" maxOccurs="1" type="xsd:dateTime"/>
         <xsd:element name="contentStatus" minOccurs="0" maxOccurs="1" type="xsd:string"/>
       </xsd:all>
     </xsd:complexType>
   </xsd:schema>
+  <xs:schema xmlns:pc="http://schemas.microsoft.com/office/infopath/2007/PartnerControls" xmlns:xs="http://www.w3.org/2001/XMLSchema" targetNamespace="http://schemas.microsoft.com/office/infopath/2007/PartnerControls" elementFormDefault="qualified" attributeFormDefault="unqualified">
+    <xs:element name="Person">
+      <xs:complexType>
+        <xs:sequence>
+          <xs:element ref="pc:DisplayName" minOccurs="0"/>
+          <xs:element ref="pc:AccountId" minOccurs="0"/>
+          <xs:element ref="pc:AccountType" minOccurs="0"/>
+        </xs:sequence>
+      </xs:complexType>
+    </xs:element>
+    <xs:element name="DisplayName" type="xs:string"/>
+    <xs:element name="AccountId" type="xs:string"/>
+    <xs:element name="AccountType" type="xs:string"/>
+    <xs:element name="BDCAssociatedEntity">
+      <xs:complexType>
+        <xs:sequence>
+          <xs:element ref="pc:BDCEntity" minOccurs="0" maxOccurs="unbounded"/>
+        </xs:sequence>
+        <xs:attribute ref="pc:EntityNamespace"/>
+        <xs:attribute ref="pc:EntityName"/>
+        <xs:attribute ref="pc:SystemInstanceName"/>
+        <xs:attribute ref="pc:AssociationName"/>
+      </xs:complexType>
+    </xs:element>
+    <xs:attribute name="EntityNamespace" type="xs:string"/>
+    <xs:attribute name="EntityName" type="xs:string"/>
+    <xs:attribute name="SystemInstanceName" type="xs:string"/>
+    <xs:attribute name="AssociationName" type="xs:string"/>
+    <xs:element name="BDCEntity">
+      <xs:complexType>
+        <xs:sequence>
+          <xs:element ref="pc:EntityDisplayName" minOccurs="0"/>
+          <xs:element ref="pc:EntityInstanceReference" minOccurs="0"/>
+          <xs:element ref="pc:EntityId1" minOccurs="0"/>
+          <xs:element ref="pc:EntityId2" minOccurs="0"/>
+          <xs:element ref="pc:EntityId3" minOccurs="0"/>
+          <xs:element ref="pc:EntityId4" minOccurs="0"/>
+          <xs:element ref="pc:EntityId5" minOccurs="0"/>
+        </xs:sequence>
+      </xs:complexType>
+    </xs:element>
+    <xs:element name="EntityDisplayName" type="xs:string"/>
+    <xs:element name="EntityInstanceReference" type="xs:string"/>
+    <xs:element name="EntityId1" type="xs:string"/>
+    <xs:element name="EntityId2" type="xs:string"/>
+    <xs:element name="EntityId3" type="xs:string"/>
+    <xs:element name="EntityId4" type="xs:string"/>
+    <xs:element name="EntityId5" type="xs:string"/>
+    <xs:element name="Terms">
+      <xs:complexType>
+        <xs:sequence>
+          <xs:element ref="pc:TermInfo" minOccurs="0" maxOccurs="unbounded"/>
+        </xs:sequence>
+      </xs:complexType>
+    </xs:element>
+    <xs:element name="TermInfo">
+      <xs:complexType>
+        <xs:sequence>
+          <xs:element ref="pc:TermName" minOccurs="0"/>
+          <xs:element ref="pc:TermId" minOccurs="0"/>
+        </xs:sequence>
+      </xs:complexType>
+    </xs:element>
+    <xs:element name="TermName" type="xs:string"/>
+    <xs:element name="TermId" type="xs:string"/>
+  </xs:schema>
 </ct:contentTypeSchema>
 </file>
 
-<file path=customXml/item2.xml><?xml version="1.0" encoding="utf-8"?>
+<file path=customXml/item3.xml><?xml version="1.0" encoding="utf-8"?>
 <?mso-contentType ?>
 <FormTemplates xmlns="http://schemas.microsoft.com/sharepoint/v3/contenttype/forms">
   <Display>DocumentLibraryForm</Display>
@@ -5720,21 +6128,42 @@
 </file>
 
 <file path=customXml/itemProps1.xml><?xml version="1.0" encoding="utf-8"?>
-<ds:datastoreItem xmlns:ds="http://schemas.openxmlformats.org/officeDocument/2006/customXml" ds:itemID="{069E428E-B4E8-4A06-9EB6-04820EC0F3C0}">
+<ds:datastoreItem xmlns:ds="http://schemas.openxmlformats.org/officeDocument/2006/customXml" ds:itemID="{1008306C-5399-4C69-807E-BB34856E2D0D}">
+  <ds:schemaRefs>
+    <ds:schemaRef ds:uri="http://schemas.openxmlformats.org/package/2006/metadata/core-properties"/>
+    <ds:schemaRef ds:uri="http://purl.org/dc/elements/1.1/"/>
+    <ds:schemaRef ds:uri="378297c8-0ee1-4ccb-95ba-390b2a98be1e"/>
+    <ds:schemaRef ds:uri="a9644998-0f43-4a12-9bff-883b17382285"/>
+    <ds:schemaRef ds:uri="http://purl.org/dc/dcmitype/"/>
+    <ds:schemaRef ds:uri="http://purl.org/dc/terms/"/>
+    <ds:schemaRef ds:uri="http://schemas.microsoft.com/office/2006/documentManagement/types"/>
+    <ds:schemaRef ds:uri="http://schemas.microsoft.com/office/infopath/2007/PartnerControls"/>
+    <ds:schemaRef ds:uri="http://schemas.microsoft.com/office/2006/metadata/properties"/>
+    <ds:schemaRef ds:uri="http://www.w3.org/XML/1998/namespace"/>
+  </ds:schemaRefs>
+</ds:datastoreItem>
+</file>
+
+<file path=customXml/itemProps2.xml><?xml version="1.0" encoding="utf-8"?>
+<ds:datastoreItem xmlns:ds="http://schemas.openxmlformats.org/officeDocument/2006/customXml" ds:itemID="{C4687DC3-270C-4474-9FBF-721009BF8949}">
   <ds:schemaRefs>
     <ds:schemaRef ds:uri="http://schemas.microsoft.com/office/2006/metadata/contentType"/>
     <ds:schemaRef ds:uri="http://schemas.microsoft.com/office/2006/metadata/properties/metaAttributes"/>
     <ds:schemaRef ds:uri="http://www.w3.org/2001/XMLSchema"/>
     <ds:schemaRef ds:uri="http://schemas.microsoft.com/office/2006/metadata/properties"/>
+    <ds:schemaRef ds:uri="a9644998-0f43-4a12-9bff-883b17382285"/>
+    <ds:schemaRef ds:uri="378297c8-0ee1-4ccb-95ba-390b2a98be1e"/>
+    <ds:schemaRef ds:uri="http://schemas.microsoft.com/office/2006/documentManagement/types"/>
+    <ds:schemaRef ds:uri="http://schemas.microsoft.com/office/infopath/2007/PartnerControls"/>
     <ds:schemaRef ds:uri="http://schemas.openxmlformats.org/package/2006/metadata/core-properties"/>
     <ds:schemaRef ds:uri="http://purl.org/dc/elements/1.1/"/>
     <ds:schemaRef ds:uri="http://purl.org/dc/terms/"/>
-    <ds:schemaRef ds:uri="http://schemas.microsoft.com/office/internal/2005/internalDocumentation"/>
+    <ds:schemaRef ds:uri="http://schemas.microsoft.com/internal/obd"/>
   </ds:schemaRefs>
 </ds:datastoreItem>
 </file>
 
-<file path=customXml/itemProps2.xml><?xml version="1.0" encoding="utf-8"?>
+<file path=customXml/itemProps3.xml><?xml version="1.0" encoding="utf-8"?>
 <ds:datastoreItem xmlns:ds="http://schemas.openxmlformats.org/officeDocument/2006/customXml" ds:itemID="{54D0D3C5-34E4-4C50-AEF0-1975AC22AD53}">
   <ds:schemaRefs>
     <ds:schemaRef ds:uri="http://schemas.microsoft.com/sharepoint/v3/contenttype/forms"/>

</xml_diff>

<commit_message>
Progress has been made on the poster. I think it's done now. Added a QOL feature to HECC-UP (allowing the JFileChoosers to remember the last thing you opened with them), swapped the names of 'Countdown' and 'Backblast' (because I think Backblast is a much more appropriate name for the real game I'm making), moved the demo-y 'inputs' and 'outputs' into a new 'HECCIN Games' folder, and also created a demonstration webpage to show off some of the demonstration games produced with HECC-IT, which I have put onto itch.io, here: https://11belowstudio.itch.io/the-hecc-it-demo, and put a link to it on the poster so people can look at the demo versions of the game themselves.
</commit_message>
<xml_diff>
--- a/Reports n such/Rachel Lowe CE301 Poster HECC-IT.pptx
+++ b/Reports n such/Rachel Lowe CE301 Poster HECC-IT.pptx
@@ -4,6 +4,9 @@
   <p:sldMasterIdLst>
     <p:sldMasterId id="2147483648" r:id="rId4"/>
   </p:sldMasterIdLst>
+  <p:notesMasterIdLst>
+    <p:notesMasterId r:id="rId6"/>
+  </p:notesMasterIdLst>
   <p:sldIdLst>
     <p:sldId id="256" r:id="rId5"/>
   </p:sldIdLst>
@@ -145,9 +148,575 @@
 <file path=ppt/revisionInfo.xml><?xml version="1.0" encoding="utf-8"?>
 <p1510:revInfo xmlns:a="http://schemas.openxmlformats.org/drawingml/2006/main" xmlns:r="http://schemas.openxmlformats.org/officeDocument/2006/relationships" xmlns:p1510="http://schemas.microsoft.com/office/powerpoint/2015/10/main">
   <p1510:revLst>
-    <p1510:client id="{4881BF7A-C557-4AC6-BC62-6D784D4BF871}" v="12" dt="2021-03-10T00:18:04.226"/>
+    <p1510:client id="{80124DFA-92C9-4288-9C22-33F59D9B1A00}" v="8" dt="2021-03-12T12:06:41.178"/>
   </p1510:revLst>
 </p1510:revInfo>
+</file>
+
+<file path=ppt/changesInfos/changesInfo1.xml><?xml version="1.0" encoding="utf-8"?>
+<pc:chgInfo xmlns:a="http://schemas.openxmlformats.org/drawingml/2006/main" xmlns:r="http://schemas.openxmlformats.org/officeDocument/2006/relationships" xmlns:ac="http://schemas.microsoft.com/office/drawing/2013/main/command" xmlns:pc="http://schemas.microsoft.com/office/powerpoint/2013/main/command">
+  <pc:docChgLst>
+    <pc:chgData name="Lowe, Rachel M" userId="93b75d29-27f6-4dab-b540-bade7f33a1ad" providerId="ADAL" clId="{80124DFA-92C9-4288-9C22-33F59D9B1A00}"/>
+    <pc:docChg chg="undo custSel modSld">
+      <pc:chgData name="Lowe, Rachel M" userId="93b75d29-27f6-4dab-b540-bade7f33a1ad" providerId="ADAL" clId="{80124DFA-92C9-4288-9C22-33F59D9B1A00}" dt="2021-03-12T12:23:20.821" v="3078" actId="20577"/>
+      <pc:docMkLst>
+        <pc:docMk/>
+      </pc:docMkLst>
+      <pc:sldChg chg="addSp delSp modSp mod modNotesTx">
+        <pc:chgData name="Lowe, Rachel M" userId="93b75d29-27f6-4dab-b540-bade7f33a1ad" providerId="ADAL" clId="{80124DFA-92C9-4288-9C22-33F59D9B1A00}" dt="2021-03-12T12:23:20.821" v="3078" actId="20577"/>
+        <pc:sldMkLst>
+          <pc:docMk/>
+          <pc:sldMk cId="0" sldId="256"/>
+        </pc:sldMkLst>
+        <pc:spChg chg="add mod">
+          <ac:chgData name="Lowe, Rachel M" userId="93b75d29-27f6-4dab-b540-bade7f33a1ad" providerId="ADAL" clId="{80124DFA-92C9-4288-9C22-33F59D9B1A00}" dt="2021-03-12T12:21:17.163" v="2984" actId="14100"/>
+          <ac:spMkLst>
+            <pc:docMk/>
+            <pc:sldMk cId="0" sldId="256"/>
+            <ac:spMk id="17" creationId="{CCDBAC73-A8E9-49D9-8B47-BFD5D0D2C002}"/>
+          </ac:spMkLst>
+        </pc:spChg>
+        <pc:spChg chg="mod">
+          <ac:chgData name="Lowe, Rachel M" userId="93b75d29-27f6-4dab-b540-bade7f33a1ad" providerId="ADAL" clId="{80124DFA-92C9-4288-9C22-33F59D9B1A00}" dt="2021-03-12T12:00:32.889" v="994" actId="20577"/>
+          <ac:spMkLst>
+            <pc:docMk/>
+            <pc:sldMk cId="0" sldId="256"/>
+            <ac:spMk id="2055" creationId="{00000000-0000-0000-0000-000000000000}"/>
+          </ac:spMkLst>
+        </pc:spChg>
+        <pc:spChg chg="mod">
+          <ac:chgData name="Lowe, Rachel M" userId="93b75d29-27f6-4dab-b540-bade7f33a1ad" providerId="ADAL" clId="{80124DFA-92C9-4288-9C22-33F59D9B1A00}" dt="2021-03-12T12:22:01.510" v="2992" actId="20577"/>
+          <ac:spMkLst>
+            <pc:docMk/>
+            <pc:sldMk cId="0" sldId="256"/>
+            <ac:spMk id="2056" creationId="{00000000-0000-0000-0000-000000000000}"/>
+          </ac:spMkLst>
+        </pc:spChg>
+        <pc:spChg chg="mod">
+          <ac:chgData name="Lowe, Rachel M" userId="93b75d29-27f6-4dab-b540-bade7f33a1ad" providerId="ADAL" clId="{80124DFA-92C9-4288-9C22-33F59D9B1A00}" dt="2021-03-12T12:23:20.821" v="3078" actId="20577"/>
+          <ac:spMkLst>
+            <pc:docMk/>
+            <pc:sldMk cId="0" sldId="256"/>
+            <ac:spMk id="2057" creationId="{00000000-0000-0000-0000-000000000000}"/>
+          </ac:spMkLst>
+        </pc:spChg>
+        <pc:spChg chg="mod">
+          <ac:chgData name="Lowe, Rachel M" userId="93b75d29-27f6-4dab-b540-bade7f33a1ad" providerId="ADAL" clId="{80124DFA-92C9-4288-9C22-33F59D9B1A00}" dt="2021-03-12T12:21:05.839" v="2983" actId="20577"/>
+          <ac:spMkLst>
+            <pc:docMk/>
+            <pc:sldMk cId="0" sldId="256"/>
+            <ac:spMk id="2058" creationId="{00000000-0000-0000-0000-000000000000}"/>
+          </ac:spMkLst>
+        </pc:spChg>
+        <pc:picChg chg="mod">
+          <ac:chgData name="Lowe, Rachel M" userId="93b75d29-27f6-4dab-b540-bade7f33a1ad" providerId="ADAL" clId="{80124DFA-92C9-4288-9C22-33F59D9B1A00}" dt="2021-03-12T12:21:24.999" v="2985" actId="1076"/>
+          <ac:picMkLst>
+            <pc:docMk/>
+            <pc:sldMk cId="0" sldId="256"/>
+            <ac:picMk id="7" creationId="{7AF6AACF-097D-4766-8A86-CD34ABAC8EBB}"/>
+          </ac:picMkLst>
+        </pc:picChg>
+        <pc:picChg chg="del">
+          <ac:chgData name="Lowe, Rachel M" userId="93b75d29-27f6-4dab-b540-bade7f33a1ad" providerId="ADAL" clId="{80124DFA-92C9-4288-9C22-33F59D9B1A00}" dt="2021-03-12T12:21:44.439" v="2990" actId="478"/>
+          <ac:picMkLst>
+            <pc:docMk/>
+            <pc:sldMk cId="0" sldId="256"/>
+            <ac:picMk id="9" creationId="{0667EB7A-ED59-4205-A92D-0DBE92B30D17}"/>
+          </ac:picMkLst>
+        </pc:picChg>
+        <pc:picChg chg="del mod">
+          <ac:chgData name="Lowe, Rachel M" userId="93b75d29-27f6-4dab-b540-bade7f33a1ad" providerId="ADAL" clId="{80124DFA-92C9-4288-9C22-33F59D9B1A00}" dt="2021-03-12T12:21:43.148" v="2989" actId="478"/>
+          <ac:picMkLst>
+            <pc:docMk/>
+            <pc:sldMk cId="0" sldId="256"/>
+            <ac:picMk id="11" creationId="{89DFD54A-10E2-424A-9BBE-FFC3EF52FDF1}"/>
+          </ac:picMkLst>
+        </pc:picChg>
+      </pc:sldChg>
+    </pc:docChg>
+  </pc:docChgLst>
+</pc:chgInfo>
+</file>
+
+<file path=ppt/notesMasters/notesMaster1.xml><?xml version="1.0" encoding="utf-8"?>
+<p:notesMaster xmlns:a="http://schemas.openxmlformats.org/drawingml/2006/main" xmlns:r="http://schemas.openxmlformats.org/officeDocument/2006/relationships" xmlns:p="http://schemas.openxmlformats.org/presentationml/2006/main">
+  <p:cSld>
+    <p:bg>
+      <p:bgRef idx="1001">
+        <a:schemeClr val="bg1"/>
+      </p:bgRef>
+    </p:bg>
+    <p:spTree>
+      <p:nvGrpSpPr>
+        <p:cNvPr id="1" name=""/>
+        <p:cNvGrpSpPr/>
+        <p:nvPr/>
+      </p:nvGrpSpPr>
+      <p:grpSpPr>
+        <a:xfrm>
+          <a:off x="0" y="0"/>
+          <a:ext cx="0" cy="0"/>
+          <a:chOff x="0" y="0"/>
+          <a:chExt cx="0" cy="0"/>
+        </a:xfrm>
+      </p:grpSpPr>
+      <p:sp>
+        <p:nvSpPr>
+          <p:cNvPr id="2" name="Header Placeholder 1"/>
+          <p:cNvSpPr>
+            <a:spLocks noGrp="1"/>
+          </p:cNvSpPr>
+          <p:nvPr>
+            <p:ph type="hdr" sz="quarter"/>
+          </p:nvPr>
+        </p:nvSpPr>
+        <p:spPr>
+          <a:xfrm>
+            <a:off x="0" y="0"/>
+            <a:ext cx="9069388" cy="1495425"/>
+          </a:xfrm>
+          <a:prstGeom prst="rect">
+            <a:avLst/>
+          </a:prstGeom>
+        </p:spPr>
+        <p:txBody>
+          <a:bodyPr vert="horz" lIns="91440" tIns="45720" rIns="91440" bIns="45720" rtlCol="0"/>
+          <a:lstStyle>
+            <a:lvl1pPr algn="l">
+              <a:defRPr sz="1200"/>
+            </a:lvl1pPr>
+          </a:lstStyle>
+          <a:p>
+            <a:endParaRPr lang="en-GB"/>
+          </a:p>
+        </p:txBody>
+      </p:sp>
+      <p:sp>
+        <p:nvSpPr>
+          <p:cNvPr id="3" name="Date Placeholder 2"/>
+          <p:cNvSpPr>
+            <a:spLocks noGrp="1"/>
+          </p:cNvSpPr>
+          <p:nvPr>
+            <p:ph type="dt" idx="1"/>
+          </p:nvPr>
+        </p:nvSpPr>
+        <p:spPr>
+          <a:xfrm>
+            <a:off x="11855450" y="0"/>
+            <a:ext cx="9069388" cy="1495425"/>
+          </a:xfrm>
+          <a:prstGeom prst="rect">
+            <a:avLst/>
+          </a:prstGeom>
+        </p:spPr>
+        <p:txBody>
+          <a:bodyPr vert="horz" lIns="91440" tIns="45720" rIns="91440" bIns="45720" rtlCol="0"/>
+          <a:lstStyle>
+            <a:lvl1pPr algn="r">
+              <a:defRPr sz="1200"/>
+            </a:lvl1pPr>
+          </a:lstStyle>
+          <a:p>
+            <a:fld id="{E9CE0159-4874-450F-A30A-35B10F32CDC3}" type="datetimeFigureOut">
+              <a:rPr lang="en-GB" smtClean="0"/>
+              <a:t>12/03/2021</a:t>
+            </a:fld>
+            <a:endParaRPr lang="en-GB"/>
+          </a:p>
+        </p:txBody>
+      </p:sp>
+      <p:sp>
+        <p:nvSpPr>
+          <p:cNvPr id="4" name="Slide Image Placeholder 3"/>
+          <p:cNvSpPr>
+            <a:spLocks noGrp="1" noRot="1" noChangeAspect="1"/>
+          </p:cNvSpPr>
+          <p:nvPr>
+            <p:ph type="sldImg" idx="2"/>
+          </p:nvPr>
+        </p:nvSpPr>
+        <p:spPr>
+          <a:xfrm>
+            <a:off x="3348038" y="3727450"/>
+            <a:ext cx="14233525" cy="10064750"/>
+          </a:xfrm>
+          <a:prstGeom prst="rect">
+            <a:avLst/>
+          </a:prstGeom>
+          <a:noFill/>
+          <a:ln w="12700">
+            <a:solidFill>
+              <a:prstClr val="black"/>
+            </a:solidFill>
+          </a:ln>
+        </p:spPr>
+        <p:txBody>
+          <a:bodyPr vert="horz" lIns="91440" tIns="45720" rIns="91440" bIns="45720" rtlCol="0" anchor="ctr"/>
+          <a:lstStyle/>
+          <a:p>
+            <a:endParaRPr lang="en-GB"/>
+          </a:p>
+        </p:txBody>
+      </p:sp>
+      <p:sp>
+        <p:nvSpPr>
+          <p:cNvPr id="5" name="Notes Placeholder 4"/>
+          <p:cNvSpPr>
+            <a:spLocks noGrp="1"/>
+          </p:cNvSpPr>
+          <p:nvPr>
+            <p:ph type="body" sz="quarter" idx="3"/>
+          </p:nvPr>
+        </p:nvSpPr>
+        <p:spPr>
+          <a:xfrm>
+            <a:off x="2092325" y="14351000"/>
+            <a:ext cx="16744950" cy="11741150"/>
+          </a:xfrm>
+          <a:prstGeom prst="rect">
+            <a:avLst/>
+          </a:prstGeom>
+        </p:spPr>
+        <p:txBody>
+          <a:bodyPr vert="horz" lIns="91440" tIns="45720" rIns="91440" bIns="45720" rtlCol="0"/>
+          <a:lstStyle/>
+          <a:p>
+            <a:pPr lvl="0"/>
+            <a:r>
+              <a:rPr lang="en-US"/>
+              <a:t>Click to edit Master text styles</a:t>
+            </a:r>
+          </a:p>
+          <a:p>
+            <a:pPr lvl="1"/>
+            <a:r>
+              <a:rPr lang="en-US"/>
+              <a:t>Second level</a:t>
+            </a:r>
+          </a:p>
+          <a:p>
+            <a:pPr lvl="2"/>
+            <a:r>
+              <a:rPr lang="en-US"/>
+              <a:t>Third level</a:t>
+            </a:r>
+          </a:p>
+          <a:p>
+            <a:pPr lvl="3"/>
+            <a:r>
+              <a:rPr lang="en-US"/>
+              <a:t>Fourth level</a:t>
+            </a:r>
+          </a:p>
+          <a:p>
+            <a:pPr lvl="4"/>
+            <a:r>
+              <a:rPr lang="en-US"/>
+              <a:t>Fifth level</a:t>
+            </a:r>
+            <a:endParaRPr lang="en-GB"/>
+          </a:p>
+        </p:txBody>
+      </p:sp>
+      <p:sp>
+        <p:nvSpPr>
+          <p:cNvPr id="6" name="Footer Placeholder 5"/>
+          <p:cNvSpPr>
+            <a:spLocks noGrp="1"/>
+          </p:cNvSpPr>
+          <p:nvPr>
+            <p:ph type="ftr" sz="quarter" idx="4"/>
+          </p:nvPr>
+        </p:nvSpPr>
+        <p:spPr>
+          <a:xfrm>
+            <a:off x="0" y="28324175"/>
+            <a:ext cx="9069388" cy="1495425"/>
+          </a:xfrm>
+          <a:prstGeom prst="rect">
+            <a:avLst/>
+          </a:prstGeom>
+        </p:spPr>
+        <p:txBody>
+          <a:bodyPr vert="horz" lIns="91440" tIns="45720" rIns="91440" bIns="45720" rtlCol="0" anchor="b"/>
+          <a:lstStyle>
+            <a:lvl1pPr algn="l">
+              <a:defRPr sz="1200"/>
+            </a:lvl1pPr>
+          </a:lstStyle>
+          <a:p>
+            <a:endParaRPr lang="en-GB"/>
+          </a:p>
+        </p:txBody>
+      </p:sp>
+      <p:sp>
+        <p:nvSpPr>
+          <p:cNvPr id="7" name="Slide Number Placeholder 6"/>
+          <p:cNvSpPr>
+            <a:spLocks noGrp="1"/>
+          </p:cNvSpPr>
+          <p:nvPr>
+            <p:ph type="sldNum" sz="quarter" idx="5"/>
+          </p:nvPr>
+        </p:nvSpPr>
+        <p:spPr>
+          <a:xfrm>
+            <a:off x="11855450" y="28324175"/>
+            <a:ext cx="9069388" cy="1495425"/>
+          </a:xfrm>
+          <a:prstGeom prst="rect">
+            <a:avLst/>
+          </a:prstGeom>
+        </p:spPr>
+        <p:txBody>
+          <a:bodyPr vert="horz" lIns="91440" tIns="45720" rIns="91440" bIns="45720" rtlCol="0" anchor="b"/>
+          <a:lstStyle>
+            <a:lvl1pPr algn="r">
+              <a:defRPr sz="1200"/>
+            </a:lvl1pPr>
+          </a:lstStyle>
+          <a:p>
+            <a:fld id="{83F0972E-C16B-4567-82BB-AC9B69EEE1EE}" type="slidenum">
+              <a:rPr lang="en-GB" smtClean="0"/>
+              <a:t>‹#›</a:t>
+            </a:fld>
+            <a:endParaRPr lang="en-GB"/>
+          </a:p>
+        </p:txBody>
+      </p:sp>
+    </p:spTree>
+    <p:extLst>
+      <p:ext uri="{BB962C8B-B14F-4D97-AF65-F5344CB8AC3E}">
+        <p14:creationId xmlns:p14="http://schemas.microsoft.com/office/powerpoint/2010/main" val="3757331592"/>
+      </p:ext>
+    </p:extLst>
+  </p:cSld>
+  <p:clrMap bg1="lt1" tx1="dk1" bg2="lt2" tx2="dk2" accent1="accent1" accent2="accent2" accent3="accent3" accent4="accent4" accent5="accent5" accent6="accent6" hlink="hlink" folHlink="folHlink"/>
+  <p:notesStyle>
+    <a:lvl1pPr marL="0" algn="l" defTabSz="914400" rtl="0" eaLnBrk="1" latinLnBrk="0" hangingPunct="1">
+      <a:defRPr sz="1200" kern="1200">
+        <a:solidFill>
+          <a:schemeClr val="tx1"/>
+        </a:solidFill>
+        <a:latin typeface="+mn-lt"/>
+        <a:ea typeface="+mn-ea"/>
+        <a:cs typeface="+mn-cs"/>
+      </a:defRPr>
+    </a:lvl1pPr>
+    <a:lvl2pPr marL="457200" algn="l" defTabSz="914400" rtl="0" eaLnBrk="1" latinLnBrk="0" hangingPunct="1">
+      <a:defRPr sz="1200" kern="1200">
+        <a:solidFill>
+          <a:schemeClr val="tx1"/>
+        </a:solidFill>
+        <a:latin typeface="+mn-lt"/>
+        <a:ea typeface="+mn-ea"/>
+        <a:cs typeface="+mn-cs"/>
+      </a:defRPr>
+    </a:lvl2pPr>
+    <a:lvl3pPr marL="914400" algn="l" defTabSz="914400" rtl="0" eaLnBrk="1" latinLnBrk="0" hangingPunct="1">
+      <a:defRPr sz="1200" kern="1200">
+        <a:solidFill>
+          <a:schemeClr val="tx1"/>
+        </a:solidFill>
+        <a:latin typeface="+mn-lt"/>
+        <a:ea typeface="+mn-ea"/>
+        <a:cs typeface="+mn-cs"/>
+      </a:defRPr>
+    </a:lvl3pPr>
+    <a:lvl4pPr marL="1371600" algn="l" defTabSz="914400" rtl="0" eaLnBrk="1" latinLnBrk="0" hangingPunct="1">
+      <a:defRPr sz="1200" kern="1200">
+        <a:solidFill>
+          <a:schemeClr val="tx1"/>
+        </a:solidFill>
+        <a:latin typeface="+mn-lt"/>
+        <a:ea typeface="+mn-ea"/>
+        <a:cs typeface="+mn-cs"/>
+      </a:defRPr>
+    </a:lvl4pPr>
+    <a:lvl5pPr marL="1828800" algn="l" defTabSz="914400" rtl="0" eaLnBrk="1" latinLnBrk="0" hangingPunct="1">
+      <a:defRPr sz="1200" kern="1200">
+        <a:solidFill>
+          <a:schemeClr val="tx1"/>
+        </a:solidFill>
+        <a:latin typeface="+mn-lt"/>
+        <a:ea typeface="+mn-ea"/>
+        <a:cs typeface="+mn-cs"/>
+      </a:defRPr>
+    </a:lvl5pPr>
+    <a:lvl6pPr marL="2286000" algn="l" defTabSz="914400" rtl="0" eaLnBrk="1" latinLnBrk="0" hangingPunct="1">
+      <a:defRPr sz="1200" kern="1200">
+        <a:solidFill>
+          <a:schemeClr val="tx1"/>
+        </a:solidFill>
+        <a:latin typeface="+mn-lt"/>
+        <a:ea typeface="+mn-ea"/>
+        <a:cs typeface="+mn-cs"/>
+      </a:defRPr>
+    </a:lvl6pPr>
+    <a:lvl7pPr marL="2743200" algn="l" defTabSz="914400" rtl="0" eaLnBrk="1" latinLnBrk="0" hangingPunct="1">
+      <a:defRPr sz="1200" kern="1200">
+        <a:solidFill>
+          <a:schemeClr val="tx1"/>
+        </a:solidFill>
+        <a:latin typeface="+mn-lt"/>
+        <a:ea typeface="+mn-ea"/>
+        <a:cs typeface="+mn-cs"/>
+      </a:defRPr>
+    </a:lvl7pPr>
+    <a:lvl8pPr marL="3200400" algn="l" defTabSz="914400" rtl="0" eaLnBrk="1" latinLnBrk="0" hangingPunct="1">
+      <a:defRPr sz="1200" kern="1200">
+        <a:solidFill>
+          <a:schemeClr val="tx1"/>
+        </a:solidFill>
+        <a:latin typeface="+mn-lt"/>
+        <a:ea typeface="+mn-ea"/>
+        <a:cs typeface="+mn-cs"/>
+      </a:defRPr>
+    </a:lvl8pPr>
+    <a:lvl9pPr marL="3657600" algn="l" defTabSz="914400" rtl="0" eaLnBrk="1" latinLnBrk="0" hangingPunct="1">
+      <a:defRPr sz="1200" kern="1200">
+        <a:solidFill>
+          <a:schemeClr val="tx1"/>
+        </a:solidFill>
+        <a:latin typeface="+mn-lt"/>
+        <a:ea typeface="+mn-ea"/>
+        <a:cs typeface="+mn-cs"/>
+      </a:defRPr>
+    </a:lvl9pPr>
+  </p:notesStyle>
+</p:notesMaster>
+</file>
+
+<file path=ppt/notesSlides/notesSlide1.xml><?xml version="1.0" encoding="utf-8"?>
+<p:notes xmlns:a="http://schemas.openxmlformats.org/drawingml/2006/main" xmlns:r="http://schemas.openxmlformats.org/officeDocument/2006/relationships" xmlns:p="http://schemas.openxmlformats.org/presentationml/2006/main">
+  <p:cSld>
+    <p:spTree>
+      <p:nvGrpSpPr>
+        <p:cNvPr id="1" name=""/>
+        <p:cNvGrpSpPr/>
+        <p:nvPr/>
+      </p:nvGrpSpPr>
+      <p:grpSpPr>
+        <a:xfrm>
+          <a:off x="0" y="0"/>
+          <a:ext cx="0" cy="0"/>
+          <a:chOff x="0" y="0"/>
+          <a:chExt cx="0" cy="0"/>
+        </a:xfrm>
+      </p:grpSpPr>
+      <p:sp>
+        <p:nvSpPr>
+          <p:cNvPr id="2" name="Slide Image Placeholder 1"/>
+          <p:cNvSpPr>
+            <a:spLocks noGrp="1" noRot="1" noChangeAspect="1"/>
+          </p:cNvSpPr>
+          <p:nvPr>
+            <p:ph type="sldImg"/>
+          </p:nvPr>
+        </p:nvSpPr>
+        <p:spPr/>
+      </p:sp>
+      <p:sp>
+        <p:nvSpPr>
+          <p:cNvPr id="3" name="Notes Placeholder 2"/>
+          <p:cNvSpPr>
+            <a:spLocks noGrp="1"/>
+          </p:cNvSpPr>
+          <p:nvPr>
+            <p:ph type="body" idx="1"/>
+          </p:nvPr>
+        </p:nvSpPr>
+        <p:spPr/>
+        <p:txBody>
+          <a:bodyPr/>
+          <a:lstStyle/>
+          <a:p>
+            <a:r>
+              <a:rPr lang="en-GB" dirty="0"/>
+              <a:t>Stuff to add:</a:t>
+            </a:r>
+            <a:br>
+              <a:rPr lang="en-GB" dirty="0"/>
+            </a:br>
+            <a:r>
+              <a:rPr lang="en-GB" dirty="0"/>
+              <a:t>Sample .</a:t>
+            </a:r>
+            <a:r>
+              <a:rPr lang="en-GB" dirty="0" err="1"/>
+              <a:t>hecc</a:t>
+            </a:r>
+            <a:r>
+              <a:rPr lang="en-GB" dirty="0"/>
+              <a:t> code?</a:t>
+            </a:r>
+          </a:p>
+          <a:p>
+            <a:r>
+              <a:rPr lang="en-GB" dirty="0"/>
+              <a:t>Discuss the game I’m writing?</a:t>
+            </a:r>
+          </a:p>
+          <a:p>
+            <a:r>
+              <a:rPr lang="en-GB" dirty="0"/>
+              <a:t>Maybe work out how to put animations in the ppt</a:t>
+            </a:r>
+          </a:p>
+          <a:p>
+            <a:endParaRPr lang="en-GB" dirty="0"/>
+          </a:p>
+          <a:p>
+            <a:r>
+              <a:rPr lang="en-GB" dirty="0"/>
+              <a:t>Post one of the example games onto my itch.io page, put a link to it in the </a:t>
+            </a:r>
+            <a:r>
+              <a:rPr lang="en-GB" dirty="0" err="1"/>
+              <a:t>powerpoint</a:t>
+            </a:r>
+            <a:r>
+              <a:rPr lang="en-GB" dirty="0"/>
+              <a:t>?</a:t>
+            </a:r>
+          </a:p>
+        </p:txBody>
+      </p:sp>
+      <p:sp>
+        <p:nvSpPr>
+          <p:cNvPr id="4" name="Slide Number Placeholder 3"/>
+          <p:cNvSpPr>
+            <a:spLocks noGrp="1"/>
+          </p:cNvSpPr>
+          <p:nvPr>
+            <p:ph type="sldNum" sz="quarter" idx="5"/>
+          </p:nvPr>
+        </p:nvSpPr>
+        <p:spPr/>
+        <p:txBody>
+          <a:bodyPr/>
+          <a:lstStyle/>
+          <a:p>
+            <a:fld id="{83F0972E-C16B-4567-82BB-AC9B69EEE1EE}" type="slidenum">
+              <a:rPr lang="en-GB" smtClean="0"/>
+              <a:t>1</a:t>
+            </a:fld>
+            <a:endParaRPr lang="en-GB"/>
+          </a:p>
+        </p:txBody>
+      </p:sp>
+    </p:spTree>
+    <p:extLst>
+      <p:ext uri="{BB962C8B-B14F-4D97-AF65-F5344CB8AC3E}">
+        <p14:creationId xmlns:p14="http://schemas.microsoft.com/office/powerpoint/2010/main" val="2358062173"/>
+      </p:ext>
+    </p:extLst>
+  </p:cSld>
+  <p:clrMapOvr>
+    <a:masterClrMapping/>
+  </p:clrMapOvr>
+</p:notes>
 </file>
 
 <file path=ppt/slideLayouts/slideLayout1.xml><?xml version="1.0" encoding="utf-8"?>
@@ -3439,7 +4008,7 @@
           <p:nvPr/>
         </p:nvPicPr>
         <p:blipFill>
-          <a:blip r:embed="rId2">
+          <a:blip r:embed="rId3">
             <a:extLst>
               <a:ext uri="{28A0092B-C50C-407E-A947-70E740481C1C}">
                 <a14:useLocalDpi xmlns:a14="http://schemas.microsoft.com/office/drawing/2010/main" val="0"/>
@@ -3622,7 +4191,7 @@
           <p:nvPr/>
         </p:nvPicPr>
         <p:blipFill>
-          <a:blip r:embed="rId3">
+          <a:blip r:embed="rId4">
             <a:extLst>
               <a:ext uri="{28A0092B-C50C-407E-A947-70E740481C1C}">
                 <a14:useLocalDpi xmlns:a14="http://schemas.microsoft.com/office/drawing/2010/main" val="0"/>
@@ -3997,7 +4566,7 @@
                 <a:latin typeface="JetBrains Mono" panose="02000009000000000000" pitchFamily="49" charset="0"/>
                 <a:cs typeface="JetBrains Mono" panose="02000009000000000000" pitchFamily="49" charset="0"/>
               </a:rPr>
-              <a:t>Most existing systems require users to use a GUI or to write raw code and hope it compiles. But no tools offer users the choice between the two (or, if they do, with some caveats).</a:t>
+              <a:t>Most existing systems require users to use a GUI or to write raw code and hope it compiles. However, no tools offer users the choice between the two (or, if they do, with some caveats).</a:t>
             </a:r>
           </a:p>
           <a:p>
@@ -4080,7 +4649,7 @@
                 <a:latin typeface="JetBrains Mono" panose="02000009000000000000" pitchFamily="49" charset="0"/>
                 <a:cs typeface="JetBrains Mono" panose="02000009000000000000" pitchFamily="49" charset="0"/>
               </a:rPr>
-              <a:t>And then, once that’s done, just put it through </a:t>
+              <a:t>Then, once that’s done, just put it through </a:t>
             </a:r>
             <a:r>
               <a:rPr lang="en-GB" altLang="x-none" sz="1400" b="1" dirty="0">
@@ -4132,7 +4701,7 @@
                 <a:latin typeface="JetBrains Mono" panose="02000009000000000000" pitchFamily="49" charset="0"/>
                 <a:cs typeface="JetBrains Mono" panose="02000009000000000000" pitchFamily="49" charset="0"/>
               </a:rPr>
-              <a:t> is a standalone desktop application, so users only need to download it and run it.</a:t>
+              <a:t> is a standalone desktop application, written in Java, so users only need to download it and run it.</a:t>
             </a:r>
           </a:p>
           <a:p>
@@ -4163,7 +4732,7 @@
                 <a:latin typeface="JetBrains Mono" panose="02000009000000000000" pitchFamily="49" charset="0"/>
                 <a:cs typeface="JetBrains Mono" panose="02000009000000000000" pitchFamily="49" charset="0"/>
               </a:rPr>
-              <a:t> are in a client-side HTML/JavaScript format, so anyone with a web browser can download and play them.</a:t>
+              <a:t> are in a client-side HTML/JavaScript format, so anyone with a web browser can play them (even offline!).</a:t>
             </a:r>
           </a:p>
         </p:txBody>
@@ -4319,7 +4888,7 @@
                 <a:latin typeface="JetBrains Mono" panose="02000009000000000000" pitchFamily="49" charset="0"/>
                 <a:cs typeface="JetBrains Mono" panose="02000009000000000000" pitchFamily="49" charset="0"/>
               </a:rPr>
-              <a:t> is a toolkit, within a single executable.</a:t>
+              <a:t> is a toolkit, within a single executable .jar file.</a:t>
             </a:r>
           </a:p>
           <a:p>
@@ -4336,7 +4905,7 @@
                 <a:latin typeface="JetBrains Mono" panose="02000009000000000000" pitchFamily="49" charset="0"/>
                 <a:cs typeface="JetBrains Mono" panose="02000009000000000000" pitchFamily="49" charset="0"/>
               </a:rPr>
-              <a:t>Users open the executable, pick an existing .hecc file (or make one), and is then given the choice to export it now or keep editing it (and export later).</a:t>
+              <a:t>Users open the executable, pick an existing .hecc file (or make one), and are then given the choice to export it now or keep editing it (and export later).</a:t>
             </a:r>
           </a:p>
           <a:p>
@@ -4353,14 +4922,7 @@
                 <a:latin typeface="JetBrains Mono" panose="02000009000000000000" pitchFamily="49" charset="0"/>
                 <a:cs typeface="JetBrains Mono" panose="02000009000000000000" pitchFamily="49" charset="0"/>
               </a:rPr>
-              <a:t>Once exported, users can just open the index.html page, and they can play </a:t>
-            </a:r>
-            <a:r>
-              <a:rPr lang="en-GB" altLang="x-none" sz="1400">
-                <a:latin typeface="JetBrains Mono" panose="02000009000000000000" pitchFamily="49" charset="0"/>
-                <a:cs typeface="JetBrains Mono" panose="02000009000000000000" pitchFamily="49" charset="0"/>
-              </a:rPr>
-              <a:t>their game!</a:t>
+              <a:t>Once exported, users can just open the index.html page, and they can play the game!</a:t>
             </a:r>
             <a:endParaRPr lang="en-GB" altLang="x-none" sz="2000" dirty="0">
               <a:latin typeface="JetBrains Mono" panose="02000009000000000000" pitchFamily="49" charset="0"/>
@@ -4499,7 +5061,248 @@
           </a:lstStyle>
           <a:p>
             <a:pPr eaLnBrk="1" hangingPunct="1"/>
-            <a:endParaRPr lang="x-none" altLang="x-none" sz="2000" dirty="0"/>
+            <a:r>
+              <a:rPr lang="en-GB" altLang="x-none" sz="2400" b="1" dirty="0">
+                <a:latin typeface="Arial Rounded MT Bold" panose="020F0704030504030204" pitchFamily="34" charset="0"/>
+              </a:rPr>
+              <a:t>HOW IT WAS MADE</a:t>
+            </a:r>
+          </a:p>
+          <a:p>
+            <a:pPr eaLnBrk="1" hangingPunct="1"/>
+            <a:r>
+              <a:rPr lang="en-GB" altLang="x-none" sz="1400" dirty="0">
+                <a:latin typeface="JetBrains Mono" panose="02000009000000000000" pitchFamily="49" charset="0"/>
+                <a:cs typeface="JetBrains Mono" panose="02000009000000000000" pitchFamily="49" charset="0"/>
+              </a:rPr>
+              <a:t>The first part of HECC-IT to be produced was the output. I made a very simple hypertext game in HTML/JS, which simply replaced the text displayed on part of the HTML page in response to the player clicking on special links in the content.</a:t>
+            </a:r>
+          </a:p>
+          <a:p>
+            <a:pPr eaLnBrk="1" hangingPunct="1"/>
+            <a:endParaRPr lang="en-GB" altLang="x-none" sz="1400" dirty="0">
+              <a:latin typeface="JetBrains Mono" panose="02000009000000000000" pitchFamily="49" charset="0"/>
+              <a:cs typeface="JetBrains Mono" panose="02000009000000000000" pitchFamily="49" charset="0"/>
+            </a:endParaRPr>
+          </a:p>
+          <a:p>
+            <a:pPr eaLnBrk="1" hangingPunct="1"/>
+            <a:r>
+              <a:rPr lang="en-GB" altLang="x-none" sz="1400" dirty="0">
+                <a:latin typeface="JetBrains Mono" panose="02000009000000000000" pitchFamily="49" charset="0"/>
+                <a:cs typeface="JetBrains Mono" panose="02000009000000000000" pitchFamily="49" charset="0"/>
+              </a:rPr>
+              <a:t>The next step was creating the </a:t>
+            </a:r>
+            <a:r>
+              <a:rPr lang="en-GB" altLang="x-none" sz="1400" b="1" dirty="0">
+                <a:latin typeface="JetBrains Mono" panose="02000009000000000000" pitchFamily="49" charset="0"/>
+                <a:cs typeface="JetBrains Mono" panose="02000009000000000000" pitchFamily="49" charset="0"/>
+              </a:rPr>
+              <a:t>.</a:t>
+            </a:r>
+            <a:r>
+              <a:rPr lang="en-GB" altLang="x-none" sz="1400" b="1" dirty="0" err="1">
+                <a:latin typeface="JetBrains Mono" panose="02000009000000000000" pitchFamily="49" charset="0"/>
+                <a:cs typeface="JetBrains Mono" panose="02000009000000000000" pitchFamily="49" charset="0"/>
+              </a:rPr>
+              <a:t>hecc</a:t>
+            </a:r>
+            <a:r>
+              <a:rPr lang="en-GB" altLang="x-none" sz="1400" dirty="0">
+                <a:latin typeface="JetBrains Mono" panose="02000009000000000000" pitchFamily="49" charset="0"/>
+                <a:cs typeface="JetBrains Mono" panose="02000009000000000000" pitchFamily="49" charset="0"/>
+              </a:rPr>
+              <a:t> language (a simple declarative language to declare passages and links), before making </a:t>
+            </a:r>
+            <a:r>
+              <a:rPr lang="en-GB" altLang="x-none" sz="1400" b="1" dirty="0">
+                <a:latin typeface="JetBrains Mono" panose="02000009000000000000" pitchFamily="49" charset="0"/>
+                <a:cs typeface="JetBrains Mono" panose="02000009000000000000" pitchFamily="49" charset="0"/>
+              </a:rPr>
+              <a:t>HECC-UP</a:t>
+            </a:r>
+            <a:r>
+              <a:rPr lang="en-GB" altLang="x-none" sz="1400" dirty="0">
+                <a:latin typeface="JetBrains Mono" panose="02000009000000000000" pitchFamily="49" charset="0"/>
+                <a:cs typeface="JetBrains Mono" panose="02000009000000000000" pitchFamily="49" charset="0"/>
+              </a:rPr>
+              <a:t>, which converts </a:t>
+            </a:r>
+            <a:r>
+              <a:rPr lang="en-GB" altLang="x-none" sz="1400" b="1" dirty="0">
+                <a:latin typeface="JetBrains Mono" panose="02000009000000000000" pitchFamily="49" charset="0"/>
+                <a:cs typeface="JetBrains Mono" panose="02000009000000000000" pitchFamily="49" charset="0"/>
+              </a:rPr>
+              <a:t>.</a:t>
+            </a:r>
+            <a:r>
+              <a:rPr lang="en-GB" altLang="x-none" sz="1400" b="1" dirty="0" err="1">
+                <a:latin typeface="JetBrains Mono" panose="02000009000000000000" pitchFamily="49" charset="0"/>
+                <a:cs typeface="JetBrains Mono" panose="02000009000000000000" pitchFamily="49" charset="0"/>
+              </a:rPr>
+              <a:t>hecc</a:t>
+            </a:r>
+            <a:r>
+              <a:rPr lang="en-GB" altLang="x-none" sz="1400" dirty="0">
+                <a:latin typeface="JetBrains Mono" panose="02000009000000000000" pitchFamily="49" charset="0"/>
+                <a:cs typeface="JetBrains Mono" panose="02000009000000000000" pitchFamily="49" charset="0"/>
+              </a:rPr>
+              <a:t> code into playable games.</a:t>
+            </a:r>
+          </a:p>
+          <a:p>
+            <a:pPr eaLnBrk="1" hangingPunct="1"/>
+            <a:endParaRPr lang="en-GB" altLang="x-none" sz="1400" dirty="0">
+              <a:latin typeface="JetBrains Mono" panose="02000009000000000000" pitchFamily="49" charset="0"/>
+              <a:cs typeface="JetBrains Mono" panose="02000009000000000000" pitchFamily="49" charset="0"/>
+            </a:endParaRPr>
+          </a:p>
+          <a:p>
+            <a:pPr eaLnBrk="1" hangingPunct="1"/>
+            <a:r>
+              <a:rPr lang="en-GB" altLang="x-none" sz="1400" dirty="0">
+                <a:latin typeface="JetBrains Mono" panose="02000009000000000000" pitchFamily="49" charset="0"/>
+                <a:cs typeface="JetBrains Mono" panose="02000009000000000000" pitchFamily="49" charset="0"/>
+              </a:rPr>
+              <a:t>Following this, I made </a:t>
+            </a:r>
+            <a:r>
+              <a:rPr lang="en-GB" altLang="x-none" sz="1400" b="1" dirty="0">
+                <a:latin typeface="JetBrains Mono" panose="02000009000000000000" pitchFamily="49" charset="0"/>
+                <a:cs typeface="JetBrains Mono" panose="02000009000000000000" pitchFamily="49" charset="0"/>
+              </a:rPr>
+              <a:t>OH-HECC</a:t>
+            </a:r>
+            <a:r>
+              <a:rPr lang="en-GB" altLang="x-none" sz="1400" dirty="0">
+                <a:latin typeface="JetBrains Mono" panose="02000009000000000000" pitchFamily="49" charset="0"/>
+                <a:cs typeface="JetBrains Mono" panose="02000009000000000000" pitchFamily="49" charset="0"/>
+              </a:rPr>
+              <a:t>, </a:t>
+            </a:r>
+            <a:r>
+              <a:rPr lang="en-GB" altLang="x-none" sz="1400">
+                <a:latin typeface="JetBrains Mono" panose="02000009000000000000" pitchFamily="49" charset="0"/>
+                <a:cs typeface="JetBrains Mono" panose="02000009000000000000" pitchFamily="49" charset="0"/>
+              </a:rPr>
+              <a:t>which can </a:t>
+            </a:r>
+            <a:r>
+              <a:rPr lang="en-GB" altLang="x-none" sz="1400" dirty="0">
+                <a:latin typeface="JetBrains Mono" panose="02000009000000000000" pitchFamily="49" charset="0"/>
+                <a:cs typeface="JetBrains Mono" panose="02000009000000000000" pitchFamily="49" charset="0"/>
+              </a:rPr>
+              <a:t>read </a:t>
+            </a:r>
+            <a:r>
+              <a:rPr lang="en-GB" altLang="x-none" sz="1400" b="1" dirty="0">
+                <a:latin typeface="JetBrains Mono" panose="02000009000000000000" pitchFamily="49" charset="0"/>
+                <a:cs typeface="JetBrains Mono" panose="02000009000000000000" pitchFamily="49" charset="0"/>
+              </a:rPr>
+              <a:t>.</a:t>
+            </a:r>
+            <a:r>
+              <a:rPr lang="en-GB" altLang="x-none" sz="1400" b="1" dirty="0" err="1">
+                <a:latin typeface="JetBrains Mono" panose="02000009000000000000" pitchFamily="49" charset="0"/>
+                <a:cs typeface="JetBrains Mono" panose="02000009000000000000" pitchFamily="49" charset="0"/>
+              </a:rPr>
+              <a:t>hecc</a:t>
+            </a:r>
+            <a:r>
+              <a:rPr lang="en-GB" altLang="x-none" sz="1400" dirty="0">
+                <a:latin typeface="JetBrains Mono" panose="02000009000000000000" pitchFamily="49" charset="0"/>
+                <a:cs typeface="JetBrains Mono" panose="02000009000000000000" pitchFamily="49" charset="0"/>
+              </a:rPr>
+              <a:t> files, display them as a network of linked passages, allow the user to edit them, and save the edited </a:t>
+            </a:r>
+            <a:r>
+              <a:rPr lang="en-GB" altLang="x-none" sz="1400" b="1" dirty="0">
+                <a:latin typeface="JetBrains Mono" panose="02000009000000000000" pitchFamily="49" charset="0"/>
+                <a:cs typeface="JetBrains Mono" panose="02000009000000000000" pitchFamily="49" charset="0"/>
+              </a:rPr>
+              <a:t>.</a:t>
+            </a:r>
+            <a:r>
+              <a:rPr lang="en-GB" altLang="x-none" sz="1400" b="1" dirty="0" err="1">
+                <a:latin typeface="JetBrains Mono" panose="02000009000000000000" pitchFamily="49" charset="0"/>
+                <a:cs typeface="JetBrains Mono" panose="02000009000000000000" pitchFamily="49" charset="0"/>
+              </a:rPr>
+              <a:t>hecc</a:t>
+            </a:r>
+            <a:r>
+              <a:rPr lang="en-GB" altLang="x-none" sz="1400" dirty="0">
+                <a:latin typeface="JetBrains Mono" panose="02000009000000000000" pitchFamily="49" charset="0"/>
+                <a:cs typeface="JetBrains Mono" panose="02000009000000000000" pitchFamily="49" charset="0"/>
+              </a:rPr>
+              <a:t> file.</a:t>
+            </a:r>
+          </a:p>
+          <a:p>
+            <a:pPr eaLnBrk="1" hangingPunct="1"/>
+            <a:endParaRPr lang="en-GB" altLang="x-none" sz="1400" dirty="0">
+              <a:latin typeface="JetBrains Mono" panose="02000009000000000000" pitchFamily="49" charset="0"/>
+              <a:cs typeface="JetBrains Mono" panose="02000009000000000000" pitchFamily="49" charset="0"/>
+            </a:endParaRPr>
+          </a:p>
+          <a:p>
+            <a:pPr eaLnBrk="1" hangingPunct="1"/>
+            <a:r>
+              <a:rPr lang="en-GB" altLang="x-none" sz="1400" dirty="0">
+                <a:latin typeface="JetBrains Mono" panose="02000009000000000000" pitchFamily="49" charset="0"/>
+                <a:cs typeface="JetBrains Mono" panose="02000009000000000000" pitchFamily="49" charset="0"/>
+              </a:rPr>
+              <a:t>With the tool made, I proceeded to start authoring a proper hypertext game: </a:t>
+            </a:r>
+            <a:r>
+              <a:rPr lang="en-GB" altLang="x-none" sz="1400" b="1" dirty="0" err="1">
+                <a:latin typeface="JetBrains Mono" panose="02000009000000000000" pitchFamily="49" charset="0"/>
+                <a:cs typeface="JetBrains Mono" panose="02000009000000000000" pitchFamily="49" charset="0"/>
+              </a:rPr>
+              <a:t>Backblast</a:t>
+            </a:r>
+            <a:r>
+              <a:rPr lang="en-GB" altLang="x-none" sz="1400" dirty="0">
+                <a:latin typeface="JetBrains Mono" panose="02000009000000000000" pitchFamily="49" charset="0"/>
+                <a:cs typeface="JetBrains Mono" panose="02000009000000000000" pitchFamily="49" charset="0"/>
+              </a:rPr>
+              <a:t>; a murder mystery where </a:t>
+            </a:r>
+            <a:r>
+              <a:rPr lang="en-GB" altLang="x-none" sz="1400" b="1" dirty="0">
+                <a:latin typeface="JetBrains Mono" panose="02000009000000000000" pitchFamily="49" charset="0"/>
+                <a:cs typeface="JetBrains Mono" panose="02000009000000000000" pitchFamily="49" charset="0"/>
+              </a:rPr>
+              <a:t>you</a:t>
+            </a:r>
+            <a:r>
+              <a:rPr lang="en-GB" altLang="x-none" sz="1400" dirty="0">
+                <a:latin typeface="JetBrains Mono" panose="02000009000000000000" pitchFamily="49" charset="0"/>
+                <a:cs typeface="JetBrains Mono" panose="02000009000000000000" pitchFamily="49" charset="0"/>
+              </a:rPr>
+              <a:t> are the victim.</a:t>
+            </a:r>
+          </a:p>
+          <a:p>
+            <a:pPr eaLnBrk="1" hangingPunct="1"/>
+            <a:endParaRPr lang="en-GB" altLang="x-none" sz="1400" dirty="0">
+              <a:latin typeface="JetBrains Mono" panose="02000009000000000000" pitchFamily="49" charset="0"/>
+              <a:cs typeface="JetBrains Mono" panose="02000009000000000000" pitchFamily="49" charset="0"/>
+            </a:endParaRPr>
+          </a:p>
+          <a:p>
+            <a:pPr eaLnBrk="1" hangingPunct="1"/>
+            <a:r>
+              <a:rPr lang="en-GB" altLang="x-none" sz="1400" dirty="0">
+                <a:latin typeface="JetBrains Mono" panose="02000009000000000000" pitchFamily="49" charset="0"/>
+                <a:cs typeface="JetBrains Mono" panose="02000009000000000000" pitchFamily="49" charset="0"/>
+              </a:rPr>
+              <a:t>I have been adding further features to the tool and the outputs since then, such as conditional statements, markdown, and integrating the tool into one program.</a:t>
+            </a:r>
+            <a:endParaRPr lang="x-none" altLang="x-none" sz="1400" dirty="0">
+              <a:latin typeface="JetBrains Mono" panose="02000009000000000000" pitchFamily="49" charset="0"/>
+              <a:cs typeface="JetBrains Mono" panose="02000009000000000000" pitchFamily="49" charset="0"/>
+            </a:endParaRPr>
           </a:p>
         </p:txBody>
       </p:sp>
@@ -4513,8 +5316,8 @@
         </p:nvSpPr>
         <p:spPr bwMode="auto">
           <a:xfrm>
-            <a:off x="11396663" y="5064483"/>
-            <a:ext cx="3540125" cy="2226434"/>
+            <a:off x="11396663" y="5064482"/>
+            <a:ext cx="3540125" cy="2277248"/>
           </a:xfrm>
           <a:prstGeom prst="rect">
             <a:avLst/>
@@ -4666,7 +5469,21 @@
                 <a:latin typeface="JetBrains Mono" panose="02000009000000000000" pitchFamily="49" charset="0"/>
                 <a:cs typeface="JetBrains Mono" panose="02000009000000000000" pitchFamily="49" charset="0"/>
               </a:rPr>
-              <a:t>; the editing GUI) showing the network of passages for an example game.</a:t>
+              <a:t>; the editing GUI) showing the network of passages for an example game. (</a:t>
+            </a:r>
+            <a:r>
+              <a:rPr lang="en-GB" altLang="x-none" sz="1400" i="1" dirty="0" err="1">
+                <a:latin typeface="JetBrains Mono" panose="02000009000000000000" pitchFamily="49" charset="0"/>
+                <a:cs typeface="JetBrains Mono" panose="02000009000000000000" pitchFamily="49" charset="0"/>
+              </a:rPr>
+              <a:t>Backblast</a:t>
+            </a:r>
+            <a:r>
+              <a:rPr lang="en-GB" altLang="x-none" sz="1400" dirty="0">
+                <a:latin typeface="JetBrains Mono" panose="02000009000000000000" pitchFamily="49" charset="0"/>
+                <a:cs typeface="JetBrains Mono" panose="02000009000000000000" pitchFamily="49" charset="0"/>
+              </a:rPr>
+              <a:t> was too big to fit on this poster)</a:t>
             </a:r>
           </a:p>
           <a:p>
@@ -4683,7 +5500,7 @@
                 <a:latin typeface="JetBrains Mono" panose="02000009000000000000" pitchFamily="49" charset="0"/>
                 <a:cs typeface="JetBrains Mono" panose="02000009000000000000" pitchFamily="49" charset="0"/>
               </a:rPr>
-              <a:t>Below: A screenshot of the start passage for that game after exporting it via </a:t>
+              <a:t>Below: A screenshot from that game after exporting it via </a:t>
             </a:r>
             <a:r>
               <a:rPr lang="en-GB" altLang="x-none" sz="1400" b="1" dirty="0">
@@ -4704,7 +5521,7 @@
                 <a:latin typeface="JetBrains Mono" panose="02000009000000000000" pitchFamily="49" charset="0"/>
                 <a:cs typeface="JetBrains Mono" panose="02000009000000000000" pitchFamily="49" charset="0"/>
               </a:rPr>
-              <a:t>(HECC Ultra Parser)</a:t>
+              <a:t>(HECC Ultra Parser).</a:t>
             </a:r>
             <a:endParaRPr lang="en-GB" altLang="x-none" sz="1400" dirty="0">
               <a:latin typeface="JetBrains Mono" panose="02000009000000000000" pitchFamily="49" charset="0"/>
@@ -4888,7 +5705,7 @@
           <p:nvPr/>
         </p:nvPicPr>
         <p:blipFill>
-          <a:blip r:embed="rId4"/>
+          <a:blip r:embed="rId5"/>
           <a:stretch>
             <a:fillRect/>
           </a:stretch>
@@ -4918,85 +5735,15 @@
           <p:nvPr/>
         </p:nvPicPr>
         <p:blipFill>
-          <a:blip r:embed="rId5"/>
+          <a:blip r:embed="rId6"/>
           <a:stretch>
             <a:fillRect/>
           </a:stretch>
         </p:blipFill>
         <p:spPr>
           <a:xfrm>
-            <a:off x="11396663" y="7320058"/>
-            <a:ext cx="3540125" cy="1569829"/>
-          </a:xfrm>
-          <a:prstGeom prst="rect">
-            <a:avLst/>
-          </a:prstGeom>
-        </p:spPr>
-      </p:pic>
-      <p:pic>
-        <p:nvPicPr>
-          <p:cNvPr id="9" name="Picture 8">
-            <a:extLst>
-              <a:ext uri="{FF2B5EF4-FFF2-40B4-BE49-F238E27FC236}">
-                <a16:creationId xmlns:a16="http://schemas.microsoft.com/office/drawing/2014/main" id="{0667EB7A-ED59-4205-A92D-0DBE92B30D17}"/>
-              </a:ext>
-            </a:extLst>
-          </p:cNvPr>
-          <p:cNvPicPr>
-            <a:picLocks noChangeAspect="1"/>
-          </p:cNvPicPr>
-          <p:nvPr/>
-        </p:nvPicPr>
-        <p:blipFill rotWithShape="1">
-          <a:blip r:embed="rId6">
-            <a:extLst>
-              <a:ext uri="{28A0092B-C50C-407E-A947-70E740481C1C}">
-                <a14:useLocalDpi xmlns:a14="http://schemas.microsoft.com/office/drawing/2010/main" val="0"/>
-              </a:ext>
-            </a:extLst>
-          </a:blip>
-          <a:srcRect l="10069" t="5952" r="10311" b="4884"/>
-          <a:stretch/>
-        </p:blipFill>
-        <p:spPr>
-          <a:xfrm>
-            <a:off x="-2953586" y="846212"/>
-            <a:ext cx="2366604" cy="5300695"/>
-          </a:xfrm>
-          <a:prstGeom prst="rect">
-            <a:avLst/>
-          </a:prstGeom>
-        </p:spPr>
-      </p:pic>
-      <p:pic>
-        <p:nvPicPr>
-          <p:cNvPr id="11" name="Picture 10">
-            <a:extLst>
-              <a:ext uri="{FF2B5EF4-FFF2-40B4-BE49-F238E27FC236}">
-                <a16:creationId xmlns:a16="http://schemas.microsoft.com/office/drawing/2014/main" id="{89DFD54A-10E2-424A-9BBE-FFC3EF52FDF1}"/>
-              </a:ext>
-            </a:extLst>
-          </p:cNvPr>
-          <p:cNvPicPr>
-            <a:picLocks noChangeAspect="1"/>
-          </p:cNvPicPr>
-          <p:nvPr/>
-        </p:nvPicPr>
-        <p:blipFill rotWithShape="1">
-          <a:blip r:embed="rId7">
-            <a:extLst>
-              <a:ext uri="{28A0092B-C50C-407E-A947-70E740481C1C}">
-                <a14:useLocalDpi xmlns:a14="http://schemas.microsoft.com/office/drawing/2010/main" val="0"/>
-              </a:ext>
-            </a:extLst>
-          </a:blip>
-          <a:srcRect l="6229" t="4404" r="8127" b="5035"/>
-          <a:stretch/>
-        </p:blipFill>
-        <p:spPr>
-          <a:xfrm>
-            <a:off x="-6912346" y="7259156"/>
-            <a:ext cx="3554057" cy="5010797"/>
+            <a:off x="11396664" y="7360779"/>
+            <a:ext cx="3540124" cy="1569829"/>
           </a:xfrm>
           <a:prstGeom prst="rect">
             <a:avLst/>
@@ -5018,7 +5765,7 @@
           <p:nvPr/>
         </p:nvPicPr>
         <p:blipFill rotWithShape="1">
-          <a:blip r:embed="rId8">
+          <a:blip r:embed="rId7">
             <a:extLst>
               <a:ext uri="{28A0092B-C50C-407E-A947-70E740481C1C}">
                 <a14:useLocalDpi xmlns:a14="http://schemas.microsoft.com/office/drawing/2010/main" val="0"/>
@@ -5038,6 +5785,207 @@
           </a:prstGeom>
         </p:spPr>
       </p:pic>
+      <p:sp>
+        <p:nvSpPr>
+          <p:cNvPr id="17" name="Rectangle 10">
+            <a:extLst>
+              <a:ext uri="{FF2B5EF4-FFF2-40B4-BE49-F238E27FC236}">
+                <a16:creationId xmlns:a16="http://schemas.microsoft.com/office/drawing/2014/main" id="{CCDBAC73-A8E9-49D9-8B47-BFD5D0D2C002}"/>
+              </a:ext>
+            </a:extLst>
+          </p:cNvPr>
+          <p:cNvSpPr>
+            <a:spLocks noChangeArrowheads="1"/>
+          </p:cNvSpPr>
+          <p:nvPr/>
+        </p:nvSpPr>
+        <p:spPr bwMode="auto">
+          <a:xfrm>
+            <a:off x="11400025" y="9097961"/>
+            <a:ext cx="3540125" cy="1206099"/>
+          </a:xfrm>
+          <a:prstGeom prst="rect">
+            <a:avLst/>
+          </a:prstGeom>
+          <a:solidFill>
+            <a:schemeClr val="bg1"/>
+          </a:solidFill>
+          <a:ln w="9525">
+            <a:solidFill>
+              <a:schemeClr val="tx1"/>
+            </a:solidFill>
+            <a:miter lim="800000"/>
+            <a:headEnd/>
+            <a:tailEnd/>
+          </a:ln>
+        </p:spPr>
+        <p:txBody>
+          <a:bodyPr/>
+          <a:lstStyle>
+            <a:lvl1pPr eaLnBrk="0" hangingPunct="0">
+              <a:defRPr sz="2900">
+                <a:solidFill>
+                  <a:schemeClr val="tx1"/>
+                </a:solidFill>
+                <a:latin typeface="Arial" charset="0"/>
+              </a:defRPr>
+            </a:lvl1pPr>
+            <a:lvl2pPr marL="742950" indent="-285750" eaLnBrk="0" hangingPunct="0">
+              <a:defRPr sz="2900">
+                <a:solidFill>
+                  <a:schemeClr val="tx1"/>
+                </a:solidFill>
+                <a:latin typeface="Arial" charset="0"/>
+              </a:defRPr>
+            </a:lvl2pPr>
+            <a:lvl3pPr marL="1143000" indent="-228600" eaLnBrk="0" hangingPunct="0">
+              <a:defRPr sz="2900">
+                <a:solidFill>
+                  <a:schemeClr val="tx1"/>
+                </a:solidFill>
+                <a:latin typeface="Arial" charset="0"/>
+              </a:defRPr>
+            </a:lvl3pPr>
+            <a:lvl4pPr marL="1600200" indent="-228600" eaLnBrk="0" hangingPunct="0">
+              <a:defRPr sz="2900">
+                <a:solidFill>
+                  <a:schemeClr val="tx1"/>
+                </a:solidFill>
+                <a:latin typeface="Arial" charset="0"/>
+              </a:defRPr>
+            </a:lvl4pPr>
+            <a:lvl5pPr marL="2057400" indent="-228600" eaLnBrk="0" hangingPunct="0">
+              <a:defRPr sz="2900">
+                <a:solidFill>
+                  <a:schemeClr val="tx1"/>
+                </a:solidFill>
+                <a:latin typeface="Arial" charset="0"/>
+              </a:defRPr>
+            </a:lvl5pPr>
+            <a:lvl6pPr marL="2514600" indent="-228600" eaLnBrk="0" fontAlgn="base" hangingPunct="0">
+              <a:spcBef>
+                <a:spcPct val="0"/>
+              </a:spcBef>
+              <a:spcAft>
+                <a:spcPct val="0"/>
+              </a:spcAft>
+              <a:defRPr sz="2900">
+                <a:solidFill>
+                  <a:schemeClr val="tx1"/>
+                </a:solidFill>
+                <a:latin typeface="Arial" charset="0"/>
+              </a:defRPr>
+            </a:lvl6pPr>
+            <a:lvl7pPr marL="2971800" indent="-228600" eaLnBrk="0" fontAlgn="base" hangingPunct="0">
+              <a:spcBef>
+                <a:spcPct val="0"/>
+              </a:spcBef>
+              <a:spcAft>
+                <a:spcPct val="0"/>
+              </a:spcAft>
+              <a:defRPr sz="2900">
+                <a:solidFill>
+                  <a:schemeClr val="tx1"/>
+                </a:solidFill>
+                <a:latin typeface="Arial" charset="0"/>
+              </a:defRPr>
+            </a:lvl7pPr>
+            <a:lvl8pPr marL="3429000" indent="-228600" eaLnBrk="0" fontAlgn="base" hangingPunct="0">
+              <a:spcBef>
+                <a:spcPct val="0"/>
+              </a:spcBef>
+              <a:spcAft>
+                <a:spcPct val="0"/>
+              </a:spcAft>
+              <a:defRPr sz="2900">
+                <a:solidFill>
+                  <a:schemeClr val="tx1"/>
+                </a:solidFill>
+                <a:latin typeface="Arial" charset="0"/>
+              </a:defRPr>
+            </a:lvl8pPr>
+            <a:lvl9pPr marL="3886200" indent="-228600" eaLnBrk="0" fontAlgn="base" hangingPunct="0">
+              <a:spcBef>
+                <a:spcPct val="0"/>
+              </a:spcBef>
+              <a:spcAft>
+                <a:spcPct val="0"/>
+              </a:spcAft>
+              <a:defRPr sz="2900">
+                <a:solidFill>
+                  <a:schemeClr val="tx1"/>
+                </a:solidFill>
+                <a:latin typeface="Arial" charset="0"/>
+              </a:defRPr>
+            </a:lvl9pPr>
+          </a:lstStyle>
+          <a:p>
+            <a:pPr eaLnBrk="1" hangingPunct="1"/>
+            <a:r>
+              <a:rPr lang="en-GB" altLang="x-none" sz="1400" dirty="0">
+                <a:latin typeface="JetBrains Mono" panose="02000009000000000000" pitchFamily="49" charset="0"/>
+                <a:cs typeface="JetBrains Mono" panose="02000009000000000000" pitchFamily="49" charset="0"/>
+              </a:rPr>
+              <a:t>If </a:t>
+            </a:r>
+            <a:r>
+              <a:rPr lang="en-GB" altLang="x-none" sz="1400" b="1" dirty="0">
+                <a:latin typeface="JetBrains Mono" panose="02000009000000000000" pitchFamily="49" charset="0"/>
+                <a:cs typeface="JetBrains Mono" panose="02000009000000000000" pitchFamily="49" charset="0"/>
+              </a:rPr>
+              <a:t>you</a:t>
+            </a:r>
+            <a:r>
+              <a:rPr lang="en-GB" altLang="x-none" sz="1400" dirty="0">
+                <a:latin typeface="JetBrains Mono" panose="02000009000000000000" pitchFamily="49" charset="0"/>
+                <a:cs typeface="JetBrains Mono" panose="02000009000000000000" pitchFamily="49" charset="0"/>
+              </a:rPr>
+              <a:t> want to play some of the </a:t>
+            </a:r>
+            <a:r>
+              <a:rPr lang="en-GB" altLang="x-none" sz="1400" b="1" dirty="0">
+                <a:latin typeface="JetBrains Mono" panose="02000009000000000000" pitchFamily="49" charset="0"/>
+                <a:cs typeface="JetBrains Mono" panose="02000009000000000000" pitchFamily="49" charset="0"/>
+              </a:rPr>
+              <a:t>HECC-IT</a:t>
+            </a:r>
+            <a:r>
+              <a:rPr lang="en-GB" altLang="x-none" sz="1400" dirty="0">
+                <a:latin typeface="JetBrains Mono" panose="02000009000000000000" pitchFamily="49" charset="0"/>
+                <a:cs typeface="JetBrains Mono" panose="02000009000000000000" pitchFamily="49" charset="0"/>
+              </a:rPr>
+              <a:t> demonstration games, you can play them here:</a:t>
+            </a:r>
+          </a:p>
+          <a:p>
+            <a:pPr eaLnBrk="1" hangingPunct="1"/>
+            <a:r>
+              <a:rPr lang="en-GB" altLang="x-none" sz="1600" b="1" dirty="0">
+                <a:solidFill>
+                  <a:srgbClr val="0000FF"/>
+                </a:solidFill>
+                <a:latin typeface="JetBrains Mono" panose="02000009000000000000" pitchFamily="49" charset="0"/>
+                <a:cs typeface="JetBrains Mono" panose="02000009000000000000" pitchFamily="49" charset="0"/>
+                <a:hlinkClick r:id="rId8">
+                  <a:extLst>
+                    <a:ext uri="{A12FA001-AC4F-418D-AE19-62706E023703}">
+                      <ahyp:hlinkClr xmlns:ahyp="http://schemas.microsoft.com/office/drawing/2018/hyperlinkcolor" val="tx"/>
+                    </a:ext>
+                  </a:extLst>
+                </a:hlinkClick>
+              </a:rPr>
+              <a:t>https://11belowstudio.itch.io/the-hecc-it-demo</a:t>
+            </a:r>
+            <a:endParaRPr lang="en-GB" altLang="x-none" sz="1600" b="1" dirty="0">
+              <a:solidFill>
+                <a:srgbClr val="0000FF"/>
+              </a:solidFill>
+              <a:latin typeface="JetBrains Mono" panose="02000009000000000000" pitchFamily="49" charset="0"/>
+              <a:cs typeface="JetBrains Mono" panose="02000009000000000000" pitchFamily="49" charset="0"/>
+            </a:endParaRPr>
+          </a:p>
+        </p:txBody>
+      </p:sp>
     </p:spTree>
   </p:cSld>
   <p:clrMapOvr>
@@ -5889,13 +6837,317 @@
 </a:theme>
 </file>
 
+<file path=ppt/theme/theme2.xml><?xml version="1.0" encoding="utf-8"?>
+<a:theme xmlns:a="http://schemas.openxmlformats.org/drawingml/2006/main" name="Office Theme">
+  <a:themeElements>
+    <a:clrScheme name="Office">
+      <a:dk1>
+        <a:sysClr val="windowText" lastClr="000000"/>
+      </a:dk1>
+      <a:lt1>
+        <a:sysClr val="window" lastClr="FFFFFF"/>
+      </a:lt1>
+      <a:dk2>
+        <a:srgbClr val="44546A"/>
+      </a:dk2>
+      <a:lt2>
+        <a:srgbClr val="E7E6E6"/>
+      </a:lt2>
+      <a:accent1>
+        <a:srgbClr val="4472C4"/>
+      </a:accent1>
+      <a:accent2>
+        <a:srgbClr val="ED7D31"/>
+      </a:accent2>
+      <a:accent3>
+        <a:srgbClr val="A5A5A5"/>
+      </a:accent3>
+      <a:accent4>
+        <a:srgbClr val="FFC000"/>
+      </a:accent4>
+      <a:accent5>
+        <a:srgbClr val="5B9BD5"/>
+      </a:accent5>
+      <a:accent6>
+        <a:srgbClr val="70AD47"/>
+      </a:accent6>
+      <a:hlink>
+        <a:srgbClr val="0563C1"/>
+      </a:hlink>
+      <a:folHlink>
+        <a:srgbClr val="954F72"/>
+      </a:folHlink>
+    </a:clrScheme>
+    <a:fontScheme name="Office">
+      <a:majorFont>
+        <a:latin typeface="Calibri Light" panose="020F0302020204030204"/>
+        <a:ea typeface=""/>
+        <a:cs typeface=""/>
+        <a:font script="Jpan" typeface="游ゴシック Light"/>
+        <a:font script="Hang" typeface="맑은 고딕"/>
+        <a:font script="Hans" typeface="等线 Light"/>
+        <a:font script="Hant" typeface="新細明體"/>
+        <a:font script="Arab" typeface="Times New Roman"/>
+        <a:font script="Hebr" typeface="Times New Roman"/>
+        <a:font script="Thai" typeface="Angsana New"/>
+        <a:font script="Ethi" typeface="Nyala"/>
+        <a:font script="Beng" typeface="Vrinda"/>
+        <a:font script="Gujr" typeface="Shruti"/>
+        <a:font script="Khmr" typeface="MoolBoran"/>
+        <a:font script="Knda" typeface="Tunga"/>
+        <a:font script="Guru" typeface="Raavi"/>
+        <a:font script="Cans" typeface="Euphemia"/>
+        <a:font script="Cher" typeface="Plantagenet Cherokee"/>
+        <a:font script="Yiii" typeface="Microsoft Yi Baiti"/>
+        <a:font script="Tibt" typeface="Microsoft Himalaya"/>
+        <a:font script="Thaa" typeface="MV Boli"/>
+        <a:font script="Deva" typeface="Mangal"/>
+        <a:font script="Telu" typeface="Gautami"/>
+        <a:font script="Taml" typeface="Latha"/>
+        <a:font script="Syrc" typeface="Estrangelo Edessa"/>
+        <a:font script="Orya" typeface="Kalinga"/>
+        <a:font script="Mlym" typeface="Kartika"/>
+        <a:font script="Laoo" typeface="DokChampa"/>
+        <a:font script="Sinh" typeface="Iskoola Pota"/>
+        <a:font script="Mong" typeface="Mongolian Baiti"/>
+        <a:font script="Viet" typeface="Times New Roman"/>
+        <a:font script="Uigh" typeface="Microsoft Uighur"/>
+        <a:font script="Geor" typeface="Sylfaen"/>
+        <a:font script="Armn" typeface="Arial"/>
+        <a:font script="Bugi" typeface="Leelawadee UI"/>
+        <a:font script="Bopo" typeface="Microsoft JhengHei"/>
+        <a:font script="Java" typeface="Javanese Text"/>
+        <a:font script="Lisu" typeface="Segoe UI"/>
+        <a:font script="Mymr" typeface="Myanmar Text"/>
+        <a:font script="Nkoo" typeface="Ebrima"/>
+        <a:font script="Olck" typeface="Nirmala UI"/>
+        <a:font script="Osma" typeface="Ebrima"/>
+        <a:font script="Phag" typeface="Phagspa"/>
+        <a:font script="Syrn" typeface="Estrangelo Edessa"/>
+        <a:font script="Syrj" typeface="Estrangelo Edessa"/>
+        <a:font script="Syre" typeface="Estrangelo Edessa"/>
+        <a:font script="Sora" typeface="Nirmala UI"/>
+        <a:font script="Tale" typeface="Microsoft Tai Le"/>
+        <a:font script="Talu" typeface="Microsoft New Tai Lue"/>
+        <a:font script="Tfng" typeface="Ebrima"/>
+      </a:majorFont>
+      <a:minorFont>
+        <a:latin typeface="Calibri" panose="020F0502020204030204"/>
+        <a:ea typeface=""/>
+        <a:cs typeface=""/>
+        <a:font script="Jpan" typeface="游ゴシック"/>
+        <a:font script="Hang" typeface="맑은 고딕"/>
+        <a:font script="Hans" typeface="等线"/>
+        <a:font script="Hant" typeface="新細明體"/>
+        <a:font script="Arab" typeface="Arial"/>
+        <a:font script="Hebr" typeface="Arial"/>
+        <a:font script="Thai" typeface="Cordia New"/>
+        <a:font script="Ethi" typeface="Nyala"/>
+        <a:font script="Beng" typeface="Vrinda"/>
+        <a:font script="Gujr" typeface="Shruti"/>
+        <a:font script="Khmr" typeface="DaunPenh"/>
+        <a:font script="Knda" typeface="Tunga"/>
+        <a:font script="Guru" typeface="Raavi"/>
+        <a:font script="Cans" typeface="Euphemia"/>
+        <a:font script="Cher" typeface="Plantagenet Cherokee"/>
+        <a:font script="Yiii" typeface="Microsoft Yi Baiti"/>
+        <a:font script="Tibt" typeface="Microsoft Himalaya"/>
+        <a:font script="Thaa" typeface="MV Boli"/>
+        <a:font script="Deva" typeface="Mangal"/>
+        <a:font script="Telu" typeface="Gautami"/>
+        <a:font script="Taml" typeface="Latha"/>
+        <a:font script="Syrc" typeface="Estrangelo Edessa"/>
+        <a:font script="Orya" typeface="Kalinga"/>
+        <a:font script="Mlym" typeface="Kartika"/>
+        <a:font script="Laoo" typeface="DokChampa"/>
+        <a:font script="Sinh" typeface="Iskoola Pota"/>
+        <a:font script="Mong" typeface="Mongolian Baiti"/>
+        <a:font script="Viet" typeface="Arial"/>
+        <a:font script="Uigh" typeface="Microsoft Uighur"/>
+        <a:font script="Geor" typeface="Sylfaen"/>
+        <a:font script="Armn" typeface="Arial"/>
+        <a:font script="Bugi" typeface="Leelawadee UI"/>
+        <a:font script="Bopo" typeface="Microsoft JhengHei"/>
+        <a:font script="Java" typeface="Javanese Text"/>
+        <a:font script="Lisu" typeface="Segoe UI"/>
+        <a:font script="Mymr" typeface="Myanmar Text"/>
+        <a:font script="Nkoo" typeface="Ebrima"/>
+        <a:font script="Olck" typeface="Nirmala UI"/>
+        <a:font script="Osma" typeface="Ebrima"/>
+        <a:font script="Phag" typeface="Phagspa"/>
+        <a:font script="Syrn" typeface="Estrangelo Edessa"/>
+        <a:font script="Syrj" typeface="Estrangelo Edessa"/>
+        <a:font script="Syre" typeface="Estrangelo Edessa"/>
+        <a:font script="Sora" typeface="Nirmala UI"/>
+        <a:font script="Tale" typeface="Microsoft Tai Le"/>
+        <a:font script="Talu" typeface="Microsoft New Tai Lue"/>
+        <a:font script="Tfng" typeface="Ebrima"/>
+      </a:minorFont>
+    </a:fontScheme>
+    <a:fmtScheme name="Office">
+      <a:fillStyleLst>
+        <a:solidFill>
+          <a:schemeClr val="phClr"/>
+        </a:solidFill>
+        <a:gradFill rotWithShape="1">
+          <a:gsLst>
+            <a:gs pos="0">
+              <a:schemeClr val="phClr">
+                <a:lumMod val="110000"/>
+                <a:satMod val="105000"/>
+                <a:tint val="67000"/>
+              </a:schemeClr>
+            </a:gs>
+            <a:gs pos="50000">
+              <a:schemeClr val="phClr">
+                <a:lumMod val="105000"/>
+                <a:satMod val="103000"/>
+                <a:tint val="73000"/>
+              </a:schemeClr>
+            </a:gs>
+            <a:gs pos="100000">
+              <a:schemeClr val="phClr">
+                <a:lumMod val="105000"/>
+                <a:satMod val="109000"/>
+                <a:tint val="81000"/>
+              </a:schemeClr>
+            </a:gs>
+          </a:gsLst>
+          <a:lin ang="5400000" scaled="0"/>
+        </a:gradFill>
+        <a:gradFill rotWithShape="1">
+          <a:gsLst>
+            <a:gs pos="0">
+              <a:schemeClr val="phClr">
+                <a:satMod val="103000"/>
+                <a:lumMod val="102000"/>
+                <a:tint val="94000"/>
+              </a:schemeClr>
+            </a:gs>
+            <a:gs pos="50000">
+              <a:schemeClr val="phClr">
+                <a:satMod val="110000"/>
+                <a:lumMod val="100000"/>
+                <a:shade val="100000"/>
+              </a:schemeClr>
+            </a:gs>
+            <a:gs pos="100000">
+              <a:schemeClr val="phClr">
+                <a:lumMod val="99000"/>
+                <a:satMod val="120000"/>
+                <a:shade val="78000"/>
+              </a:schemeClr>
+            </a:gs>
+          </a:gsLst>
+          <a:lin ang="5400000" scaled="0"/>
+        </a:gradFill>
+      </a:fillStyleLst>
+      <a:lnStyleLst>
+        <a:ln w="6350" cap="flat" cmpd="sng" algn="ctr">
+          <a:solidFill>
+            <a:schemeClr val="phClr"/>
+          </a:solidFill>
+          <a:prstDash val="solid"/>
+          <a:miter lim="800000"/>
+        </a:ln>
+        <a:ln w="12700" cap="flat" cmpd="sng" algn="ctr">
+          <a:solidFill>
+            <a:schemeClr val="phClr"/>
+          </a:solidFill>
+          <a:prstDash val="solid"/>
+          <a:miter lim="800000"/>
+        </a:ln>
+        <a:ln w="19050" cap="flat" cmpd="sng" algn="ctr">
+          <a:solidFill>
+            <a:schemeClr val="phClr"/>
+          </a:solidFill>
+          <a:prstDash val="solid"/>
+          <a:miter lim="800000"/>
+        </a:ln>
+      </a:lnStyleLst>
+      <a:effectStyleLst>
+        <a:effectStyle>
+          <a:effectLst/>
+        </a:effectStyle>
+        <a:effectStyle>
+          <a:effectLst/>
+        </a:effectStyle>
+        <a:effectStyle>
+          <a:effectLst>
+            <a:outerShdw blurRad="57150" dist="19050" dir="5400000" algn="ctr" rotWithShape="0">
+              <a:srgbClr val="000000">
+                <a:alpha val="63000"/>
+              </a:srgbClr>
+            </a:outerShdw>
+          </a:effectLst>
+        </a:effectStyle>
+      </a:effectStyleLst>
+      <a:bgFillStyleLst>
+        <a:solidFill>
+          <a:schemeClr val="phClr"/>
+        </a:solidFill>
+        <a:solidFill>
+          <a:schemeClr val="phClr">
+            <a:tint val="95000"/>
+            <a:satMod val="170000"/>
+          </a:schemeClr>
+        </a:solidFill>
+        <a:gradFill rotWithShape="1">
+          <a:gsLst>
+            <a:gs pos="0">
+              <a:schemeClr val="phClr">
+                <a:tint val="93000"/>
+                <a:satMod val="150000"/>
+                <a:shade val="98000"/>
+                <a:lumMod val="102000"/>
+              </a:schemeClr>
+            </a:gs>
+            <a:gs pos="50000">
+              <a:schemeClr val="phClr">
+                <a:tint val="98000"/>
+                <a:satMod val="130000"/>
+                <a:shade val="90000"/>
+                <a:lumMod val="103000"/>
+              </a:schemeClr>
+            </a:gs>
+            <a:gs pos="100000">
+              <a:schemeClr val="phClr">
+                <a:shade val="63000"/>
+                <a:satMod val="120000"/>
+              </a:schemeClr>
+            </a:gs>
+          </a:gsLst>
+          <a:lin ang="5400000" scaled="0"/>
+        </a:gradFill>
+      </a:bgFillStyleLst>
+    </a:fmtScheme>
+  </a:themeElements>
+  <a:objectDefaults/>
+  <a:extraClrSchemeLst/>
+  <a:extLst>
+    <a:ext uri="{05A4C25C-085E-4340-85A3-A5531E510DB2}">
+      <thm15:themeFamily xmlns:thm15="http://schemas.microsoft.com/office/thememl/2012/main" name="Office Theme" id="{62F939B6-93AF-4DB8-9C6B-D6C7DFDC589F}" vid="{4A3C46E8-61CC-4603-A589-7422A47A8E4A}"/>
+    </a:ext>
+  </a:extLst>
+</a:theme>
+</file>
+
 <file path=customXml/item1.xml><?xml version="1.0" encoding="utf-8"?>
+<?mso-contentType ?>
+<FormTemplates xmlns="http://schemas.microsoft.com/sharepoint/v3/contenttype/forms">
+  <Display>DocumentLibraryForm</Display>
+  <Edit>DocumentLibraryForm</Edit>
+  <New>DocumentLibraryForm</New>
+</FormTemplates>
+</file>
+
+<file path=customXml/item2.xml><?xml version="1.0" encoding="utf-8"?>
 <p:properties xmlns:p="http://schemas.microsoft.com/office/2006/metadata/properties" xmlns:xsi="http://www.w3.org/2001/XMLSchema-instance" xmlns:pc="http://schemas.microsoft.com/office/infopath/2007/PartnerControls">
   <documentManagement/>
 </p:properties>
 </file>
 
-<file path=customXml/item2.xml><?xml version="1.0" encoding="utf-8"?>
+<file path=customXml/item3.xml><?xml version="1.0" encoding="utf-8"?>
 <ct:contentTypeSchema xmlns:ct="http://schemas.microsoft.com/office/2006/metadata/contentType" xmlns:ma="http://schemas.microsoft.com/office/2006/metadata/properties/metaAttributes" ct:_="" ma:_="" ma:contentTypeName="Document" ma:contentTypeID="0x0101009F5618C6EA47144F98176975A51512E3" ma:contentTypeVersion="13" ma:contentTypeDescription="Create a new document." ma:contentTypeScope="" ma:versionID="ae9ce622c04d7ebad9410625498d08ea">
   <xsd:schema xmlns:xsd="http://www.w3.org/2001/XMLSchema" xmlns:xs="http://www.w3.org/2001/XMLSchema" xmlns:p="http://schemas.microsoft.com/office/2006/metadata/properties" xmlns:ns3="a9644998-0f43-4a12-9bff-883b17382285" xmlns:ns4="378297c8-0ee1-4ccb-95ba-390b2a98be1e" targetNamespace="http://schemas.microsoft.com/office/2006/metadata/properties" ma:root="true" ma:fieldsID="c7ff2d01485aa5870645acc7afabfd5d" ns3:_="" ns4:_="">
     <xsd:import namespace="a9644998-0f43-4a12-9bff-883b17382285"/>
@@ -6118,16 +7370,15 @@
 </ct:contentTypeSchema>
 </file>
 
-<file path=customXml/item3.xml><?xml version="1.0" encoding="utf-8"?>
-<?mso-contentType ?>
-<FormTemplates xmlns="http://schemas.microsoft.com/sharepoint/v3/contenttype/forms">
-  <Display>DocumentLibraryForm</Display>
-  <Edit>DocumentLibraryForm</Edit>
-  <New>DocumentLibraryForm</New>
-</FormTemplates>
+<file path=customXml/itemProps1.xml><?xml version="1.0" encoding="utf-8"?>
+<ds:datastoreItem xmlns:ds="http://schemas.openxmlformats.org/officeDocument/2006/customXml" ds:itemID="{54D0D3C5-34E4-4C50-AEF0-1975AC22AD53}">
+  <ds:schemaRefs>
+    <ds:schemaRef ds:uri="http://schemas.microsoft.com/sharepoint/v3/contenttype/forms"/>
+  </ds:schemaRefs>
+</ds:datastoreItem>
 </file>
 
-<file path=customXml/itemProps1.xml><?xml version="1.0" encoding="utf-8"?>
+<file path=customXml/itemProps2.xml><?xml version="1.0" encoding="utf-8"?>
 <ds:datastoreItem xmlns:ds="http://schemas.openxmlformats.org/officeDocument/2006/customXml" ds:itemID="{1008306C-5399-4C69-807E-BB34856E2D0D}">
   <ds:schemaRefs>
     <ds:schemaRef ds:uri="http://schemas.openxmlformats.org/package/2006/metadata/core-properties"/>
@@ -6144,7 +7395,7 @@
 </ds:datastoreItem>
 </file>
 
-<file path=customXml/itemProps2.xml><?xml version="1.0" encoding="utf-8"?>
+<file path=customXml/itemProps3.xml><?xml version="1.0" encoding="utf-8"?>
 <ds:datastoreItem xmlns:ds="http://schemas.openxmlformats.org/officeDocument/2006/customXml" ds:itemID="{C4687DC3-270C-4474-9FBF-721009BF8949}">
   <ds:schemaRefs>
     <ds:schemaRef ds:uri="http://schemas.microsoft.com/office/2006/metadata/contentType"/>
@@ -6161,12 +7412,4 @@
     <ds:schemaRef ds:uri="http://schemas.microsoft.com/internal/obd"/>
   </ds:schemaRefs>
 </ds:datastoreItem>
-</file>
-
-<file path=customXml/itemProps3.xml><?xml version="1.0" encoding="utf-8"?>
-<ds:datastoreItem xmlns:ds="http://schemas.openxmlformats.org/officeDocument/2006/customXml" ds:itemID="{54D0D3C5-34E4-4C50-AEF0-1975AC22AD53}">
-  <ds:schemaRefs>
-    <ds:schemaRef ds:uri="http://schemas.microsoft.com/sharepoint/v3/contenttype/forms"/>
-  </ds:schemaRefs>
-</ds:datastoreItem>
 </file>
</xml_diff>

<commit_message>
A bit more progress has been made on the poster, in response to some feedback about the last version.
</commit_message>
<xml_diff>
--- a/Reports n such/Rachel Lowe CE301 Poster HECC-IT.pptx
+++ b/Reports n such/Rachel Lowe CE301 Poster HECC-IT.pptx
@@ -148,7 +148,7 @@
 <file path=ppt/revisionInfo.xml><?xml version="1.0" encoding="utf-8"?>
 <p1510:revInfo xmlns:a="http://schemas.openxmlformats.org/drawingml/2006/main" xmlns:r="http://schemas.openxmlformats.org/officeDocument/2006/relationships" xmlns:p1510="http://schemas.microsoft.com/office/powerpoint/2015/10/main">
   <p1510:revLst>
-    <p1510:client id="{80124DFA-92C9-4288-9C22-33F59D9B1A00}" v="8" dt="2021-03-12T12:06:41.178"/>
+    <p1510:client id="{80124DFA-92C9-4288-9C22-33F59D9B1A00}" v="10" dt="2021-03-12T13:54:23.449"/>
   </p1510:revLst>
 </p1510:revInfo>
 </file>
@@ -158,26 +158,34 @@
   <pc:docChgLst>
     <pc:chgData name="Lowe, Rachel M" userId="93b75d29-27f6-4dab-b540-bade7f33a1ad" providerId="ADAL" clId="{80124DFA-92C9-4288-9C22-33F59D9B1A00}"/>
     <pc:docChg chg="undo custSel modSld">
-      <pc:chgData name="Lowe, Rachel M" userId="93b75d29-27f6-4dab-b540-bade7f33a1ad" providerId="ADAL" clId="{80124DFA-92C9-4288-9C22-33F59D9B1A00}" dt="2021-03-12T12:23:20.821" v="3078" actId="20577"/>
+      <pc:chgData name="Lowe, Rachel M" userId="93b75d29-27f6-4dab-b540-bade7f33a1ad" providerId="ADAL" clId="{80124DFA-92C9-4288-9C22-33F59D9B1A00}" dt="2021-03-12T14:48:50.212" v="4304" actId="404"/>
       <pc:docMkLst>
         <pc:docMk/>
       </pc:docMkLst>
       <pc:sldChg chg="addSp delSp modSp mod modNotesTx">
-        <pc:chgData name="Lowe, Rachel M" userId="93b75d29-27f6-4dab-b540-bade7f33a1ad" providerId="ADAL" clId="{80124DFA-92C9-4288-9C22-33F59D9B1A00}" dt="2021-03-12T12:23:20.821" v="3078" actId="20577"/>
+        <pc:chgData name="Lowe, Rachel M" userId="93b75d29-27f6-4dab-b540-bade7f33a1ad" providerId="ADAL" clId="{80124DFA-92C9-4288-9C22-33F59D9B1A00}" dt="2021-03-12T14:48:50.212" v="4304" actId="404"/>
         <pc:sldMkLst>
           <pc:docMk/>
           <pc:sldMk cId="0" sldId="256"/>
         </pc:sldMkLst>
         <pc:spChg chg="add mod">
-          <ac:chgData name="Lowe, Rachel M" userId="93b75d29-27f6-4dab-b540-bade7f33a1ad" providerId="ADAL" clId="{80124DFA-92C9-4288-9C22-33F59D9B1A00}" dt="2021-03-12T12:21:17.163" v="2984" actId="14100"/>
+          <ac:chgData name="Lowe, Rachel M" userId="93b75d29-27f6-4dab-b540-bade7f33a1ad" providerId="ADAL" clId="{80124DFA-92C9-4288-9C22-33F59D9B1A00}" dt="2021-03-12T13:50:31.826" v="3688" actId="20577"/>
           <ac:spMkLst>
             <pc:docMk/>
             <pc:sldMk cId="0" sldId="256"/>
             <ac:spMk id="17" creationId="{CCDBAC73-A8E9-49D9-8B47-BFD5D0D2C002}"/>
           </ac:spMkLst>
         </pc:spChg>
+        <pc:spChg chg="add mod">
+          <ac:chgData name="Lowe, Rachel M" userId="93b75d29-27f6-4dab-b540-bade7f33a1ad" providerId="ADAL" clId="{80124DFA-92C9-4288-9C22-33F59D9B1A00}" dt="2021-03-12T13:55:09.955" v="4181" actId="20577"/>
+          <ac:spMkLst>
+            <pc:docMk/>
+            <pc:sldMk cId="0" sldId="256"/>
+            <ac:spMk id="18" creationId="{6670AC2D-03B3-4224-A457-5E8202E7971E}"/>
+          </ac:spMkLst>
+        </pc:spChg>
         <pc:spChg chg="mod">
-          <ac:chgData name="Lowe, Rachel M" userId="93b75d29-27f6-4dab-b540-bade7f33a1ad" providerId="ADAL" clId="{80124DFA-92C9-4288-9C22-33F59D9B1A00}" dt="2021-03-12T12:00:32.889" v="994" actId="20577"/>
+          <ac:chgData name="Lowe, Rachel M" userId="93b75d29-27f6-4dab-b540-bade7f33a1ad" providerId="ADAL" clId="{80124DFA-92C9-4288-9C22-33F59D9B1A00}" dt="2021-03-12T14:48:26.615" v="4300" actId="20577"/>
           <ac:spMkLst>
             <pc:docMk/>
             <pc:sldMk cId="0" sldId="256"/>
@@ -185,31 +193,55 @@
           </ac:spMkLst>
         </pc:spChg>
         <pc:spChg chg="mod">
-          <ac:chgData name="Lowe, Rachel M" userId="93b75d29-27f6-4dab-b540-bade7f33a1ad" providerId="ADAL" clId="{80124DFA-92C9-4288-9C22-33F59D9B1A00}" dt="2021-03-12T12:22:01.510" v="2992" actId="20577"/>
+          <ac:chgData name="Lowe, Rachel M" userId="93b75d29-27f6-4dab-b540-bade7f33a1ad" providerId="ADAL" clId="{80124DFA-92C9-4288-9C22-33F59D9B1A00}" dt="2021-03-12T13:57:20.689" v="4182" actId="113"/>
           <ac:spMkLst>
             <pc:docMk/>
             <pc:sldMk cId="0" sldId="256"/>
             <ac:spMk id="2056" creationId="{00000000-0000-0000-0000-000000000000}"/>
           </ac:spMkLst>
         </pc:spChg>
-        <pc:spChg chg="mod">
-          <ac:chgData name="Lowe, Rachel M" userId="93b75d29-27f6-4dab-b540-bade7f33a1ad" providerId="ADAL" clId="{80124DFA-92C9-4288-9C22-33F59D9B1A00}" dt="2021-03-12T12:23:20.821" v="3078" actId="20577"/>
+        <pc:spChg chg="mod ord">
+          <ac:chgData name="Lowe, Rachel M" userId="93b75d29-27f6-4dab-b540-bade7f33a1ad" providerId="ADAL" clId="{80124DFA-92C9-4288-9C22-33F59D9B1A00}" dt="2021-03-12T13:58:31.375" v="4189" actId="113"/>
           <ac:spMkLst>
             <pc:docMk/>
             <pc:sldMk cId="0" sldId="256"/>
             <ac:spMk id="2057" creationId="{00000000-0000-0000-0000-000000000000}"/>
           </ac:spMkLst>
         </pc:spChg>
-        <pc:spChg chg="mod">
-          <ac:chgData name="Lowe, Rachel M" userId="93b75d29-27f6-4dab-b540-bade7f33a1ad" providerId="ADAL" clId="{80124DFA-92C9-4288-9C22-33F59D9B1A00}" dt="2021-03-12T12:21:05.839" v="2983" actId="20577"/>
+        <pc:spChg chg="mod ord">
+          <ac:chgData name="Lowe, Rachel M" userId="93b75d29-27f6-4dab-b540-bade7f33a1ad" providerId="ADAL" clId="{80124DFA-92C9-4288-9C22-33F59D9B1A00}" dt="2021-03-12T13:54:37.147" v="4171" actId="14100"/>
           <ac:spMkLst>
             <pc:docMk/>
             <pc:sldMk cId="0" sldId="256"/>
             <ac:spMk id="2058" creationId="{00000000-0000-0000-0000-000000000000}"/>
           </ac:spMkLst>
         </pc:spChg>
-        <pc:picChg chg="mod">
-          <ac:chgData name="Lowe, Rachel M" userId="93b75d29-27f6-4dab-b540-bade7f33a1ad" providerId="ADAL" clId="{80124DFA-92C9-4288-9C22-33F59D9B1A00}" dt="2021-03-12T12:21:24.999" v="2985" actId="1076"/>
+        <pc:spChg chg="mod">
+          <ac:chgData name="Lowe, Rachel M" userId="93b75d29-27f6-4dab-b540-bade7f33a1ad" providerId="ADAL" clId="{80124DFA-92C9-4288-9C22-33F59D9B1A00}" dt="2021-03-12T14:48:50.212" v="4304" actId="404"/>
+          <ac:spMkLst>
+            <pc:docMk/>
+            <pc:sldMk cId="0" sldId="256"/>
+            <ac:spMk id="2059" creationId="{00000000-0000-0000-0000-000000000000}"/>
+          </ac:spMkLst>
+        </pc:spChg>
+        <pc:picChg chg="add mod ord">
+          <ac:chgData name="Lowe, Rachel M" userId="93b75d29-27f6-4dab-b540-bade7f33a1ad" providerId="ADAL" clId="{80124DFA-92C9-4288-9C22-33F59D9B1A00}" dt="2021-03-12T13:54:56.278" v="4173" actId="1076"/>
+          <ac:picMkLst>
+            <pc:docMk/>
+            <pc:sldMk cId="0" sldId="256"/>
+            <ac:picMk id="2" creationId="{133BA079-663B-436A-A1E6-5906C7F8FC4B}"/>
+          </ac:picMkLst>
+        </pc:picChg>
+        <pc:picChg chg="ord">
+          <ac:chgData name="Lowe, Rachel M" userId="93b75d29-27f6-4dab-b540-bade7f33a1ad" providerId="ADAL" clId="{80124DFA-92C9-4288-9C22-33F59D9B1A00}" dt="2021-03-12T13:43:08.884" v="3095" actId="171"/>
+          <ac:picMkLst>
+            <pc:docMk/>
+            <pc:sldMk cId="0" sldId="256"/>
+            <ac:picMk id="6" creationId="{82ABEAE3-C386-475A-838C-FD7554010056}"/>
+          </ac:picMkLst>
+        </pc:picChg>
+        <pc:picChg chg="del mod">
+          <ac:chgData name="Lowe, Rachel M" userId="93b75d29-27f6-4dab-b540-bade7f33a1ad" providerId="ADAL" clId="{80124DFA-92C9-4288-9C22-33F59D9B1A00}" dt="2021-03-12T13:42:49.162" v="3092" actId="478"/>
           <ac:picMkLst>
             <pc:docMk/>
             <pc:sldMk cId="0" sldId="256"/>
@@ -633,51 +665,51 @@
           <a:lstStyle/>
           <a:p>
             <a:r>
-              <a:rPr lang="en-GB" dirty="0"/>
+              <a:rPr lang="en-GB"/>
               <a:t>Stuff to add:</a:t>
             </a:r>
             <a:br>
-              <a:rPr lang="en-GB" dirty="0"/>
+              <a:rPr lang="en-GB"/>
             </a:br>
             <a:r>
-              <a:rPr lang="en-GB" dirty="0"/>
+              <a:rPr lang="en-GB"/>
               <a:t>Sample .</a:t>
             </a:r>
             <a:r>
-              <a:rPr lang="en-GB" dirty="0" err="1"/>
+              <a:rPr lang="en-GB" err="1"/>
               <a:t>hecc</a:t>
             </a:r>
             <a:r>
-              <a:rPr lang="en-GB" dirty="0"/>
+              <a:rPr lang="en-GB"/>
               <a:t> code?</a:t>
             </a:r>
           </a:p>
           <a:p>
             <a:r>
-              <a:rPr lang="en-GB" dirty="0"/>
+              <a:rPr lang="en-GB"/>
               <a:t>Discuss the game I’m writing?</a:t>
             </a:r>
           </a:p>
           <a:p>
             <a:r>
-              <a:rPr lang="en-GB" dirty="0"/>
+              <a:rPr lang="en-GB"/>
               <a:t>Maybe work out how to put animations in the ppt</a:t>
             </a:r>
           </a:p>
           <a:p>
-            <a:endParaRPr lang="en-GB" dirty="0"/>
-          </a:p>
-          <a:p>
-            <a:r>
-              <a:rPr lang="en-GB" dirty="0"/>
+            <a:endParaRPr lang="en-GB"/>
+          </a:p>
+          <a:p>
+            <a:r>
+              <a:rPr lang="en-GB"/>
               <a:t>Post one of the example games onto my itch.io page, put a link to it in the </a:t>
             </a:r>
             <a:r>
-              <a:rPr lang="en-GB" dirty="0" err="1"/>
+              <a:rPr lang="en-GB" err="1"/>
               <a:t>powerpoint</a:t>
             </a:r>
             <a:r>
-              <a:rPr lang="en-GB" dirty="0"/>
+              <a:rPr lang="en-GB"/>
               <a:t>?</a:t>
             </a:r>
           </a:p>
@@ -4385,7 +4417,7 @@
               </a:spcBef>
             </a:pPr>
             <a:r>
-              <a:rPr lang="en-US" altLang="x-none" dirty="0">
+              <a:rPr lang="en-US" altLang="x-none">
                 <a:solidFill>
                   <a:schemeClr val="bg1"/>
                 </a:solidFill>
@@ -4566,7 +4598,7 @@
                 <a:latin typeface="JetBrains Mono" panose="02000009000000000000" pitchFamily="49" charset="0"/>
                 <a:cs typeface="JetBrains Mono" panose="02000009000000000000" pitchFamily="49" charset="0"/>
               </a:rPr>
-              <a:t>Most existing systems require users to use a GUI or to write raw code and hope it compiles. However, no tools offer users the choice between the two (or, if they do, with some caveats).</a:t>
+              <a:t>Most existing systems require users to use a GUI or to write raw code and hope it compiles. However, no tools truly offer users the choice between the two (or, if they do, it’s with some caveats).</a:t>
             </a:r>
           </a:p>
           <a:p>
@@ -4621,14 +4653,21 @@
                 <a:latin typeface="JetBrains Mono" panose="02000009000000000000" pitchFamily="49" charset="0"/>
                 <a:cs typeface="JetBrains Mono" panose="02000009000000000000" pitchFamily="49" charset="0"/>
               </a:rPr>
-              <a:t>.hecc</a:t>
+              <a:t>.</a:t>
+            </a:r>
+            <a:r>
+              <a:rPr lang="en-GB" altLang="x-none" sz="1400" b="1" dirty="0" err="1">
+                <a:latin typeface="JetBrains Mono" panose="02000009000000000000" pitchFamily="49" charset="0"/>
+                <a:cs typeface="JetBrains Mono" panose="02000009000000000000" pitchFamily="49" charset="0"/>
+              </a:rPr>
+              <a:t>hecc</a:t>
             </a:r>
             <a:r>
               <a:rPr lang="en-GB" altLang="x-none" sz="1400" dirty="0">
                 <a:latin typeface="JetBrains Mono" panose="02000009000000000000" pitchFamily="49" charset="0"/>
                 <a:cs typeface="JetBrains Mono" panose="02000009000000000000" pitchFamily="49" charset="0"/>
               </a:rPr>
-              <a:t> code! You’re a casual user who wants a GUI? Just open </a:t>
+              <a:t> code! You’re a casual user who wants a GUI? You can use </a:t>
             </a:r>
             <a:r>
               <a:rPr lang="en-GB" altLang="x-none" sz="1400" b="1" dirty="0">
@@ -4732,7 +4771,7 @@
                 <a:latin typeface="JetBrains Mono" panose="02000009000000000000" pitchFamily="49" charset="0"/>
                 <a:cs typeface="JetBrains Mono" panose="02000009000000000000" pitchFamily="49" charset="0"/>
               </a:rPr>
-              <a:t> are in a client-side HTML/JavaScript format, so anyone with a web browser can play them (even offline!).</a:t>
+              <a:t> are in a client-side HTML/JavaScript format, so anyone with a web browser can play them, anytime, anywhere, without any hassle.</a:t>
             </a:r>
           </a:p>
         </p:txBody>
@@ -4868,7 +4907,7 @@
           <a:p>
             <a:pPr eaLnBrk="1" hangingPunct="1"/>
             <a:r>
-              <a:rPr lang="en-GB" altLang="x-none" sz="2400" b="1" dirty="0">
+              <a:rPr lang="en-GB" altLang="x-none" sz="2400" b="1">
                 <a:latin typeface="Arial Rounded MT Bold" panose="020F0704030504030204" pitchFamily="34" charset="0"/>
               </a:rPr>
               <a:t>HOW DOES IT WORK?</a:t>
@@ -4877,14 +4916,14 @@
           <a:p>
             <a:pPr eaLnBrk="1" hangingPunct="1"/>
             <a:r>
-              <a:rPr lang="en-GB" altLang="x-none" sz="1400" b="1" dirty="0">
+              <a:rPr lang="en-GB" altLang="x-none" sz="1400" b="1">
                 <a:latin typeface="JetBrains Mono" panose="02000009000000000000" pitchFamily="49" charset="0"/>
                 <a:cs typeface="JetBrains Mono" panose="02000009000000000000" pitchFamily="49" charset="0"/>
               </a:rPr>
               <a:t>HECC-IT</a:t>
             </a:r>
             <a:r>
-              <a:rPr lang="en-GB" altLang="x-none" sz="1400" dirty="0">
+              <a:rPr lang="en-GB" altLang="x-none" sz="1400">
                 <a:latin typeface="JetBrains Mono" panose="02000009000000000000" pitchFamily="49" charset="0"/>
                 <a:cs typeface="JetBrains Mono" panose="02000009000000000000" pitchFamily="49" charset="0"/>
               </a:rPr>
@@ -4893,7 +4932,7 @@
           </a:p>
           <a:p>
             <a:pPr eaLnBrk="1" hangingPunct="1"/>
-            <a:endParaRPr lang="en-GB" altLang="x-none" sz="1400" dirty="0">
+            <a:endParaRPr lang="en-GB" altLang="x-none" sz="1400">
               <a:latin typeface="JetBrains Mono" panose="02000009000000000000" pitchFamily="49" charset="0"/>
               <a:cs typeface="JetBrains Mono" panose="02000009000000000000" pitchFamily="49" charset="0"/>
             </a:endParaRPr>
@@ -4901,16 +4940,30 @@
           <a:p>
             <a:pPr eaLnBrk="1" hangingPunct="1"/>
             <a:r>
-              <a:rPr lang="en-GB" altLang="x-none" sz="1400" dirty="0">
+              <a:rPr lang="en-GB" altLang="x-none" sz="1400">
                 <a:latin typeface="JetBrains Mono" panose="02000009000000000000" pitchFamily="49" charset="0"/>
                 <a:cs typeface="JetBrains Mono" panose="02000009000000000000" pitchFamily="49" charset="0"/>
               </a:rPr>
-              <a:t>Users open the executable, pick an existing .hecc file (or make one), and are then given the choice to export it now or keep editing it (and export later).</a:t>
+              <a:t>Users open the executable, pick an existing </a:t>
+            </a:r>
+            <a:r>
+              <a:rPr lang="en-GB" altLang="x-none" sz="1400" b="1">
+                <a:latin typeface="JetBrains Mono" panose="02000009000000000000" pitchFamily="49" charset="0"/>
+                <a:cs typeface="JetBrains Mono" panose="02000009000000000000" pitchFamily="49" charset="0"/>
+              </a:rPr>
+              <a:t>.hecc </a:t>
+            </a:r>
+            <a:r>
+              <a:rPr lang="en-GB" altLang="x-none" sz="1400">
+                <a:latin typeface="JetBrains Mono" panose="02000009000000000000" pitchFamily="49" charset="0"/>
+                <a:cs typeface="JetBrains Mono" panose="02000009000000000000" pitchFamily="49" charset="0"/>
+              </a:rPr>
+              <a:t>file (or make one), and are then given the choice to export it now or keep editing it (and export later).</a:t>
             </a:r>
           </a:p>
           <a:p>
             <a:pPr eaLnBrk="1" hangingPunct="1"/>
-            <a:endParaRPr lang="en-GB" altLang="x-none" sz="1400" dirty="0">
+            <a:endParaRPr lang="en-GB" altLang="x-none" sz="1400">
               <a:latin typeface="JetBrains Mono" panose="02000009000000000000" pitchFamily="49" charset="0"/>
               <a:cs typeface="JetBrains Mono" panose="02000009000000000000" pitchFamily="49" charset="0"/>
             </a:endParaRPr>
@@ -4918,19 +4971,238 @@
           <a:p>
             <a:pPr eaLnBrk="1" hangingPunct="1"/>
             <a:r>
-              <a:rPr lang="en-GB" altLang="x-none" sz="1400" dirty="0">
+              <a:rPr lang="en-GB" altLang="x-none" sz="1400">
                 <a:latin typeface="JetBrains Mono" panose="02000009000000000000" pitchFamily="49" charset="0"/>
                 <a:cs typeface="JetBrains Mono" panose="02000009000000000000" pitchFamily="49" charset="0"/>
               </a:rPr>
               <a:t>Once exported, users can just open the index.html page, and they can play the game!</a:t>
             </a:r>
-            <a:endParaRPr lang="en-GB" altLang="x-none" sz="2000" dirty="0">
+            <a:endParaRPr lang="en-GB" altLang="x-none" sz="2000">
               <a:latin typeface="JetBrains Mono" panose="02000009000000000000" pitchFamily="49" charset="0"/>
               <a:cs typeface="JetBrains Mono" panose="02000009000000000000" pitchFamily="49" charset="0"/>
             </a:endParaRPr>
           </a:p>
         </p:txBody>
       </p:sp>
+      <p:sp>
+        <p:nvSpPr>
+          <p:cNvPr id="2058" name="Rectangle 10"/>
+          <p:cNvSpPr>
+            <a:spLocks noChangeArrowheads="1"/>
+          </p:cNvSpPr>
+          <p:nvPr/>
+        </p:nvSpPr>
+        <p:spPr bwMode="auto">
+          <a:xfrm>
+            <a:off x="11396663" y="5054568"/>
+            <a:ext cx="3540125" cy="1418966"/>
+          </a:xfrm>
+          <a:prstGeom prst="rect">
+            <a:avLst/>
+          </a:prstGeom>
+          <a:solidFill>
+            <a:schemeClr val="bg1"/>
+          </a:solidFill>
+          <a:ln w="9525">
+            <a:solidFill>
+              <a:schemeClr val="tx1"/>
+            </a:solidFill>
+            <a:miter lim="800000"/>
+            <a:headEnd/>
+            <a:tailEnd/>
+          </a:ln>
+        </p:spPr>
+        <p:txBody>
+          <a:bodyPr/>
+          <a:lstStyle>
+            <a:lvl1pPr eaLnBrk="0" hangingPunct="0">
+              <a:defRPr sz="2900">
+                <a:solidFill>
+                  <a:schemeClr val="tx1"/>
+                </a:solidFill>
+                <a:latin typeface="Arial" charset="0"/>
+              </a:defRPr>
+            </a:lvl1pPr>
+            <a:lvl2pPr marL="742950" indent="-285750" eaLnBrk="0" hangingPunct="0">
+              <a:defRPr sz="2900">
+                <a:solidFill>
+                  <a:schemeClr val="tx1"/>
+                </a:solidFill>
+                <a:latin typeface="Arial" charset="0"/>
+              </a:defRPr>
+            </a:lvl2pPr>
+            <a:lvl3pPr marL="1143000" indent="-228600" eaLnBrk="0" hangingPunct="0">
+              <a:defRPr sz="2900">
+                <a:solidFill>
+                  <a:schemeClr val="tx1"/>
+                </a:solidFill>
+                <a:latin typeface="Arial" charset="0"/>
+              </a:defRPr>
+            </a:lvl3pPr>
+            <a:lvl4pPr marL="1600200" indent="-228600" eaLnBrk="0" hangingPunct="0">
+              <a:defRPr sz="2900">
+                <a:solidFill>
+                  <a:schemeClr val="tx1"/>
+                </a:solidFill>
+                <a:latin typeface="Arial" charset="0"/>
+              </a:defRPr>
+            </a:lvl4pPr>
+            <a:lvl5pPr marL="2057400" indent="-228600" eaLnBrk="0" hangingPunct="0">
+              <a:defRPr sz="2900">
+                <a:solidFill>
+                  <a:schemeClr val="tx1"/>
+                </a:solidFill>
+                <a:latin typeface="Arial" charset="0"/>
+              </a:defRPr>
+            </a:lvl5pPr>
+            <a:lvl6pPr marL="2514600" indent="-228600" eaLnBrk="0" fontAlgn="base" hangingPunct="0">
+              <a:spcBef>
+                <a:spcPct val="0"/>
+              </a:spcBef>
+              <a:spcAft>
+                <a:spcPct val="0"/>
+              </a:spcAft>
+              <a:defRPr sz="2900">
+                <a:solidFill>
+                  <a:schemeClr val="tx1"/>
+                </a:solidFill>
+                <a:latin typeface="Arial" charset="0"/>
+              </a:defRPr>
+            </a:lvl6pPr>
+            <a:lvl7pPr marL="2971800" indent="-228600" eaLnBrk="0" fontAlgn="base" hangingPunct="0">
+              <a:spcBef>
+                <a:spcPct val="0"/>
+              </a:spcBef>
+              <a:spcAft>
+                <a:spcPct val="0"/>
+              </a:spcAft>
+              <a:defRPr sz="2900">
+                <a:solidFill>
+                  <a:schemeClr val="tx1"/>
+                </a:solidFill>
+                <a:latin typeface="Arial" charset="0"/>
+              </a:defRPr>
+            </a:lvl7pPr>
+            <a:lvl8pPr marL="3429000" indent="-228600" eaLnBrk="0" fontAlgn="base" hangingPunct="0">
+              <a:spcBef>
+                <a:spcPct val="0"/>
+              </a:spcBef>
+              <a:spcAft>
+                <a:spcPct val="0"/>
+              </a:spcAft>
+              <a:defRPr sz="2900">
+                <a:solidFill>
+                  <a:schemeClr val="tx1"/>
+                </a:solidFill>
+                <a:latin typeface="Arial" charset="0"/>
+              </a:defRPr>
+            </a:lvl8pPr>
+            <a:lvl9pPr marL="3886200" indent="-228600" eaLnBrk="0" fontAlgn="base" hangingPunct="0">
+              <a:spcBef>
+                <a:spcPct val="0"/>
+              </a:spcBef>
+              <a:spcAft>
+                <a:spcPct val="0"/>
+              </a:spcAft>
+              <a:defRPr sz="2900">
+                <a:solidFill>
+                  <a:schemeClr val="tx1"/>
+                </a:solidFill>
+                <a:latin typeface="Arial" charset="0"/>
+              </a:defRPr>
+            </a:lvl9pPr>
+          </a:lstStyle>
+          <a:p>
+            <a:pPr eaLnBrk="1" hangingPunct="1"/>
+            <a:r>
+              <a:rPr lang="en-GB" altLang="x-none" sz="1400" b="1">
+                <a:latin typeface="JetBrains Mono" panose="02000009000000000000" pitchFamily="49" charset="0"/>
+                <a:cs typeface="JetBrains Mono" panose="02000009000000000000" pitchFamily="49" charset="0"/>
+              </a:rPr>
+              <a:t>Above</a:t>
+            </a:r>
+            <a:r>
+              <a:rPr lang="en-GB" altLang="x-none" sz="1400">
+                <a:latin typeface="JetBrains Mono" panose="02000009000000000000" pitchFamily="49" charset="0"/>
+                <a:cs typeface="JetBrains Mono" panose="02000009000000000000" pitchFamily="49" charset="0"/>
+              </a:rPr>
+              <a:t>: A screenshot of </a:t>
+            </a:r>
+            <a:r>
+              <a:rPr lang="en-GB" altLang="x-none" sz="1400" b="1">
+                <a:latin typeface="JetBrains Mono" panose="02000009000000000000" pitchFamily="49" charset="0"/>
+                <a:cs typeface="JetBrains Mono" panose="02000009000000000000" pitchFamily="49" charset="0"/>
+              </a:rPr>
+              <a:t>OH-HECC</a:t>
+            </a:r>
+            <a:r>
+              <a:rPr lang="en-GB" altLang="x-none" sz="1400">
+                <a:latin typeface="JetBrains Mono" panose="02000009000000000000" pitchFamily="49" charset="0"/>
+                <a:cs typeface="JetBrains Mono" panose="02000009000000000000" pitchFamily="49" charset="0"/>
+              </a:rPr>
+              <a:t> (</a:t>
+            </a:r>
+            <a:r>
+              <a:rPr lang="en-GB" altLang="x-none" sz="1400" i="1">
+                <a:latin typeface="JetBrains Mono" panose="02000009000000000000" pitchFamily="49" charset="0"/>
+                <a:cs typeface="JetBrains Mono" panose="02000009000000000000" pitchFamily="49" charset="0"/>
+              </a:rPr>
+              <a:t>Optional Help for HECC</a:t>
+            </a:r>
+            <a:r>
+              <a:rPr lang="en-GB" altLang="x-none" sz="1400">
+                <a:latin typeface="JetBrains Mono" panose="02000009000000000000" pitchFamily="49" charset="0"/>
+                <a:cs typeface="JetBrains Mono" panose="02000009000000000000" pitchFamily="49" charset="0"/>
+              </a:rPr>
+              <a:t>; the editing GUI) showing the network of passages for an example game. (</a:t>
+            </a:r>
+            <a:r>
+              <a:rPr lang="en-GB" altLang="x-none" sz="1400" b="1" i="1" err="1">
+                <a:latin typeface="JetBrains Mono" panose="02000009000000000000" pitchFamily="49" charset="0"/>
+                <a:cs typeface="JetBrains Mono" panose="02000009000000000000" pitchFamily="49" charset="0"/>
+              </a:rPr>
+              <a:t>Backblast</a:t>
+            </a:r>
+            <a:r>
+              <a:rPr lang="en-GB" altLang="x-none" sz="1400">
+                <a:latin typeface="JetBrains Mono" panose="02000009000000000000" pitchFamily="49" charset="0"/>
+                <a:cs typeface="JetBrains Mono" panose="02000009000000000000" pitchFamily="49" charset="0"/>
+              </a:rPr>
+              <a:t> was too big to fit on this poster)</a:t>
+            </a:r>
+          </a:p>
+        </p:txBody>
+      </p:sp>
+      <p:pic>
+        <p:nvPicPr>
+          <p:cNvPr id="2" name="Picture 1">
+            <a:extLst>
+              <a:ext uri="{FF2B5EF4-FFF2-40B4-BE49-F238E27FC236}">
+                <a16:creationId xmlns:a16="http://schemas.microsoft.com/office/drawing/2014/main" id="{133BA079-663B-436A-A1E6-5906C7F8FC4B}"/>
+              </a:ext>
+            </a:extLst>
+          </p:cNvPr>
+          <p:cNvPicPr>
+            <a:picLocks noChangeAspect="1"/>
+          </p:cNvPicPr>
+          <p:nvPr/>
+        </p:nvPicPr>
+        <p:blipFill>
+          <a:blip r:embed="rId5"/>
+          <a:stretch>
+            <a:fillRect/>
+          </a:stretch>
+        </p:blipFill>
+        <p:spPr>
+          <a:xfrm>
+            <a:off x="11238068" y="7285411"/>
+            <a:ext cx="3910012" cy="1365034"/>
+          </a:xfrm>
+          <a:prstGeom prst="rect">
+            <a:avLst/>
+          </a:prstGeom>
+        </p:spPr>
+      </p:pic>
       <p:sp>
         <p:nvSpPr>
           <p:cNvPr id="2057" name="Rectangle 9"/>
@@ -5062,25 +5334,39 @@
           <a:p>
             <a:pPr eaLnBrk="1" hangingPunct="1"/>
             <a:r>
-              <a:rPr lang="en-GB" altLang="x-none" sz="2400" b="1" dirty="0">
+              <a:rPr lang="en-GB" altLang="x-none" sz="2400" b="1">
                 <a:latin typeface="Arial Rounded MT Bold" panose="020F0704030504030204" pitchFamily="34" charset="0"/>
               </a:rPr>
-              <a:t>HOW IT WAS MADE</a:t>
+              <a:t>HOW WAS IT MADE?</a:t>
             </a:r>
           </a:p>
           <a:p>
             <a:pPr eaLnBrk="1" hangingPunct="1"/>
             <a:r>
-              <a:rPr lang="en-GB" altLang="x-none" sz="1400" dirty="0">
+              <a:rPr lang="en-GB" altLang="x-none" sz="1400">
                 <a:latin typeface="JetBrains Mono" panose="02000009000000000000" pitchFamily="49" charset="0"/>
                 <a:cs typeface="JetBrains Mono" panose="02000009000000000000" pitchFamily="49" charset="0"/>
               </a:rPr>
-              <a:t>The first part of HECC-IT to be produced was the output. I made a very simple hypertext game in HTML/JS, which simply replaced the text displayed on part of the HTML page in response to the player clicking on special links in the content.</a:t>
+              <a:t>The first part of </a:t>
+            </a:r>
+            <a:r>
+              <a:rPr lang="en-GB" altLang="x-none" sz="1400" b="1">
+                <a:latin typeface="JetBrains Mono" panose="02000009000000000000" pitchFamily="49" charset="0"/>
+                <a:cs typeface="JetBrains Mono" panose="02000009000000000000" pitchFamily="49" charset="0"/>
+              </a:rPr>
+              <a:t>HECC-IT</a:t>
+            </a:r>
+            <a:r>
+              <a:rPr lang="en-GB" altLang="x-none" sz="1400">
+                <a:latin typeface="JetBrains Mono" panose="02000009000000000000" pitchFamily="49" charset="0"/>
+                <a:cs typeface="JetBrains Mono" panose="02000009000000000000" pitchFamily="49" charset="0"/>
+              </a:rPr>
+              <a:t> to be produced was the output. I made a very simple hypertext game in HTML/JS, which simply replaced the text displayed on part of the HTML page in response to the player clicking on special links in the content.</a:t>
             </a:r>
           </a:p>
           <a:p>
             <a:pPr eaLnBrk="1" hangingPunct="1"/>
-            <a:endParaRPr lang="en-GB" altLang="x-none" sz="1400" dirty="0">
+            <a:endParaRPr lang="en-GB" altLang="x-none" sz="1400">
               <a:latin typeface="JetBrains Mono" panose="02000009000000000000" pitchFamily="49" charset="0"/>
               <a:cs typeface="JetBrains Mono" panose="02000009000000000000" pitchFamily="49" charset="0"/>
             </a:endParaRPr>
@@ -5088,63 +5374,63 @@
           <a:p>
             <a:pPr eaLnBrk="1" hangingPunct="1"/>
             <a:r>
-              <a:rPr lang="en-GB" altLang="x-none" sz="1400" dirty="0">
+              <a:rPr lang="en-GB" altLang="x-none" sz="1400">
                 <a:latin typeface="JetBrains Mono" panose="02000009000000000000" pitchFamily="49" charset="0"/>
                 <a:cs typeface="JetBrains Mono" panose="02000009000000000000" pitchFamily="49" charset="0"/>
               </a:rPr>
               <a:t>The next step was creating the </a:t>
             </a:r>
             <a:r>
-              <a:rPr lang="en-GB" altLang="x-none" sz="1400" b="1" dirty="0">
+              <a:rPr lang="en-GB" altLang="x-none" sz="1400" b="1">
                 <a:latin typeface="JetBrains Mono" panose="02000009000000000000" pitchFamily="49" charset="0"/>
                 <a:cs typeface="JetBrains Mono" panose="02000009000000000000" pitchFamily="49" charset="0"/>
               </a:rPr>
               <a:t>.</a:t>
             </a:r>
             <a:r>
-              <a:rPr lang="en-GB" altLang="x-none" sz="1400" b="1" dirty="0" err="1">
+              <a:rPr lang="en-GB" altLang="x-none" sz="1400" b="1" err="1">
                 <a:latin typeface="JetBrains Mono" panose="02000009000000000000" pitchFamily="49" charset="0"/>
                 <a:cs typeface="JetBrains Mono" panose="02000009000000000000" pitchFamily="49" charset="0"/>
               </a:rPr>
               <a:t>hecc</a:t>
             </a:r>
             <a:r>
-              <a:rPr lang="en-GB" altLang="x-none" sz="1400" dirty="0">
+              <a:rPr lang="en-GB" altLang="x-none" sz="1400">
                 <a:latin typeface="JetBrains Mono" panose="02000009000000000000" pitchFamily="49" charset="0"/>
                 <a:cs typeface="JetBrains Mono" panose="02000009000000000000" pitchFamily="49" charset="0"/>
               </a:rPr>
               <a:t> language (a simple declarative language to declare passages and links), before making </a:t>
             </a:r>
             <a:r>
-              <a:rPr lang="en-GB" altLang="x-none" sz="1400" b="1" dirty="0">
+              <a:rPr lang="en-GB" altLang="x-none" sz="1400" b="1">
                 <a:latin typeface="JetBrains Mono" panose="02000009000000000000" pitchFamily="49" charset="0"/>
                 <a:cs typeface="JetBrains Mono" panose="02000009000000000000" pitchFamily="49" charset="0"/>
               </a:rPr>
               <a:t>HECC-UP</a:t>
             </a:r>
             <a:r>
-              <a:rPr lang="en-GB" altLang="x-none" sz="1400" dirty="0">
+              <a:rPr lang="en-GB" altLang="x-none" sz="1400">
                 <a:latin typeface="JetBrains Mono" panose="02000009000000000000" pitchFamily="49" charset="0"/>
                 <a:cs typeface="JetBrains Mono" panose="02000009000000000000" pitchFamily="49" charset="0"/>
               </a:rPr>
               <a:t>, which converts </a:t>
             </a:r>
             <a:r>
-              <a:rPr lang="en-GB" altLang="x-none" sz="1400" b="1" dirty="0">
+              <a:rPr lang="en-GB" altLang="x-none" sz="1400" b="1">
                 <a:latin typeface="JetBrains Mono" panose="02000009000000000000" pitchFamily="49" charset="0"/>
                 <a:cs typeface="JetBrains Mono" panose="02000009000000000000" pitchFamily="49" charset="0"/>
               </a:rPr>
               <a:t>.</a:t>
             </a:r>
             <a:r>
-              <a:rPr lang="en-GB" altLang="x-none" sz="1400" b="1" dirty="0" err="1">
+              <a:rPr lang="en-GB" altLang="x-none" sz="1400" b="1" err="1">
                 <a:latin typeface="JetBrains Mono" panose="02000009000000000000" pitchFamily="49" charset="0"/>
                 <a:cs typeface="JetBrains Mono" panose="02000009000000000000" pitchFamily="49" charset="0"/>
               </a:rPr>
               <a:t>hecc</a:t>
             </a:r>
             <a:r>
-              <a:rPr lang="en-GB" altLang="x-none" sz="1400" dirty="0">
+              <a:rPr lang="en-GB" altLang="x-none" sz="1400">
                 <a:latin typeface="JetBrains Mono" panose="02000009000000000000" pitchFamily="49" charset="0"/>
                 <a:cs typeface="JetBrains Mono" panose="02000009000000000000" pitchFamily="49" charset="0"/>
               </a:rPr>
@@ -5153,7 +5439,7 @@
           </a:p>
           <a:p>
             <a:pPr eaLnBrk="1" hangingPunct="1"/>
-            <a:endParaRPr lang="en-GB" altLang="x-none" sz="1400" dirty="0">
+            <a:endParaRPr lang="en-GB" altLang="x-none" sz="1400">
               <a:latin typeface="JetBrains Mono" panose="02000009000000000000" pitchFamily="49" charset="0"/>
               <a:cs typeface="JetBrains Mono" panose="02000009000000000000" pitchFamily="49" charset="0"/>
             </a:endParaRPr>
@@ -5161,86 +5447,72 @@
           <a:p>
             <a:pPr eaLnBrk="1" hangingPunct="1"/>
             <a:r>
-              <a:rPr lang="en-GB" altLang="x-none" sz="1400" dirty="0">
-                <a:latin typeface="JetBrains Mono" panose="02000009000000000000" pitchFamily="49" charset="0"/>
-                <a:cs typeface="JetBrains Mono" panose="02000009000000000000" pitchFamily="49" charset="0"/>
-              </a:rPr>
-              <a:t>Following this, I made </a:t>
-            </a:r>
-            <a:r>
-              <a:rPr lang="en-GB" altLang="x-none" sz="1400" b="1" dirty="0">
-                <a:latin typeface="JetBrains Mono" panose="02000009000000000000" pitchFamily="49" charset="0"/>
-                <a:cs typeface="JetBrains Mono" panose="02000009000000000000" pitchFamily="49" charset="0"/>
-              </a:rPr>
-              <a:t>OH-HECC</a:t>
-            </a:r>
-            <a:r>
-              <a:rPr lang="en-GB" altLang="x-none" sz="1400" dirty="0">
-                <a:latin typeface="JetBrains Mono" panose="02000009000000000000" pitchFamily="49" charset="0"/>
-                <a:cs typeface="JetBrains Mono" panose="02000009000000000000" pitchFamily="49" charset="0"/>
-              </a:rPr>
-              <a:t>, </a:t>
-            </a:r>
-            <a:r>
               <a:rPr lang="en-GB" altLang="x-none" sz="1400">
                 <a:latin typeface="JetBrains Mono" panose="02000009000000000000" pitchFamily="49" charset="0"/>
                 <a:cs typeface="JetBrains Mono" panose="02000009000000000000" pitchFamily="49" charset="0"/>
               </a:rPr>
-              <a:t>which can </a:t>
-            </a:r>
-            <a:r>
-              <a:rPr lang="en-GB" altLang="x-none" sz="1400" dirty="0">
+              <a:t>Following this, I made </a:t>
+            </a:r>
+            <a:r>
+              <a:rPr lang="en-GB" altLang="x-none" sz="1400" b="1">
                 <a:latin typeface="JetBrains Mono" panose="02000009000000000000" pitchFamily="49" charset="0"/>
                 <a:cs typeface="JetBrains Mono" panose="02000009000000000000" pitchFamily="49" charset="0"/>
               </a:rPr>
-              <a:t>read </a:t>
-            </a:r>
-            <a:r>
-              <a:rPr lang="en-GB" altLang="x-none" sz="1400" b="1" dirty="0">
+              <a:t>OH-HECC</a:t>
+            </a:r>
+            <a:r>
+              <a:rPr lang="en-GB" altLang="x-none" sz="1400">
                 <a:latin typeface="JetBrains Mono" panose="02000009000000000000" pitchFamily="49" charset="0"/>
                 <a:cs typeface="JetBrains Mono" panose="02000009000000000000" pitchFamily="49" charset="0"/>
               </a:rPr>
-              <a:t>.</a:t>
-            </a:r>
-            <a:r>
-              <a:rPr lang="en-GB" altLang="x-none" sz="1400" b="1" dirty="0" err="1">
+              <a:t>, which can read </a:t>
+            </a:r>
+            <a:r>
+              <a:rPr lang="en-GB" altLang="x-none" sz="1400" b="1">
                 <a:latin typeface="JetBrains Mono" panose="02000009000000000000" pitchFamily="49" charset="0"/>
                 <a:cs typeface="JetBrains Mono" panose="02000009000000000000" pitchFamily="49" charset="0"/>
               </a:rPr>
-              <a:t>hecc</a:t>
-            </a:r>
-            <a:r>
-              <a:rPr lang="en-GB" altLang="x-none" sz="1400" dirty="0">
+              <a:t>.</a:t>
+            </a:r>
+            <a:r>
+              <a:rPr lang="en-GB" altLang="x-none" sz="1400" b="1" err="1">
                 <a:latin typeface="JetBrains Mono" panose="02000009000000000000" pitchFamily="49" charset="0"/>
                 <a:cs typeface="JetBrains Mono" panose="02000009000000000000" pitchFamily="49" charset="0"/>
               </a:rPr>
-              <a:t> files, display them as a network of linked passages, allow the user to edit them, and save the edited </a:t>
-            </a:r>
-            <a:r>
-              <a:rPr lang="en-GB" altLang="x-none" sz="1400" b="1" dirty="0">
+              <a:t>hecc</a:t>
+            </a:r>
+            <a:r>
+              <a:rPr lang="en-GB" altLang="x-none" sz="1400">
                 <a:latin typeface="JetBrains Mono" panose="02000009000000000000" pitchFamily="49" charset="0"/>
                 <a:cs typeface="JetBrains Mono" panose="02000009000000000000" pitchFamily="49" charset="0"/>
               </a:rPr>
-              <a:t>.</a:t>
-            </a:r>
-            <a:r>
-              <a:rPr lang="en-GB" altLang="x-none" sz="1400" b="1" dirty="0" err="1">
+              <a:t> files, display them as a network of linked passages, allow the user to edit them, and save the edited </a:t>
+            </a:r>
+            <a:r>
+              <a:rPr lang="en-GB" altLang="x-none" sz="1400" b="1">
                 <a:latin typeface="JetBrains Mono" panose="02000009000000000000" pitchFamily="49" charset="0"/>
                 <a:cs typeface="JetBrains Mono" panose="02000009000000000000" pitchFamily="49" charset="0"/>
               </a:rPr>
-              <a:t>hecc</a:t>
-            </a:r>
-            <a:r>
-              <a:rPr lang="en-GB" altLang="x-none" sz="1400" dirty="0">
+              <a:t>.</a:t>
+            </a:r>
+            <a:r>
+              <a:rPr lang="en-GB" altLang="x-none" sz="1400" b="1" err="1">
                 <a:latin typeface="JetBrains Mono" panose="02000009000000000000" pitchFamily="49" charset="0"/>
                 <a:cs typeface="JetBrains Mono" panose="02000009000000000000" pitchFamily="49" charset="0"/>
               </a:rPr>
+              <a:t>hecc</a:t>
+            </a:r>
+            <a:r>
+              <a:rPr lang="en-GB" altLang="x-none" sz="1400">
+                <a:latin typeface="JetBrains Mono" panose="02000009000000000000" pitchFamily="49" charset="0"/>
+                <a:cs typeface="JetBrains Mono" panose="02000009000000000000" pitchFamily="49" charset="0"/>
+              </a:rPr>
               <a:t> file.</a:t>
             </a:r>
           </a:p>
           <a:p>
             <a:pPr eaLnBrk="1" hangingPunct="1"/>
-            <a:endParaRPr lang="en-GB" altLang="x-none" sz="1400" dirty="0">
+            <a:endParaRPr lang="en-GB" altLang="x-none" sz="1400">
               <a:latin typeface="JetBrains Mono" panose="02000009000000000000" pitchFamily="49" charset="0"/>
               <a:cs typeface="JetBrains Mono" panose="02000009000000000000" pitchFamily="49" charset="0"/>
             </a:endParaRPr>
@@ -5248,35 +5520,35 @@
           <a:p>
             <a:pPr eaLnBrk="1" hangingPunct="1"/>
             <a:r>
-              <a:rPr lang="en-GB" altLang="x-none" sz="1400" dirty="0">
+              <a:rPr lang="en-GB" altLang="x-none" sz="1400">
                 <a:latin typeface="JetBrains Mono" panose="02000009000000000000" pitchFamily="49" charset="0"/>
                 <a:cs typeface="JetBrains Mono" panose="02000009000000000000" pitchFamily="49" charset="0"/>
               </a:rPr>
               <a:t>With the tool made, I proceeded to start authoring a proper hypertext game: </a:t>
             </a:r>
             <a:r>
-              <a:rPr lang="en-GB" altLang="x-none" sz="1400" b="1" dirty="0" err="1">
+              <a:rPr lang="en-GB" altLang="x-none" sz="1400" b="1" i="1" err="1">
                 <a:latin typeface="JetBrains Mono" panose="02000009000000000000" pitchFamily="49" charset="0"/>
                 <a:cs typeface="JetBrains Mono" panose="02000009000000000000" pitchFamily="49" charset="0"/>
               </a:rPr>
               <a:t>Backblast</a:t>
             </a:r>
             <a:r>
-              <a:rPr lang="en-GB" altLang="x-none" sz="1400" dirty="0">
+              <a:rPr lang="en-GB" altLang="x-none" sz="1400">
                 <a:latin typeface="JetBrains Mono" panose="02000009000000000000" pitchFamily="49" charset="0"/>
                 <a:cs typeface="JetBrains Mono" panose="02000009000000000000" pitchFamily="49" charset="0"/>
               </a:rPr>
               <a:t>; a murder mystery where </a:t>
             </a:r>
             <a:r>
-              <a:rPr lang="en-GB" altLang="x-none" sz="1400" b="1" dirty="0">
+              <a:rPr lang="en-GB" altLang="x-none" sz="1400" b="1">
                 <a:latin typeface="JetBrains Mono" panose="02000009000000000000" pitchFamily="49" charset="0"/>
                 <a:cs typeface="JetBrains Mono" panose="02000009000000000000" pitchFamily="49" charset="0"/>
               </a:rPr>
               <a:t>you</a:t>
             </a:r>
             <a:r>
-              <a:rPr lang="en-GB" altLang="x-none" sz="1400" dirty="0">
+              <a:rPr lang="en-GB" altLang="x-none" sz="1400">
                 <a:latin typeface="JetBrains Mono" panose="02000009000000000000" pitchFamily="49" charset="0"/>
                 <a:cs typeface="JetBrains Mono" panose="02000009000000000000" pitchFamily="49" charset="0"/>
               </a:rPr>
@@ -5285,7 +5557,7 @@
           </a:p>
           <a:p>
             <a:pPr eaLnBrk="1" hangingPunct="1"/>
-            <a:endParaRPr lang="en-GB" altLang="x-none" sz="1400" dirty="0">
+            <a:endParaRPr lang="en-GB" altLang="x-none" sz="1400">
               <a:latin typeface="JetBrains Mono" panose="02000009000000000000" pitchFamily="49" charset="0"/>
               <a:cs typeface="JetBrains Mono" panose="02000009000000000000" pitchFamily="49" charset="0"/>
             </a:endParaRPr>
@@ -5293,400 +5565,30 @@
           <a:p>
             <a:pPr eaLnBrk="1" hangingPunct="1"/>
             <a:r>
-              <a:rPr lang="en-GB" altLang="x-none" sz="1400" dirty="0">
+              <a:rPr lang="en-GB" altLang="x-none" sz="1400">
                 <a:latin typeface="JetBrains Mono" panose="02000009000000000000" pitchFamily="49" charset="0"/>
                 <a:cs typeface="JetBrains Mono" panose="02000009000000000000" pitchFamily="49" charset="0"/>
               </a:rPr>
-              <a:t>I have been adding further features to the tool and the outputs since then, such as conditional statements, markdown, and integrating the tool into one program.</a:t>
-            </a:r>
-            <a:endParaRPr lang="x-none" altLang="x-none" sz="1400" dirty="0">
+              <a:t>I have been adding further features to </a:t>
+            </a:r>
+            <a:r>
+              <a:rPr lang="en-GB" altLang="x-none" sz="1400" b="1">
+                <a:latin typeface="JetBrains Mono" panose="02000009000000000000" pitchFamily="49" charset="0"/>
+                <a:cs typeface="JetBrains Mono" panose="02000009000000000000" pitchFamily="49" charset="0"/>
+              </a:rPr>
+              <a:t>HECC-IT</a:t>
+            </a:r>
+            <a:r>
+              <a:rPr lang="en-GB" altLang="x-none" sz="1400">
+                <a:latin typeface="JetBrains Mono" panose="02000009000000000000" pitchFamily="49" charset="0"/>
+                <a:cs typeface="JetBrains Mono" panose="02000009000000000000" pitchFamily="49" charset="0"/>
+              </a:rPr>
+              <a:t> since then, such as conditional statements/ guard conditions, markdown formatting, and extra usability features for authors.</a:t>
+            </a:r>
+            <a:endParaRPr lang="x-none" altLang="x-none" sz="1400">
               <a:latin typeface="JetBrains Mono" panose="02000009000000000000" pitchFamily="49" charset="0"/>
               <a:cs typeface="JetBrains Mono" panose="02000009000000000000" pitchFamily="49" charset="0"/>
             </a:endParaRPr>
-          </a:p>
-        </p:txBody>
-      </p:sp>
-      <p:sp>
-        <p:nvSpPr>
-          <p:cNvPr id="2058" name="Rectangle 10"/>
-          <p:cNvSpPr>
-            <a:spLocks noChangeArrowheads="1"/>
-          </p:cNvSpPr>
-          <p:nvPr/>
-        </p:nvSpPr>
-        <p:spPr bwMode="auto">
-          <a:xfrm>
-            <a:off x="11396663" y="5064482"/>
-            <a:ext cx="3540125" cy="2277248"/>
-          </a:xfrm>
-          <a:prstGeom prst="rect">
-            <a:avLst/>
-          </a:prstGeom>
-          <a:solidFill>
-            <a:schemeClr val="bg1"/>
-          </a:solidFill>
-          <a:ln w="9525">
-            <a:solidFill>
-              <a:schemeClr val="tx1"/>
-            </a:solidFill>
-            <a:miter lim="800000"/>
-            <a:headEnd/>
-            <a:tailEnd/>
-          </a:ln>
-        </p:spPr>
-        <p:txBody>
-          <a:bodyPr/>
-          <a:lstStyle>
-            <a:lvl1pPr eaLnBrk="0" hangingPunct="0">
-              <a:defRPr sz="2900">
-                <a:solidFill>
-                  <a:schemeClr val="tx1"/>
-                </a:solidFill>
-                <a:latin typeface="Arial" charset="0"/>
-              </a:defRPr>
-            </a:lvl1pPr>
-            <a:lvl2pPr marL="742950" indent="-285750" eaLnBrk="0" hangingPunct="0">
-              <a:defRPr sz="2900">
-                <a:solidFill>
-                  <a:schemeClr val="tx1"/>
-                </a:solidFill>
-                <a:latin typeface="Arial" charset="0"/>
-              </a:defRPr>
-            </a:lvl2pPr>
-            <a:lvl3pPr marL="1143000" indent="-228600" eaLnBrk="0" hangingPunct="0">
-              <a:defRPr sz="2900">
-                <a:solidFill>
-                  <a:schemeClr val="tx1"/>
-                </a:solidFill>
-                <a:latin typeface="Arial" charset="0"/>
-              </a:defRPr>
-            </a:lvl3pPr>
-            <a:lvl4pPr marL="1600200" indent="-228600" eaLnBrk="0" hangingPunct="0">
-              <a:defRPr sz="2900">
-                <a:solidFill>
-                  <a:schemeClr val="tx1"/>
-                </a:solidFill>
-                <a:latin typeface="Arial" charset="0"/>
-              </a:defRPr>
-            </a:lvl4pPr>
-            <a:lvl5pPr marL="2057400" indent="-228600" eaLnBrk="0" hangingPunct="0">
-              <a:defRPr sz="2900">
-                <a:solidFill>
-                  <a:schemeClr val="tx1"/>
-                </a:solidFill>
-                <a:latin typeface="Arial" charset="0"/>
-              </a:defRPr>
-            </a:lvl5pPr>
-            <a:lvl6pPr marL="2514600" indent="-228600" eaLnBrk="0" fontAlgn="base" hangingPunct="0">
-              <a:spcBef>
-                <a:spcPct val="0"/>
-              </a:spcBef>
-              <a:spcAft>
-                <a:spcPct val="0"/>
-              </a:spcAft>
-              <a:defRPr sz="2900">
-                <a:solidFill>
-                  <a:schemeClr val="tx1"/>
-                </a:solidFill>
-                <a:latin typeface="Arial" charset="0"/>
-              </a:defRPr>
-            </a:lvl6pPr>
-            <a:lvl7pPr marL="2971800" indent="-228600" eaLnBrk="0" fontAlgn="base" hangingPunct="0">
-              <a:spcBef>
-                <a:spcPct val="0"/>
-              </a:spcBef>
-              <a:spcAft>
-                <a:spcPct val="0"/>
-              </a:spcAft>
-              <a:defRPr sz="2900">
-                <a:solidFill>
-                  <a:schemeClr val="tx1"/>
-                </a:solidFill>
-                <a:latin typeface="Arial" charset="0"/>
-              </a:defRPr>
-            </a:lvl7pPr>
-            <a:lvl8pPr marL="3429000" indent="-228600" eaLnBrk="0" fontAlgn="base" hangingPunct="0">
-              <a:spcBef>
-                <a:spcPct val="0"/>
-              </a:spcBef>
-              <a:spcAft>
-                <a:spcPct val="0"/>
-              </a:spcAft>
-              <a:defRPr sz="2900">
-                <a:solidFill>
-                  <a:schemeClr val="tx1"/>
-                </a:solidFill>
-                <a:latin typeface="Arial" charset="0"/>
-              </a:defRPr>
-            </a:lvl8pPr>
-            <a:lvl9pPr marL="3886200" indent="-228600" eaLnBrk="0" fontAlgn="base" hangingPunct="0">
-              <a:spcBef>
-                <a:spcPct val="0"/>
-              </a:spcBef>
-              <a:spcAft>
-                <a:spcPct val="0"/>
-              </a:spcAft>
-              <a:defRPr sz="2900">
-                <a:solidFill>
-                  <a:schemeClr val="tx1"/>
-                </a:solidFill>
-                <a:latin typeface="Arial" charset="0"/>
-              </a:defRPr>
-            </a:lvl9pPr>
-          </a:lstStyle>
-          <a:p>
-            <a:pPr eaLnBrk="1" hangingPunct="1"/>
-            <a:r>
-              <a:rPr lang="en-GB" altLang="x-none" sz="1400" dirty="0">
-                <a:latin typeface="JetBrains Mono" panose="02000009000000000000" pitchFamily="49" charset="0"/>
-                <a:cs typeface="JetBrains Mono" panose="02000009000000000000" pitchFamily="49" charset="0"/>
-              </a:rPr>
-              <a:t>Above: A screenshot of </a:t>
-            </a:r>
-            <a:r>
-              <a:rPr lang="en-GB" altLang="x-none" sz="1400" b="1" dirty="0">
-                <a:latin typeface="JetBrains Mono" panose="02000009000000000000" pitchFamily="49" charset="0"/>
-                <a:cs typeface="JetBrains Mono" panose="02000009000000000000" pitchFamily="49" charset="0"/>
-              </a:rPr>
-              <a:t>OH-HECC</a:t>
-            </a:r>
-            <a:r>
-              <a:rPr lang="en-GB" altLang="x-none" sz="1400" dirty="0">
-                <a:latin typeface="JetBrains Mono" panose="02000009000000000000" pitchFamily="49" charset="0"/>
-                <a:cs typeface="JetBrains Mono" panose="02000009000000000000" pitchFamily="49" charset="0"/>
-              </a:rPr>
-              <a:t> (</a:t>
-            </a:r>
-            <a:r>
-              <a:rPr lang="en-GB" altLang="x-none" sz="1400" i="1" dirty="0">
-                <a:latin typeface="JetBrains Mono" panose="02000009000000000000" pitchFamily="49" charset="0"/>
-                <a:cs typeface="JetBrains Mono" panose="02000009000000000000" pitchFamily="49" charset="0"/>
-              </a:rPr>
-              <a:t>Optional Help for HECC</a:t>
-            </a:r>
-            <a:r>
-              <a:rPr lang="en-GB" altLang="x-none" sz="1400" dirty="0">
-                <a:latin typeface="JetBrains Mono" panose="02000009000000000000" pitchFamily="49" charset="0"/>
-                <a:cs typeface="JetBrains Mono" panose="02000009000000000000" pitchFamily="49" charset="0"/>
-              </a:rPr>
-              <a:t>; the editing GUI) showing the network of passages for an example game. (</a:t>
-            </a:r>
-            <a:r>
-              <a:rPr lang="en-GB" altLang="x-none" sz="1400" i="1" dirty="0" err="1">
-                <a:latin typeface="JetBrains Mono" panose="02000009000000000000" pitchFamily="49" charset="0"/>
-                <a:cs typeface="JetBrains Mono" panose="02000009000000000000" pitchFamily="49" charset="0"/>
-              </a:rPr>
-              <a:t>Backblast</a:t>
-            </a:r>
-            <a:r>
-              <a:rPr lang="en-GB" altLang="x-none" sz="1400" dirty="0">
-                <a:latin typeface="JetBrains Mono" panose="02000009000000000000" pitchFamily="49" charset="0"/>
-                <a:cs typeface="JetBrains Mono" panose="02000009000000000000" pitchFamily="49" charset="0"/>
-              </a:rPr>
-              <a:t> was too big to fit on this poster)</a:t>
-            </a:r>
-          </a:p>
-          <a:p>
-            <a:pPr eaLnBrk="1" hangingPunct="1"/>
-            <a:endParaRPr lang="en-GB" altLang="x-none" sz="1400" dirty="0">
-              <a:latin typeface="JetBrains Mono" panose="02000009000000000000" pitchFamily="49" charset="0"/>
-              <a:cs typeface="JetBrains Mono" panose="02000009000000000000" pitchFamily="49" charset="0"/>
-            </a:endParaRPr>
-          </a:p>
-          <a:p>
-            <a:pPr eaLnBrk="1" hangingPunct="1"/>
-            <a:r>
-              <a:rPr lang="en-GB" altLang="x-none" sz="1400" dirty="0">
-                <a:latin typeface="JetBrains Mono" panose="02000009000000000000" pitchFamily="49" charset="0"/>
-                <a:cs typeface="JetBrains Mono" panose="02000009000000000000" pitchFamily="49" charset="0"/>
-              </a:rPr>
-              <a:t>Below: A screenshot from that game after exporting it via </a:t>
-            </a:r>
-            <a:r>
-              <a:rPr lang="en-GB" altLang="x-none" sz="1400" b="1" dirty="0">
-                <a:latin typeface="JetBrains Mono" panose="02000009000000000000" pitchFamily="49" charset="0"/>
-                <a:cs typeface="JetBrains Mono" panose="02000009000000000000" pitchFamily="49" charset="0"/>
-              </a:rPr>
-              <a:t>HECC-UP</a:t>
-            </a:r>
-            <a:r>
-              <a:rPr lang="en-GB" altLang="x-none" sz="1400" dirty="0">
-                <a:latin typeface="JetBrains Mono" panose="02000009000000000000" pitchFamily="49" charset="0"/>
-                <a:cs typeface="JetBrains Mono" panose="02000009000000000000" pitchFamily="49" charset="0"/>
-              </a:rPr>
-              <a:t> </a:t>
-            </a:r>
-            <a:r>
-              <a:rPr lang="en-GB" altLang="x-none" sz="1400" i="1" dirty="0">
-                <a:latin typeface="JetBrains Mono" panose="02000009000000000000" pitchFamily="49" charset="0"/>
-                <a:cs typeface="JetBrains Mono" panose="02000009000000000000" pitchFamily="49" charset="0"/>
-              </a:rPr>
-              <a:t>(HECC Ultra Parser).</a:t>
-            </a:r>
-            <a:endParaRPr lang="en-GB" altLang="x-none" sz="1400" dirty="0">
-              <a:latin typeface="JetBrains Mono" panose="02000009000000000000" pitchFamily="49" charset="0"/>
-              <a:cs typeface="JetBrains Mono" panose="02000009000000000000" pitchFamily="49" charset="0"/>
-            </a:endParaRPr>
-          </a:p>
-        </p:txBody>
-      </p:sp>
-      <p:sp>
-        <p:nvSpPr>
-          <p:cNvPr id="2059" name="TextBox 11"/>
-          <p:cNvSpPr txBox="1">
-            <a:spLocks noChangeArrowheads="1"/>
-          </p:cNvSpPr>
-          <p:nvPr/>
-        </p:nvSpPr>
-        <p:spPr bwMode="auto">
-          <a:xfrm>
-            <a:off x="4989513" y="346075"/>
-            <a:ext cx="5286375" cy="1000274"/>
-          </a:xfrm>
-          <a:prstGeom prst="rect">
-            <a:avLst/>
-          </a:prstGeom>
-          <a:noFill/>
-          <a:ln>
-            <a:noFill/>
-          </a:ln>
-          <a:extLst>
-            <a:ext uri="{909E8E84-426E-40DD-AFC4-6F175D3DCCD1}">
-              <a14:hiddenFill xmlns:a14="http://schemas.microsoft.com/office/drawing/2010/main">
-                <a:solidFill>
-                  <a:srgbClr val="FFFFFF"/>
-                </a:solidFill>
-              </a14:hiddenFill>
-            </a:ext>
-            <a:ext uri="{91240B29-F687-4F45-9708-019B960494DF}">
-              <a14:hiddenLine xmlns:a14="http://schemas.microsoft.com/office/drawing/2010/main" w="9525">
-                <a:solidFill>
-                  <a:srgbClr val="000000"/>
-                </a:solidFill>
-                <a:miter lim="800000"/>
-                <a:headEnd/>
-                <a:tailEnd/>
-              </a14:hiddenLine>
-            </a:ext>
-          </a:extLst>
-        </p:spPr>
-        <p:txBody>
-          <a:bodyPr>
-            <a:spAutoFit/>
-          </a:bodyPr>
-          <a:lstStyle>
-            <a:lvl1pPr eaLnBrk="0" hangingPunct="0">
-              <a:defRPr sz="2900">
-                <a:solidFill>
-                  <a:schemeClr val="tx1"/>
-                </a:solidFill>
-                <a:latin typeface="Arial" charset="0"/>
-              </a:defRPr>
-            </a:lvl1pPr>
-            <a:lvl2pPr marL="742950" indent="-285750" eaLnBrk="0" hangingPunct="0">
-              <a:defRPr sz="2900">
-                <a:solidFill>
-                  <a:schemeClr val="tx1"/>
-                </a:solidFill>
-                <a:latin typeface="Arial" charset="0"/>
-              </a:defRPr>
-            </a:lvl2pPr>
-            <a:lvl3pPr marL="1143000" indent="-228600" eaLnBrk="0" hangingPunct="0">
-              <a:defRPr sz="2900">
-                <a:solidFill>
-                  <a:schemeClr val="tx1"/>
-                </a:solidFill>
-                <a:latin typeface="Arial" charset="0"/>
-              </a:defRPr>
-            </a:lvl3pPr>
-            <a:lvl4pPr marL="1600200" indent="-228600" eaLnBrk="0" hangingPunct="0">
-              <a:defRPr sz="2900">
-                <a:solidFill>
-                  <a:schemeClr val="tx1"/>
-                </a:solidFill>
-                <a:latin typeface="Arial" charset="0"/>
-              </a:defRPr>
-            </a:lvl4pPr>
-            <a:lvl5pPr marL="2057400" indent="-228600" eaLnBrk="0" hangingPunct="0">
-              <a:defRPr sz="2900">
-                <a:solidFill>
-                  <a:schemeClr val="tx1"/>
-                </a:solidFill>
-                <a:latin typeface="Arial" charset="0"/>
-              </a:defRPr>
-            </a:lvl5pPr>
-            <a:lvl6pPr marL="2514600" indent="-228600" eaLnBrk="0" fontAlgn="base" hangingPunct="0">
-              <a:spcBef>
-                <a:spcPct val="0"/>
-              </a:spcBef>
-              <a:spcAft>
-                <a:spcPct val="0"/>
-              </a:spcAft>
-              <a:defRPr sz="2900">
-                <a:solidFill>
-                  <a:schemeClr val="tx1"/>
-                </a:solidFill>
-                <a:latin typeface="Arial" charset="0"/>
-              </a:defRPr>
-            </a:lvl6pPr>
-            <a:lvl7pPr marL="2971800" indent="-228600" eaLnBrk="0" fontAlgn="base" hangingPunct="0">
-              <a:spcBef>
-                <a:spcPct val="0"/>
-              </a:spcBef>
-              <a:spcAft>
-                <a:spcPct val="0"/>
-              </a:spcAft>
-              <a:defRPr sz="2900">
-                <a:solidFill>
-                  <a:schemeClr val="tx1"/>
-                </a:solidFill>
-                <a:latin typeface="Arial" charset="0"/>
-              </a:defRPr>
-            </a:lvl7pPr>
-            <a:lvl8pPr marL="3429000" indent="-228600" eaLnBrk="0" fontAlgn="base" hangingPunct="0">
-              <a:spcBef>
-                <a:spcPct val="0"/>
-              </a:spcBef>
-              <a:spcAft>
-                <a:spcPct val="0"/>
-              </a:spcAft>
-              <a:defRPr sz="2900">
-                <a:solidFill>
-                  <a:schemeClr val="tx1"/>
-                </a:solidFill>
-                <a:latin typeface="Arial" charset="0"/>
-              </a:defRPr>
-            </a:lvl8pPr>
-            <a:lvl9pPr marL="3886200" indent="-228600" eaLnBrk="0" fontAlgn="base" hangingPunct="0">
-              <a:spcBef>
-                <a:spcPct val="0"/>
-              </a:spcBef>
-              <a:spcAft>
-                <a:spcPct val="0"/>
-              </a:spcAft>
-              <a:defRPr sz="2900">
-                <a:solidFill>
-                  <a:schemeClr val="tx1"/>
-                </a:solidFill>
-                <a:latin typeface="Arial" charset="0"/>
-              </a:defRPr>
-            </a:lvl9pPr>
-          </a:lstStyle>
-          <a:p>
-            <a:pPr algn="ctr" eaLnBrk="1" hangingPunct="1"/>
-            <a:r>
-              <a:rPr lang="en-US" altLang="x-none" dirty="0"/>
-              <a:t>Hypertext Game Project</a:t>
-            </a:r>
-          </a:p>
-          <a:p>
-            <a:pPr algn="ctr" eaLnBrk="1" hangingPunct="1"/>
-            <a:r>
-              <a:rPr lang="en-US" altLang="x-none" sz="3000" b="1" dirty="0">
-                <a:latin typeface="Arial Rounded MT Bold" panose="020F0704030504030204" pitchFamily="34" charset="0"/>
-              </a:rPr>
-              <a:t>HECC-IT!</a:t>
-            </a:r>
           </a:p>
         </p:txBody>
       </p:sp>
@@ -5696,36 +5598,6 @@
             <a:extLst>
               <a:ext uri="{FF2B5EF4-FFF2-40B4-BE49-F238E27FC236}">
                 <a16:creationId xmlns:a16="http://schemas.microsoft.com/office/drawing/2014/main" id="{82ABEAE3-C386-475A-838C-FD7554010056}"/>
-              </a:ext>
-            </a:extLst>
-          </p:cNvPr>
-          <p:cNvPicPr>
-            <a:picLocks noChangeAspect="1"/>
-          </p:cNvPicPr>
-          <p:nvPr/>
-        </p:nvPicPr>
-        <p:blipFill>
-          <a:blip r:embed="rId5"/>
-          <a:stretch>
-            <a:fillRect/>
-          </a:stretch>
-        </p:blipFill>
-        <p:spPr>
-          <a:xfrm>
-            <a:off x="11105557" y="2391923"/>
-            <a:ext cx="4122336" cy="2643596"/>
-          </a:xfrm>
-          <a:prstGeom prst="rect">
-            <a:avLst/>
-          </a:prstGeom>
-        </p:spPr>
-      </p:pic>
-      <p:pic>
-        <p:nvPicPr>
-          <p:cNvPr id="7" name="Picture 6">
-            <a:extLst>
-              <a:ext uri="{FF2B5EF4-FFF2-40B4-BE49-F238E27FC236}">
-                <a16:creationId xmlns:a16="http://schemas.microsoft.com/office/drawing/2014/main" id="{7AF6AACF-097D-4766-8A86-CD34ABAC8EBB}"/>
               </a:ext>
             </a:extLst>
           </p:cNvPr>
@@ -5742,14 +5614,174 @@
         </p:blipFill>
         <p:spPr>
           <a:xfrm>
-            <a:off x="11396664" y="7360779"/>
-            <a:ext cx="3540124" cy="1569829"/>
+            <a:off x="11105557" y="2391923"/>
+            <a:ext cx="4122336" cy="2643596"/>
           </a:xfrm>
           <a:prstGeom prst="rect">
             <a:avLst/>
           </a:prstGeom>
         </p:spPr>
       </p:pic>
+      <p:sp>
+        <p:nvSpPr>
+          <p:cNvPr id="2059" name="TextBox 11"/>
+          <p:cNvSpPr txBox="1">
+            <a:spLocks noChangeArrowheads="1"/>
+          </p:cNvSpPr>
+          <p:nvPr/>
+        </p:nvSpPr>
+        <p:spPr bwMode="auto">
+          <a:xfrm>
+            <a:off x="4989513" y="346075"/>
+            <a:ext cx="5286375" cy="1092607"/>
+          </a:xfrm>
+          <a:prstGeom prst="rect">
+            <a:avLst/>
+          </a:prstGeom>
+          <a:noFill/>
+          <a:ln>
+            <a:noFill/>
+          </a:ln>
+          <a:extLst>
+            <a:ext uri="{909E8E84-426E-40DD-AFC4-6F175D3DCCD1}">
+              <a14:hiddenFill xmlns:a14="http://schemas.microsoft.com/office/drawing/2010/main">
+                <a:solidFill>
+                  <a:srgbClr val="FFFFFF"/>
+                </a:solidFill>
+              </a14:hiddenFill>
+            </a:ext>
+            <a:ext uri="{91240B29-F687-4F45-9708-019B960494DF}">
+              <a14:hiddenLine xmlns:a14="http://schemas.microsoft.com/office/drawing/2010/main" w="9525">
+                <a:solidFill>
+                  <a:srgbClr val="000000"/>
+                </a:solidFill>
+                <a:miter lim="800000"/>
+                <a:headEnd/>
+                <a:tailEnd/>
+              </a14:hiddenLine>
+            </a:ext>
+          </a:extLst>
+        </p:spPr>
+        <p:txBody>
+          <a:bodyPr>
+            <a:spAutoFit/>
+          </a:bodyPr>
+          <a:lstStyle>
+            <a:lvl1pPr eaLnBrk="0" hangingPunct="0">
+              <a:defRPr sz="2900">
+                <a:solidFill>
+                  <a:schemeClr val="tx1"/>
+                </a:solidFill>
+                <a:latin typeface="Arial" charset="0"/>
+              </a:defRPr>
+            </a:lvl1pPr>
+            <a:lvl2pPr marL="742950" indent="-285750" eaLnBrk="0" hangingPunct="0">
+              <a:defRPr sz="2900">
+                <a:solidFill>
+                  <a:schemeClr val="tx1"/>
+                </a:solidFill>
+                <a:latin typeface="Arial" charset="0"/>
+              </a:defRPr>
+            </a:lvl2pPr>
+            <a:lvl3pPr marL="1143000" indent="-228600" eaLnBrk="0" hangingPunct="0">
+              <a:defRPr sz="2900">
+                <a:solidFill>
+                  <a:schemeClr val="tx1"/>
+                </a:solidFill>
+                <a:latin typeface="Arial" charset="0"/>
+              </a:defRPr>
+            </a:lvl3pPr>
+            <a:lvl4pPr marL="1600200" indent="-228600" eaLnBrk="0" hangingPunct="0">
+              <a:defRPr sz="2900">
+                <a:solidFill>
+                  <a:schemeClr val="tx1"/>
+                </a:solidFill>
+                <a:latin typeface="Arial" charset="0"/>
+              </a:defRPr>
+            </a:lvl4pPr>
+            <a:lvl5pPr marL="2057400" indent="-228600" eaLnBrk="0" hangingPunct="0">
+              <a:defRPr sz="2900">
+                <a:solidFill>
+                  <a:schemeClr val="tx1"/>
+                </a:solidFill>
+                <a:latin typeface="Arial" charset="0"/>
+              </a:defRPr>
+            </a:lvl5pPr>
+            <a:lvl6pPr marL="2514600" indent="-228600" eaLnBrk="0" fontAlgn="base" hangingPunct="0">
+              <a:spcBef>
+                <a:spcPct val="0"/>
+              </a:spcBef>
+              <a:spcAft>
+                <a:spcPct val="0"/>
+              </a:spcAft>
+              <a:defRPr sz="2900">
+                <a:solidFill>
+                  <a:schemeClr val="tx1"/>
+                </a:solidFill>
+                <a:latin typeface="Arial" charset="0"/>
+              </a:defRPr>
+            </a:lvl6pPr>
+            <a:lvl7pPr marL="2971800" indent="-228600" eaLnBrk="0" fontAlgn="base" hangingPunct="0">
+              <a:spcBef>
+                <a:spcPct val="0"/>
+              </a:spcBef>
+              <a:spcAft>
+                <a:spcPct val="0"/>
+              </a:spcAft>
+              <a:defRPr sz="2900">
+                <a:solidFill>
+                  <a:schemeClr val="tx1"/>
+                </a:solidFill>
+                <a:latin typeface="Arial" charset="0"/>
+              </a:defRPr>
+            </a:lvl7pPr>
+            <a:lvl8pPr marL="3429000" indent="-228600" eaLnBrk="0" fontAlgn="base" hangingPunct="0">
+              <a:spcBef>
+                <a:spcPct val="0"/>
+              </a:spcBef>
+              <a:spcAft>
+                <a:spcPct val="0"/>
+              </a:spcAft>
+              <a:defRPr sz="2900">
+                <a:solidFill>
+                  <a:schemeClr val="tx1"/>
+                </a:solidFill>
+                <a:latin typeface="Arial" charset="0"/>
+              </a:defRPr>
+            </a:lvl8pPr>
+            <a:lvl9pPr marL="3886200" indent="-228600" eaLnBrk="0" fontAlgn="base" hangingPunct="0">
+              <a:spcBef>
+                <a:spcPct val="0"/>
+              </a:spcBef>
+              <a:spcAft>
+                <a:spcPct val="0"/>
+              </a:spcAft>
+              <a:defRPr sz="2900">
+                <a:solidFill>
+                  <a:schemeClr val="tx1"/>
+                </a:solidFill>
+                <a:latin typeface="Arial" charset="0"/>
+              </a:defRPr>
+            </a:lvl9pPr>
+          </a:lstStyle>
+          <a:p>
+            <a:pPr algn="ctr" eaLnBrk="1" hangingPunct="1"/>
+            <a:r>
+              <a:rPr lang="en-US" altLang="x-none" dirty="0"/>
+              <a:t>Hypertext Game Project</a:t>
+            </a:r>
+          </a:p>
+          <a:p>
+            <a:pPr algn="ctr" eaLnBrk="1" hangingPunct="1"/>
+            <a:r>
+              <a:rPr lang="en-US" altLang="x-none" sz="3600" b="1" dirty="0">
+                <a:latin typeface="Arial Rounded MT Bold" panose="020F0704030504030204" pitchFamily="34" charset="0"/>
+              </a:rPr>
+              <a:t>HECC-IT!</a:t>
+            </a:r>
+          </a:p>
+        </p:txBody>
+      </p:sp>
       <p:pic>
         <p:nvPicPr>
           <p:cNvPr id="15" name="Picture 14">
@@ -5801,8 +5833,8 @@
         </p:nvSpPr>
         <p:spPr bwMode="auto">
           <a:xfrm>
-            <a:off x="11400025" y="9097961"/>
-            <a:ext cx="3540125" cy="1206099"/>
+            <a:off x="11400025" y="8711243"/>
+            <a:ext cx="3540125" cy="1592818"/>
           </a:xfrm>
           <a:prstGeom prst="rect">
             <a:avLst/>
@@ -5922,45 +5954,45 @@
           <a:p>
             <a:pPr eaLnBrk="1" hangingPunct="1"/>
             <a:r>
-              <a:rPr lang="en-GB" altLang="x-none" sz="1400" dirty="0">
+              <a:rPr lang="en-GB" altLang="x-none" sz="1400">
                 <a:latin typeface="JetBrains Mono" panose="02000009000000000000" pitchFamily="49" charset="0"/>
                 <a:cs typeface="JetBrains Mono" panose="02000009000000000000" pitchFamily="49" charset="0"/>
               </a:rPr>
               <a:t>If </a:t>
             </a:r>
             <a:r>
-              <a:rPr lang="en-GB" altLang="x-none" sz="1400" b="1" dirty="0">
+              <a:rPr lang="en-GB" altLang="x-none" sz="1400" b="1">
                 <a:latin typeface="JetBrains Mono" panose="02000009000000000000" pitchFamily="49" charset="0"/>
                 <a:cs typeface="JetBrains Mono" panose="02000009000000000000" pitchFamily="49" charset="0"/>
               </a:rPr>
               <a:t>you</a:t>
             </a:r>
             <a:r>
-              <a:rPr lang="en-GB" altLang="x-none" sz="1400" dirty="0">
+              <a:rPr lang="en-GB" altLang="x-none" sz="1400">
                 <a:latin typeface="JetBrains Mono" panose="02000009000000000000" pitchFamily="49" charset="0"/>
                 <a:cs typeface="JetBrains Mono" panose="02000009000000000000" pitchFamily="49" charset="0"/>
               </a:rPr>
-              <a:t> want to play some of the </a:t>
-            </a:r>
-            <a:r>
-              <a:rPr lang="en-GB" altLang="x-none" sz="1400" b="1" dirty="0">
+              <a:t> want to play some of the games produced during the development of </a:t>
+            </a:r>
+            <a:r>
+              <a:rPr lang="en-GB" altLang="x-none" sz="1400" b="1">
                 <a:latin typeface="JetBrains Mono" panose="02000009000000000000" pitchFamily="49" charset="0"/>
                 <a:cs typeface="JetBrains Mono" panose="02000009000000000000" pitchFamily="49" charset="0"/>
               </a:rPr>
               <a:t>HECC-IT</a:t>
             </a:r>
             <a:r>
-              <a:rPr lang="en-GB" altLang="x-none" sz="1400" dirty="0">
+              <a:rPr lang="en-GB" altLang="x-none" sz="1400">
                 <a:latin typeface="JetBrains Mono" panose="02000009000000000000" pitchFamily="49" charset="0"/>
                 <a:cs typeface="JetBrains Mono" panose="02000009000000000000" pitchFamily="49" charset="0"/>
               </a:rPr>
-              <a:t> demonstration games, you can play them here:</a:t>
+              <a:t>, to see for yourself what it can do, you can play them here:</a:t>
             </a:r>
           </a:p>
           <a:p>
             <a:pPr eaLnBrk="1" hangingPunct="1"/>
             <a:r>
-              <a:rPr lang="en-GB" altLang="x-none" sz="1600" b="1" dirty="0">
+              <a:rPr lang="en-GB" altLang="x-none" sz="1600" b="1">
                 <a:solidFill>
                   <a:srgbClr val="0000FF"/>
                 </a:solidFill>
@@ -5976,10 +6008,188 @@
               </a:rPr>
               <a:t>https://11belowstudio.itch.io/the-hecc-it-demo</a:t>
             </a:r>
-            <a:endParaRPr lang="en-GB" altLang="x-none" sz="1600" b="1" dirty="0">
+            <a:endParaRPr lang="en-GB" altLang="x-none" sz="1600" b="1">
               <a:solidFill>
                 <a:srgbClr val="0000FF"/>
               </a:solidFill>
+              <a:latin typeface="JetBrains Mono" panose="02000009000000000000" pitchFamily="49" charset="0"/>
+              <a:cs typeface="JetBrains Mono" panose="02000009000000000000" pitchFamily="49" charset="0"/>
+            </a:endParaRPr>
+          </a:p>
+        </p:txBody>
+      </p:sp>
+      <p:sp>
+        <p:nvSpPr>
+          <p:cNvPr id="18" name="Rectangle 10">
+            <a:extLst>
+              <a:ext uri="{FF2B5EF4-FFF2-40B4-BE49-F238E27FC236}">
+                <a16:creationId xmlns:a16="http://schemas.microsoft.com/office/drawing/2014/main" id="{6670AC2D-03B3-4224-A457-5E8202E7971E}"/>
+              </a:ext>
+            </a:extLst>
+          </p:cNvPr>
+          <p:cNvSpPr>
+            <a:spLocks noChangeArrowheads="1"/>
+          </p:cNvSpPr>
+          <p:nvPr/>
+        </p:nvSpPr>
+        <p:spPr bwMode="auto">
+          <a:xfrm>
+            <a:off x="11396662" y="6546862"/>
+            <a:ext cx="3540125" cy="715796"/>
+          </a:xfrm>
+          <a:prstGeom prst="rect">
+            <a:avLst/>
+          </a:prstGeom>
+          <a:solidFill>
+            <a:schemeClr val="bg1"/>
+          </a:solidFill>
+          <a:ln w="9525">
+            <a:solidFill>
+              <a:schemeClr val="tx1"/>
+            </a:solidFill>
+            <a:miter lim="800000"/>
+            <a:headEnd/>
+            <a:tailEnd/>
+          </a:ln>
+        </p:spPr>
+        <p:txBody>
+          <a:bodyPr/>
+          <a:lstStyle>
+            <a:lvl1pPr eaLnBrk="0" hangingPunct="0">
+              <a:defRPr sz="2900">
+                <a:solidFill>
+                  <a:schemeClr val="tx1"/>
+                </a:solidFill>
+                <a:latin typeface="Arial" charset="0"/>
+              </a:defRPr>
+            </a:lvl1pPr>
+            <a:lvl2pPr marL="742950" indent="-285750" eaLnBrk="0" hangingPunct="0">
+              <a:defRPr sz="2900">
+                <a:solidFill>
+                  <a:schemeClr val="tx1"/>
+                </a:solidFill>
+                <a:latin typeface="Arial" charset="0"/>
+              </a:defRPr>
+            </a:lvl2pPr>
+            <a:lvl3pPr marL="1143000" indent="-228600" eaLnBrk="0" hangingPunct="0">
+              <a:defRPr sz="2900">
+                <a:solidFill>
+                  <a:schemeClr val="tx1"/>
+                </a:solidFill>
+                <a:latin typeface="Arial" charset="0"/>
+              </a:defRPr>
+            </a:lvl3pPr>
+            <a:lvl4pPr marL="1600200" indent="-228600" eaLnBrk="0" hangingPunct="0">
+              <a:defRPr sz="2900">
+                <a:solidFill>
+                  <a:schemeClr val="tx1"/>
+                </a:solidFill>
+                <a:latin typeface="Arial" charset="0"/>
+              </a:defRPr>
+            </a:lvl4pPr>
+            <a:lvl5pPr marL="2057400" indent="-228600" eaLnBrk="0" hangingPunct="0">
+              <a:defRPr sz="2900">
+                <a:solidFill>
+                  <a:schemeClr val="tx1"/>
+                </a:solidFill>
+                <a:latin typeface="Arial" charset="0"/>
+              </a:defRPr>
+            </a:lvl5pPr>
+            <a:lvl6pPr marL="2514600" indent="-228600" eaLnBrk="0" fontAlgn="base" hangingPunct="0">
+              <a:spcBef>
+                <a:spcPct val="0"/>
+              </a:spcBef>
+              <a:spcAft>
+                <a:spcPct val="0"/>
+              </a:spcAft>
+              <a:defRPr sz="2900">
+                <a:solidFill>
+                  <a:schemeClr val="tx1"/>
+                </a:solidFill>
+                <a:latin typeface="Arial" charset="0"/>
+              </a:defRPr>
+            </a:lvl6pPr>
+            <a:lvl7pPr marL="2971800" indent="-228600" eaLnBrk="0" fontAlgn="base" hangingPunct="0">
+              <a:spcBef>
+                <a:spcPct val="0"/>
+              </a:spcBef>
+              <a:spcAft>
+                <a:spcPct val="0"/>
+              </a:spcAft>
+              <a:defRPr sz="2900">
+                <a:solidFill>
+                  <a:schemeClr val="tx1"/>
+                </a:solidFill>
+                <a:latin typeface="Arial" charset="0"/>
+              </a:defRPr>
+            </a:lvl7pPr>
+            <a:lvl8pPr marL="3429000" indent="-228600" eaLnBrk="0" fontAlgn="base" hangingPunct="0">
+              <a:spcBef>
+                <a:spcPct val="0"/>
+              </a:spcBef>
+              <a:spcAft>
+                <a:spcPct val="0"/>
+              </a:spcAft>
+              <a:defRPr sz="2900">
+                <a:solidFill>
+                  <a:schemeClr val="tx1"/>
+                </a:solidFill>
+                <a:latin typeface="Arial" charset="0"/>
+              </a:defRPr>
+            </a:lvl8pPr>
+            <a:lvl9pPr marL="3886200" indent="-228600" eaLnBrk="0" fontAlgn="base" hangingPunct="0">
+              <a:spcBef>
+                <a:spcPct val="0"/>
+              </a:spcBef>
+              <a:spcAft>
+                <a:spcPct val="0"/>
+              </a:spcAft>
+              <a:defRPr sz="2900">
+                <a:solidFill>
+                  <a:schemeClr val="tx1"/>
+                </a:solidFill>
+                <a:latin typeface="Arial" charset="0"/>
+              </a:defRPr>
+            </a:lvl9pPr>
+          </a:lstStyle>
+          <a:p>
+            <a:pPr eaLnBrk="1" hangingPunct="1"/>
+            <a:r>
+              <a:rPr lang="en-GB" altLang="x-none" sz="1400" b="1">
+                <a:latin typeface="JetBrains Mono" panose="02000009000000000000" pitchFamily="49" charset="0"/>
+                <a:cs typeface="JetBrains Mono" panose="02000009000000000000" pitchFamily="49" charset="0"/>
+              </a:rPr>
+              <a:t>Below</a:t>
+            </a:r>
+            <a:r>
+              <a:rPr lang="en-GB" altLang="x-none" sz="1400">
+                <a:latin typeface="JetBrains Mono" panose="02000009000000000000" pitchFamily="49" charset="0"/>
+                <a:cs typeface="JetBrains Mono" panose="02000009000000000000" pitchFamily="49" charset="0"/>
+              </a:rPr>
+              <a:t>: A screenshot from that game after exporting it with </a:t>
+            </a:r>
+            <a:r>
+              <a:rPr lang="en-GB" altLang="x-none" sz="1400" b="1">
+                <a:latin typeface="JetBrains Mono" panose="02000009000000000000" pitchFamily="49" charset="0"/>
+                <a:cs typeface="JetBrains Mono" panose="02000009000000000000" pitchFamily="49" charset="0"/>
+              </a:rPr>
+              <a:t>HECC-UP</a:t>
+            </a:r>
+            <a:r>
+              <a:rPr lang="en-GB" altLang="x-none" sz="1400">
+                <a:latin typeface="JetBrains Mono" panose="02000009000000000000" pitchFamily="49" charset="0"/>
+                <a:cs typeface="JetBrains Mono" panose="02000009000000000000" pitchFamily="49" charset="0"/>
+              </a:rPr>
+              <a:t> </a:t>
+            </a:r>
+            <a:r>
+              <a:rPr lang="en-GB" altLang="x-none" sz="1400" i="1">
+                <a:latin typeface="JetBrains Mono" panose="02000009000000000000" pitchFamily="49" charset="0"/>
+                <a:cs typeface="JetBrains Mono" panose="02000009000000000000" pitchFamily="49" charset="0"/>
+              </a:rPr>
+              <a:t>(HECC Ultra Parser).</a:t>
+            </a:r>
+            <a:endParaRPr lang="en-GB" altLang="x-none" sz="1400">
               <a:latin typeface="JetBrains Mono" panose="02000009000000000000" pitchFamily="49" charset="0"/>
               <a:cs typeface="JetBrains Mono" panose="02000009000000000000" pitchFamily="49" charset="0"/>
             </a:endParaRPr>
@@ -7133,21 +7343,6 @@
 </file>
 
 <file path=customXml/item1.xml><?xml version="1.0" encoding="utf-8"?>
-<?mso-contentType ?>
-<FormTemplates xmlns="http://schemas.microsoft.com/sharepoint/v3/contenttype/forms">
-  <Display>DocumentLibraryForm</Display>
-  <Edit>DocumentLibraryForm</Edit>
-  <New>DocumentLibraryForm</New>
-</FormTemplates>
-</file>
-
-<file path=customXml/item2.xml><?xml version="1.0" encoding="utf-8"?>
-<p:properties xmlns:p="http://schemas.microsoft.com/office/2006/metadata/properties" xmlns:xsi="http://www.w3.org/2001/XMLSchema-instance" xmlns:pc="http://schemas.microsoft.com/office/infopath/2007/PartnerControls">
-  <documentManagement/>
-</p:properties>
-</file>
-
-<file path=customXml/item3.xml><?xml version="1.0" encoding="utf-8"?>
 <ct:contentTypeSchema xmlns:ct="http://schemas.microsoft.com/office/2006/metadata/contentType" xmlns:ma="http://schemas.microsoft.com/office/2006/metadata/properties/metaAttributes" ct:_="" ma:_="" ma:contentTypeName="Document" ma:contentTypeID="0x0101009F5618C6EA47144F98176975A51512E3" ma:contentTypeVersion="13" ma:contentTypeDescription="Create a new document." ma:contentTypeScope="" ma:versionID="ae9ce622c04d7ebad9410625498d08ea">
   <xsd:schema xmlns:xsd="http://www.w3.org/2001/XMLSchema" xmlns:xs="http://www.w3.org/2001/XMLSchema" xmlns:p="http://schemas.microsoft.com/office/2006/metadata/properties" xmlns:ns3="a9644998-0f43-4a12-9bff-883b17382285" xmlns:ns4="378297c8-0ee1-4ccb-95ba-390b2a98be1e" targetNamespace="http://schemas.microsoft.com/office/2006/metadata/properties" ma:root="true" ma:fieldsID="c7ff2d01485aa5870645acc7afabfd5d" ns3:_="" ns4:_="">
     <xsd:import namespace="a9644998-0f43-4a12-9bff-883b17382285"/>
@@ -7370,7 +7565,41 @@
 </ct:contentTypeSchema>
 </file>
 
+<file path=customXml/item2.xml><?xml version="1.0" encoding="utf-8"?>
+<?mso-contentType ?>
+<FormTemplates xmlns="http://schemas.microsoft.com/sharepoint/v3/contenttype/forms">
+  <Display>DocumentLibraryForm</Display>
+  <Edit>DocumentLibraryForm</Edit>
+  <New>DocumentLibraryForm</New>
+</FormTemplates>
+</file>
+
+<file path=customXml/item3.xml><?xml version="1.0" encoding="utf-8"?>
+<p:properties xmlns:p="http://schemas.microsoft.com/office/2006/metadata/properties" xmlns:xsi="http://www.w3.org/2001/XMLSchema-instance" xmlns:pc="http://schemas.microsoft.com/office/infopath/2007/PartnerControls">
+  <documentManagement/>
+</p:properties>
+</file>
+
 <file path=customXml/itemProps1.xml><?xml version="1.0" encoding="utf-8"?>
+<ds:datastoreItem xmlns:ds="http://schemas.openxmlformats.org/officeDocument/2006/customXml" ds:itemID="{C4687DC3-270C-4474-9FBF-721009BF8949}">
+  <ds:schemaRefs>
+    <ds:schemaRef ds:uri="378297c8-0ee1-4ccb-95ba-390b2a98be1e"/>
+    <ds:schemaRef ds:uri="a9644998-0f43-4a12-9bff-883b17382285"/>
+    <ds:schemaRef ds:uri="http://purl.org/dc/elements/1.1/"/>
+    <ds:schemaRef ds:uri="http://purl.org/dc/terms/"/>
+    <ds:schemaRef ds:uri="http://schemas.microsoft.com/internal/obd"/>
+    <ds:schemaRef ds:uri="http://schemas.microsoft.com/office/2006/documentManagement/types"/>
+    <ds:schemaRef ds:uri="http://schemas.microsoft.com/office/2006/metadata/contentType"/>
+    <ds:schemaRef ds:uri="http://schemas.microsoft.com/office/2006/metadata/properties"/>
+    <ds:schemaRef ds:uri="http://schemas.microsoft.com/office/2006/metadata/properties/metaAttributes"/>
+    <ds:schemaRef ds:uri="http://schemas.microsoft.com/office/infopath/2007/PartnerControls"/>
+    <ds:schemaRef ds:uri="http://schemas.openxmlformats.org/package/2006/metadata/core-properties"/>
+    <ds:schemaRef ds:uri="http://www.w3.org/2001/XMLSchema"/>
+  </ds:schemaRefs>
+</ds:datastoreItem>
+</file>
+
+<file path=customXml/itemProps2.xml><?xml version="1.0" encoding="utf-8"?>
 <ds:datastoreItem xmlns:ds="http://schemas.openxmlformats.org/officeDocument/2006/customXml" ds:itemID="{54D0D3C5-34E4-4C50-AEF0-1975AC22AD53}">
   <ds:schemaRefs>
     <ds:schemaRef ds:uri="http://schemas.microsoft.com/sharepoint/v3/contenttype/forms"/>
@@ -7378,38 +7607,19 @@
 </ds:datastoreItem>
 </file>
 
-<file path=customXml/itemProps2.xml><?xml version="1.0" encoding="utf-8"?>
+<file path=customXml/itemProps3.xml><?xml version="1.0" encoding="utf-8"?>
 <ds:datastoreItem xmlns:ds="http://schemas.openxmlformats.org/officeDocument/2006/customXml" ds:itemID="{1008306C-5399-4C69-807E-BB34856E2D0D}">
   <ds:schemaRefs>
-    <ds:schemaRef ds:uri="http://schemas.openxmlformats.org/package/2006/metadata/core-properties"/>
-    <ds:schemaRef ds:uri="http://purl.org/dc/elements/1.1/"/>
     <ds:schemaRef ds:uri="378297c8-0ee1-4ccb-95ba-390b2a98be1e"/>
     <ds:schemaRef ds:uri="a9644998-0f43-4a12-9bff-883b17382285"/>
     <ds:schemaRef ds:uri="http://purl.org/dc/dcmitype/"/>
+    <ds:schemaRef ds:uri="http://purl.org/dc/elements/1.1/"/>
     <ds:schemaRef ds:uri="http://purl.org/dc/terms/"/>
     <ds:schemaRef ds:uri="http://schemas.microsoft.com/office/2006/documentManagement/types"/>
+    <ds:schemaRef ds:uri="http://schemas.microsoft.com/office/2006/metadata/properties"/>
     <ds:schemaRef ds:uri="http://schemas.microsoft.com/office/infopath/2007/PartnerControls"/>
-    <ds:schemaRef ds:uri="http://schemas.microsoft.com/office/2006/metadata/properties"/>
+    <ds:schemaRef ds:uri="http://schemas.openxmlformats.org/package/2006/metadata/core-properties"/>
     <ds:schemaRef ds:uri="http://www.w3.org/XML/1998/namespace"/>
   </ds:schemaRefs>
 </ds:datastoreItem>
-</file>
-
-<file path=customXml/itemProps3.xml><?xml version="1.0" encoding="utf-8"?>
-<ds:datastoreItem xmlns:ds="http://schemas.openxmlformats.org/officeDocument/2006/customXml" ds:itemID="{C4687DC3-270C-4474-9FBF-721009BF8949}">
-  <ds:schemaRefs>
-    <ds:schemaRef ds:uri="http://schemas.microsoft.com/office/2006/metadata/contentType"/>
-    <ds:schemaRef ds:uri="http://schemas.microsoft.com/office/2006/metadata/properties/metaAttributes"/>
-    <ds:schemaRef ds:uri="http://www.w3.org/2001/XMLSchema"/>
-    <ds:schemaRef ds:uri="http://schemas.microsoft.com/office/2006/metadata/properties"/>
-    <ds:schemaRef ds:uri="a9644998-0f43-4a12-9bff-883b17382285"/>
-    <ds:schemaRef ds:uri="378297c8-0ee1-4ccb-95ba-390b2a98be1e"/>
-    <ds:schemaRef ds:uri="http://schemas.microsoft.com/office/2006/documentManagement/types"/>
-    <ds:schemaRef ds:uri="http://schemas.microsoft.com/office/infopath/2007/PartnerControls"/>
-    <ds:schemaRef ds:uri="http://schemas.openxmlformats.org/package/2006/metadata/core-properties"/>
-    <ds:schemaRef ds:uri="http://purl.org/dc/elements/1.1/"/>
-    <ds:schemaRef ds:uri="http://purl.org/dc/terms/"/>
-    <ds:schemaRef ds:uri="http://schemas.microsoft.com/internal/obd"/>
-  </ds:schemaRefs>
-</ds:datastoreItem>
 </file>
</xml_diff>